<commit_message>
Updated presentation for lab 06_API. Enabled annotations for Swashbuckle.
</commit_message>
<xml_diff>
--- a/06_API/PV239-Xamarin-06_API.pptx
+++ b/06_API/PV239-Xamarin-06_API.pptx
@@ -211,7 +211,7 @@
           <a:p>
             <a:fld id="{48A795E8-66B5-4696-B483-F1F9FA0B53D4}" type="datetimeFigureOut">
               <a:rPr lang="cs-CZ" smtClean="0"/>
-              <a:t>30.03.2019</a:t>
+              <a:t>12.01.2020</a:t>
             </a:fld>
             <a:endParaRPr lang="cs-CZ"/>
           </a:p>
@@ -9272,7 +9272,7 @@
           <a:p>
             <a:fld id="{4AAD347D-5ACD-4C99-B74B-A9C85AD731AF}" type="datetimeFigureOut">
               <a:rPr lang="en-US" smtClean="0"/>
-              <a:t>2019-03-30</a:t>
+              <a:t>1/12/2020</a:t>
             </a:fld>
             <a:endParaRPr lang="en-US" dirty="0"/>
           </a:p>
@@ -9479,7 +9479,7 @@
           <a:p>
             <a:fld id="{4509A250-FF31-4206-8172-F9D3106AACB1}" type="datetimeFigureOut">
               <a:rPr lang="en-US" smtClean="0"/>
-              <a:t>2019-03-30</a:t>
+              <a:t>1/12/2020</a:t>
             </a:fld>
             <a:endParaRPr lang="en-US" dirty="0"/>
           </a:p>
@@ -9659,7 +9659,7 @@
           <a:p>
             <a:fld id="{4509A250-FF31-4206-8172-F9D3106AACB1}" type="datetimeFigureOut">
               <a:rPr lang="en-US" smtClean="0"/>
-              <a:t>2019-03-30</a:t>
+              <a:t>1/12/2020</a:t>
             </a:fld>
             <a:endParaRPr lang="en-US" dirty="0"/>
           </a:p>
@@ -9864,7 +9864,7 @@
           <a:p>
             <a:fld id="{4509A250-FF31-4206-8172-F9D3106AACB1}" type="datetimeFigureOut">
               <a:rPr lang="en-US" smtClean="0"/>
-              <a:t>2019-03-30</a:t>
+              <a:t>1/12/2020</a:t>
             </a:fld>
             <a:endParaRPr lang="en-US" dirty="0"/>
           </a:p>
@@ -18762,7 +18762,7 @@
           <a:p>
             <a:fld id="{9796027F-7875-4030-9381-8BD8C4F21935}" type="datetimeFigureOut">
               <a:rPr lang="en-US" smtClean="0"/>
-              <a:t>2019-03-30</a:t>
+              <a:t>1/12/2020</a:t>
             </a:fld>
             <a:endParaRPr lang="en-US" dirty="0"/>
           </a:p>
@@ -19036,7 +19036,7 @@
           <a:p>
             <a:fld id="{9796027F-7875-4030-9381-8BD8C4F21935}" type="datetimeFigureOut">
               <a:rPr lang="en-US" smtClean="0"/>
-              <a:t>2019-03-30</a:t>
+              <a:t>1/12/2020</a:t>
             </a:fld>
             <a:endParaRPr lang="en-US" dirty="0"/>
           </a:p>
@@ -19434,7 +19434,7 @@
           <a:p>
             <a:fld id="{9796027F-7875-4030-9381-8BD8C4F21935}" type="datetimeFigureOut">
               <a:rPr lang="en-US" smtClean="0"/>
-              <a:t>2019-03-30</a:t>
+              <a:t>1/12/2020</a:t>
             </a:fld>
             <a:endParaRPr lang="en-US" dirty="0"/>
           </a:p>
@@ -19552,7 +19552,7 @@
           <a:p>
             <a:fld id="{4509A250-FF31-4206-8172-F9D3106AACB1}" type="datetimeFigureOut">
               <a:rPr lang="en-US" smtClean="0"/>
-              <a:t>2019-03-30</a:t>
+              <a:t>1/12/2020</a:t>
             </a:fld>
             <a:endParaRPr lang="en-US" dirty="0"/>
           </a:p>
@@ -19647,7 +19647,7 @@
           <a:p>
             <a:fld id="{4509A250-FF31-4206-8172-F9D3106AACB1}" type="datetimeFigureOut">
               <a:rPr lang="en-US" smtClean="0"/>
-              <a:t>2019-03-30</a:t>
+              <a:t>1/12/2020</a:t>
             </a:fld>
             <a:endParaRPr lang="en-US" dirty="0"/>
           </a:p>
@@ -19937,7 +19937,7 @@
           <a:p>
             <a:fld id="{4509A250-FF31-4206-8172-F9D3106AACB1}" type="datetimeFigureOut">
               <a:rPr lang="en-US" smtClean="0"/>
-              <a:t>2019-03-30</a:t>
+              <a:t>1/12/2020</a:t>
             </a:fld>
             <a:endParaRPr lang="en-US" dirty="0"/>
           </a:p>
@@ -20217,7 +20217,7 @@
           <a:p>
             <a:fld id="{4509A250-FF31-4206-8172-F9D3106AACB1}" type="datetimeFigureOut">
               <a:rPr lang="en-US" smtClean="0"/>
-              <a:t>2019-03-30</a:t>
+              <a:t>1/12/2020</a:t>
             </a:fld>
             <a:endParaRPr lang="en-US" dirty="0"/>
           </a:p>
@@ -20467,7 +20467,7 @@
           <a:p>
             <a:fld id="{4AAD347D-5ACD-4C99-B74B-A9C85AD731AF}" type="datetimeFigureOut">
               <a:rPr lang="en-US" smtClean="0"/>
-              <a:t>2019-03-30</a:t>
+              <a:t>1/12/2020</a:t>
             </a:fld>
             <a:endParaRPr lang="en-US" dirty="0"/>
           </a:p>
@@ -22784,7 +22784,92 @@
               <a:rPr lang="en-US" sz="3100" dirty="0"/>
               <a:t>#</a:t>
             </a:r>
-            <a:endParaRPr lang="cs-CZ" sz="3100" dirty="0"/>
+            <a:endParaRPr lang="sk-SK" sz="3100" dirty="0"/>
+          </a:p>
+          <a:p>
+            <a:r>
+              <a:rPr lang="sk-SK" sz="3100" dirty="0" err="1"/>
+              <a:t>Aktuálně</a:t>
+            </a:r>
+            <a:r>
+              <a:rPr lang="sk-SK" sz="3100" dirty="0"/>
+              <a:t> podporuje jenom </a:t>
+            </a:r>
+            <a:r>
+              <a:rPr lang="sk-SK" sz="3100" dirty="0" err="1"/>
+              <a:t>OpenApi</a:t>
+            </a:r>
+            <a:r>
+              <a:rPr lang="sk-SK" sz="3100" dirty="0"/>
+              <a:t> 2</a:t>
+            </a:r>
+          </a:p>
+          <a:p>
+            <a:pPr lvl="1"/>
+            <a:r>
+              <a:rPr lang="sk-SK" sz="2700" dirty="0"/>
+              <a:t>Je </a:t>
+            </a:r>
+            <a:r>
+              <a:rPr lang="sk-SK" sz="2700" dirty="0" err="1"/>
+              <a:t>potřeba</a:t>
+            </a:r>
+            <a:r>
+              <a:rPr lang="sk-SK" sz="2700" dirty="0"/>
+              <a:t> </a:t>
+            </a:r>
+            <a:r>
+              <a:rPr lang="sk-SK" sz="2700" dirty="0" err="1"/>
+              <a:t>přidat</a:t>
+            </a:r>
+            <a:r>
+              <a:rPr lang="sk-SK" sz="2700" dirty="0"/>
+              <a:t> do </a:t>
+            </a:r>
+            <a:r>
+              <a:rPr lang="sk-SK" sz="2700" dirty="0" err="1"/>
+              <a:t>konfigurace</a:t>
+            </a:r>
+            <a:r>
+              <a:rPr lang="sk-SK" sz="2700" dirty="0"/>
+              <a:t> pro </a:t>
+            </a:r>
+            <a:r>
+              <a:rPr lang="sk-SK" sz="2700" dirty="0" err="1"/>
+              <a:t>Swashbuckle</a:t>
+            </a:r>
+            <a:r>
+              <a:rPr lang="sk-SK" sz="2700" dirty="0"/>
+              <a:t>:</a:t>
+            </a:r>
+          </a:p>
+          <a:p>
+            <a:pPr lvl="2"/>
+            <a:r>
+              <a:rPr lang="sk-SK" dirty="0" err="1"/>
+              <a:t>app.UseSwagger</a:t>
+            </a:r>
+            <a:r>
+              <a:rPr lang="sk-SK" dirty="0"/>
+              <a:t>(</a:t>
+            </a:r>
+            <a:r>
+              <a:rPr lang="sk-SK" dirty="0" err="1"/>
+              <a:t>options</a:t>
+            </a:r>
+            <a:r>
+              <a:rPr lang="sk-SK" dirty="0"/>
+              <a:t> =&gt; options.SerializeAsV2 = </a:t>
+            </a:r>
+            <a:r>
+              <a:rPr lang="sk-SK" dirty="0" err="1"/>
+              <a:t>true</a:t>
+            </a:r>
+            <a:r>
+              <a:rPr lang="sk-SK" dirty="0"/>
+              <a:t>);</a:t>
+            </a:r>
+            <a:endParaRPr lang="cs-CZ" sz="2300" dirty="0"/>
           </a:p>
           <a:p>
             <a:endParaRPr lang="en-US" sz="3100" dirty="0"/>
@@ -22940,6 +23025,117 @@
                                           <p:spTgt spid="3">
                                             <p:txEl>
                                               <p:pRg st="2" end="2"/>
+                                            </p:txEl>
+                                          </p:spTgt>
+                                        </p:tgtEl>
+                                        <p:attrNameLst>
+                                          <p:attrName>style.visibility</p:attrName>
+                                        </p:attrNameLst>
+                                      </p:cBhvr>
+                                      <p:to>
+                                        <p:strVal val="visible"/>
+                                      </p:to>
+                                    </p:set>
+                                  </p:childTnLst>
+                                </p:cTn>
+                              </p:par>
+                            </p:childTnLst>
+                          </p:cTn>
+                        </p:par>
+                      </p:childTnLst>
+                    </p:cTn>
+                  </p:par>
+                  <p:par>
+                    <p:cTn id="15" fill="hold">
+                      <p:stCondLst>
+                        <p:cond delay="indefinite"/>
+                      </p:stCondLst>
+                      <p:childTnLst>
+                        <p:par>
+                          <p:cTn id="16" fill="hold">
+                            <p:stCondLst>
+                              <p:cond delay="0"/>
+                            </p:stCondLst>
+                            <p:childTnLst>
+                              <p:par>
+                                <p:cTn id="17" presetID="1" presetClass="entr" presetSubtype="0" fill="hold" grpId="0" nodeType="clickEffect">
+                                  <p:stCondLst>
+                                    <p:cond delay="0"/>
+                                  </p:stCondLst>
+                                  <p:childTnLst>
+                                    <p:set>
+                                      <p:cBhvr>
+                                        <p:cTn id="18" dur="1" fill="hold">
+                                          <p:stCondLst>
+                                            <p:cond delay="0"/>
+                                          </p:stCondLst>
+                                        </p:cTn>
+                                        <p:tgtEl>
+                                          <p:spTgt spid="3">
+                                            <p:txEl>
+                                              <p:pRg st="3" end="3"/>
+                                            </p:txEl>
+                                          </p:spTgt>
+                                        </p:tgtEl>
+                                        <p:attrNameLst>
+                                          <p:attrName>style.visibility</p:attrName>
+                                        </p:attrNameLst>
+                                      </p:cBhvr>
+                                      <p:to>
+                                        <p:strVal val="visible"/>
+                                      </p:to>
+                                    </p:set>
+                                  </p:childTnLst>
+                                </p:cTn>
+                              </p:par>
+                              <p:par>
+                                <p:cTn id="19" presetID="1" presetClass="entr" presetSubtype="0" fill="hold" grpId="0" nodeType="withEffect">
+                                  <p:stCondLst>
+                                    <p:cond delay="0"/>
+                                  </p:stCondLst>
+                                  <p:childTnLst>
+                                    <p:set>
+                                      <p:cBhvr>
+                                        <p:cTn id="20" dur="1" fill="hold">
+                                          <p:stCondLst>
+                                            <p:cond delay="0"/>
+                                          </p:stCondLst>
+                                        </p:cTn>
+                                        <p:tgtEl>
+                                          <p:spTgt spid="3">
+                                            <p:txEl>
+                                              <p:pRg st="4" end="4"/>
+                                            </p:txEl>
+                                          </p:spTgt>
+                                        </p:tgtEl>
+                                        <p:attrNameLst>
+                                          <p:attrName>style.visibility</p:attrName>
+                                        </p:attrNameLst>
+                                      </p:cBhvr>
+                                      <p:to>
+                                        <p:strVal val="visible"/>
+                                      </p:to>
+                                    </p:set>
+                                  </p:childTnLst>
+                                </p:cTn>
+                              </p:par>
+                              <p:par>
+                                <p:cTn id="21" presetID="1" presetClass="entr" presetSubtype="0" fill="hold" grpId="0" nodeType="withEffect">
+                                  <p:stCondLst>
+                                    <p:cond delay="0"/>
+                                  </p:stCondLst>
+                                  <p:childTnLst>
+                                    <p:set>
+                                      <p:cBhvr>
+                                        <p:cTn id="22" dur="1" fill="hold">
+                                          <p:stCondLst>
+                                            <p:cond delay="0"/>
+                                          </p:stCondLst>
+                                        </p:cTn>
+                                        <p:tgtEl>
+                                          <p:spTgt spid="3">
+                                            <p:txEl>
+                                              <p:pRg st="5" end="5"/>
                                             </p:txEl>
                                           </p:spTgt>
                                         </p:tgtEl>
@@ -25955,7 +26151,7 @@
                 </a:solidFill>
                 <a:latin typeface="Consolas" panose="020B0609020204030204" pitchFamily="49" charset="0"/>
               </a:rPr>
-              <a:t>"IW5 API"</a:t>
+              <a:t>"PV239_06 API"</a:t>
             </a:r>
             <a:r>
               <a:rPr lang="cs-CZ" sz="1500" dirty="0">

</xml_diff>

<commit_message>
Lab 06 - Switched working with OpenAPI from Swashbuckle/AutoRest to NSwag. Added NSwagStudio configuration file. Updated presentation. Lab 05 - Added resource dictionaries
</commit_message>
<xml_diff>
--- a/06_API/PV239-Xamarin-06_API.pptx
+++ b/06_API/PV239-Xamarin-06_API.pptx
@@ -13,16 +13,16 @@
     <p:sldId id="259" r:id="rId4"/>
     <p:sldId id="260" r:id="rId5"/>
     <p:sldId id="261" r:id="rId6"/>
-    <p:sldId id="262" r:id="rId7"/>
-    <p:sldId id="263" r:id="rId8"/>
-    <p:sldId id="264" r:id="rId9"/>
+    <p:sldId id="296" r:id="rId7"/>
+    <p:sldId id="297" r:id="rId8"/>
+    <p:sldId id="298" r:id="rId9"/>
     <p:sldId id="270" r:id="rId10"/>
     <p:sldId id="265" r:id="rId11"/>
     <p:sldId id="269" r:id="rId12"/>
     <p:sldId id="268" r:id="rId13"/>
     <p:sldId id="267" r:id="rId14"/>
-    <p:sldId id="271" r:id="rId15"/>
-    <p:sldId id="266" r:id="rId16"/>
+    <p:sldId id="266" r:id="rId15"/>
+    <p:sldId id="299" r:id="rId16"/>
   </p:sldIdLst>
   <p:sldSz cx="12192000" cy="6858000"/>
   <p:notesSz cx="6858000" cy="9144000"/>
@@ -211,7 +211,7 @@
           <a:p>
             <a:fld id="{48A795E8-66B5-4696-B483-F1F9FA0B53D4}" type="datetimeFigureOut">
               <a:rPr lang="cs-CZ" smtClean="0"/>
-              <a:t>12.01.2020</a:t>
+              <a:t>26.03.2020</a:t>
             </a:fld>
             <a:endParaRPr lang="cs-CZ"/>
           </a:p>
@@ -9272,7 +9272,7 @@
           <a:p>
             <a:fld id="{4AAD347D-5ACD-4C99-B74B-A9C85AD731AF}" type="datetimeFigureOut">
               <a:rPr lang="en-US" smtClean="0"/>
-              <a:t>1/12/2020</a:t>
+              <a:t>3/26/2020</a:t>
             </a:fld>
             <a:endParaRPr lang="en-US" dirty="0"/>
           </a:p>
@@ -9479,7 +9479,7 @@
           <a:p>
             <a:fld id="{4509A250-FF31-4206-8172-F9D3106AACB1}" type="datetimeFigureOut">
               <a:rPr lang="en-US" smtClean="0"/>
-              <a:t>1/12/2020</a:t>
+              <a:t>3/26/2020</a:t>
             </a:fld>
             <a:endParaRPr lang="en-US" dirty="0"/>
           </a:p>
@@ -9659,7 +9659,7 @@
           <a:p>
             <a:fld id="{4509A250-FF31-4206-8172-F9D3106AACB1}" type="datetimeFigureOut">
               <a:rPr lang="en-US" smtClean="0"/>
-              <a:t>1/12/2020</a:t>
+              <a:t>3/26/2020</a:t>
             </a:fld>
             <a:endParaRPr lang="en-US" dirty="0"/>
           </a:p>
@@ -9864,7 +9864,7 @@
           <a:p>
             <a:fld id="{4509A250-FF31-4206-8172-F9D3106AACB1}" type="datetimeFigureOut">
               <a:rPr lang="en-US" smtClean="0"/>
-              <a:t>1/12/2020</a:t>
+              <a:t>3/26/2020</a:t>
             </a:fld>
             <a:endParaRPr lang="en-US" dirty="0"/>
           </a:p>
@@ -18762,7 +18762,7 @@
           <a:p>
             <a:fld id="{9796027F-7875-4030-9381-8BD8C4F21935}" type="datetimeFigureOut">
               <a:rPr lang="en-US" smtClean="0"/>
-              <a:t>1/12/2020</a:t>
+              <a:t>3/26/2020</a:t>
             </a:fld>
             <a:endParaRPr lang="en-US" dirty="0"/>
           </a:p>
@@ -19036,7 +19036,7 @@
           <a:p>
             <a:fld id="{9796027F-7875-4030-9381-8BD8C4F21935}" type="datetimeFigureOut">
               <a:rPr lang="en-US" smtClean="0"/>
-              <a:t>1/12/2020</a:t>
+              <a:t>3/26/2020</a:t>
             </a:fld>
             <a:endParaRPr lang="en-US" dirty="0"/>
           </a:p>
@@ -19434,7 +19434,7 @@
           <a:p>
             <a:fld id="{9796027F-7875-4030-9381-8BD8C4F21935}" type="datetimeFigureOut">
               <a:rPr lang="en-US" smtClean="0"/>
-              <a:t>1/12/2020</a:t>
+              <a:t>3/26/2020</a:t>
             </a:fld>
             <a:endParaRPr lang="en-US" dirty="0"/>
           </a:p>
@@ -19552,7 +19552,7 @@
           <a:p>
             <a:fld id="{4509A250-FF31-4206-8172-F9D3106AACB1}" type="datetimeFigureOut">
               <a:rPr lang="en-US" smtClean="0"/>
-              <a:t>1/12/2020</a:t>
+              <a:t>3/26/2020</a:t>
             </a:fld>
             <a:endParaRPr lang="en-US" dirty="0"/>
           </a:p>
@@ -19647,7 +19647,7 @@
           <a:p>
             <a:fld id="{4509A250-FF31-4206-8172-F9D3106AACB1}" type="datetimeFigureOut">
               <a:rPr lang="en-US" smtClean="0"/>
-              <a:t>1/12/2020</a:t>
+              <a:t>3/26/2020</a:t>
             </a:fld>
             <a:endParaRPr lang="en-US" dirty="0"/>
           </a:p>
@@ -19937,7 +19937,7 @@
           <a:p>
             <a:fld id="{4509A250-FF31-4206-8172-F9D3106AACB1}" type="datetimeFigureOut">
               <a:rPr lang="en-US" smtClean="0"/>
-              <a:t>1/12/2020</a:t>
+              <a:t>3/26/2020</a:t>
             </a:fld>
             <a:endParaRPr lang="en-US" dirty="0"/>
           </a:p>
@@ -20217,7 +20217,7 @@
           <a:p>
             <a:fld id="{4509A250-FF31-4206-8172-F9D3106AACB1}" type="datetimeFigureOut">
               <a:rPr lang="en-US" smtClean="0"/>
-              <a:t>1/12/2020</a:t>
+              <a:t>3/26/2020</a:t>
             </a:fld>
             <a:endParaRPr lang="en-US" dirty="0"/>
           </a:p>
@@ -20467,7 +20467,7 @@
           <a:p>
             <a:fld id="{4AAD347D-5ACD-4C99-B74B-A9C85AD731AF}" type="datetimeFigureOut">
               <a:rPr lang="en-US" smtClean="0"/>
-              <a:t>1/12/2020</a:t>
+              <a:t>3/26/2020</a:t>
             </a:fld>
             <a:endParaRPr lang="en-US" dirty="0"/>
           </a:p>
@@ -21976,19 +21976,11 @@
             <a:pPr lvl="1"/>
             <a:r>
               <a:rPr lang="cs-CZ" dirty="0"/>
-              <a:t>Zrušit „</a:t>
+              <a:t>Nastavit </a:t>
             </a:r>
             <a:r>
               <a:rPr lang="cs-CZ" dirty="0" err="1"/>
-              <a:t>Generate</a:t>
-            </a:r>
-            <a:r>
-              <a:rPr lang="cs-CZ" dirty="0"/>
-              <a:t> data </a:t>
-            </a:r>
-            <a:r>
-              <a:rPr lang="cs-CZ" dirty="0" err="1"/>
-              <a:t>annotation</a:t>
+              <a:t>Operation</a:t>
             </a:r>
             <a:r>
               <a:rPr lang="cs-CZ" dirty="0"/>
@@ -21996,11 +21988,11 @@
             </a:r>
             <a:r>
               <a:rPr lang="cs-CZ" dirty="0" err="1"/>
-              <a:t>attributes</a:t>
+              <a:t>Generation</a:t>
             </a:r>
             <a:r>
               <a:rPr lang="cs-CZ" dirty="0"/>
-              <a:t>“</a:t>
+              <a:t> Mode</a:t>
             </a:r>
           </a:p>
           <a:p>
@@ -23206,685 +23198,6 @@
           <p:cNvPr id="2" name="Title 1">
             <a:extLst>
               <a:ext uri="{FF2B5EF4-FFF2-40B4-BE49-F238E27FC236}">
-                <a16:creationId xmlns:a16="http://schemas.microsoft.com/office/drawing/2014/main" id="{AEFA8F48-E638-4189-B76D-0048E3292073}"/>
-              </a:ext>
-            </a:extLst>
-          </p:cNvPr>
-          <p:cNvSpPr>
-            <a:spLocks noGrp="1"/>
-          </p:cNvSpPr>
-          <p:nvPr>
-            <p:ph type="title"/>
-          </p:nvPr>
-        </p:nvSpPr>
-        <p:spPr/>
-        <p:txBody>
-          <a:bodyPr/>
-          <a:lstStyle/>
-          <a:p>
-            <a:r>
-              <a:rPr lang="cs-CZ" dirty="0"/>
-              <a:t>Anotace</a:t>
-            </a:r>
-          </a:p>
-        </p:txBody>
-      </p:sp>
-      <p:sp>
-        <p:nvSpPr>
-          <p:cNvPr id="3" name="Content Placeholder 2">
-            <a:extLst>
-              <a:ext uri="{FF2B5EF4-FFF2-40B4-BE49-F238E27FC236}">
-                <a16:creationId xmlns:a16="http://schemas.microsoft.com/office/drawing/2014/main" id="{051CE980-3C31-4BD1-AA4B-F91B8E964520}"/>
-              </a:ext>
-            </a:extLst>
-          </p:cNvPr>
-          <p:cNvSpPr>
-            <a:spLocks noGrp="1"/>
-          </p:cNvSpPr>
-          <p:nvPr>
-            <p:ph idx="1"/>
-          </p:nvPr>
-        </p:nvSpPr>
-        <p:spPr/>
-        <p:txBody>
-          <a:bodyPr/>
-          <a:lstStyle/>
-          <a:p>
-            <a:r>
-              <a:rPr lang="cs-CZ" dirty="0"/>
-              <a:t>Přidat Nuget balíček </a:t>
-            </a:r>
-            <a:r>
-              <a:rPr lang="cs-CZ" b="1" dirty="0" err="1"/>
-              <a:t>Swashbuckle.AspNetCore.Annotations</a:t>
-            </a:r>
-            <a:endParaRPr lang="cs-CZ" b="1" dirty="0"/>
-          </a:p>
-          <a:p>
-            <a:r>
-              <a:rPr lang="cs-CZ" dirty="0"/>
-              <a:t>Povolit anotace v konfiguraci:</a:t>
-            </a:r>
-          </a:p>
-          <a:p>
-            <a:endParaRPr lang="cs-CZ" dirty="0"/>
-          </a:p>
-          <a:p>
-            <a:r>
-              <a:rPr lang="cs-CZ" dirty="0"/>
-              <a:t>Příklady anotací:</a:t>
-            </a:r>
-          </a:p>
-        </p:txBody>
-      </p:sp>
-      <p:sp>
-        <p:nvSpPr>
-          <p:cNvPr id="4" name="Rectangle 3">
-            <a:extLst>
-              <a:ext uri="{FF2B5EF4-FFF2-40B4-BE49-F238E27FC236}">
-                <a16:creationId xmlns:a16="http://schemas.microsoft.com/office/drawing/2014/main" id="{5519A96F-A32F-4D92-AF1A-B96EFCECFD5C}"/>
-              </a:ext>
-            </a:extLst>
-          </p:cNvPr>
-          <p:cNvSpPr/>
-          <p:nvPr/>
-        </p:nvSpPr>
-        <p:spPr>
-          <a:xfrm>
-            <a:off x="2286000" y="4533900"/>
-            <a:ext cx="7239000" cy="369332"/>
-          </a:xfrm>
-          <a:prstGeom prst="rect">
-            <a:avLst/>
-          </a:prstGeom>
-        </p:spPr>
-        <p:txBody>
-          <a:bodyPr wrap="square">
-            <a:spAutoFit/>
-          </a:bodyPr>
-          <a:lstStyle/>
-          <a:p>
-            <a:r>
-              <a:rPr lang="cs-CZ" dirty="0">
-                <a:solidFill>
-                  <a:srgbClr val="000000"/>
-                </a:solidFill>
-                <a:latin typeface="Consolas" panose="020B0609020204030204" pitchFamily="49" charset="0"/>
-              </a:rPr>
-              <a:t>[</a:t>
-            </a:r>
-            <a:r>
-              <a:rPr lang="cs-CZ" dirty="0" err="1">
-                <a:solidFill>
-                  <a:srgbClr val="000000"/>
-                </a:solidFill>
-                <a:latin typeface="Consolas" panose="020B0609020204030204" pitchFamily="49" charset="0"/>
-              </a:rPr>
-              <a:t>SwaggerOperation</a:t>
-            </a:r>
-            <a:r>
-              <a:rPr lang="cs-CZ" dirty="0">
-                <a:solidFill>
-                  <a:srgbClr val="000000"/>
-                </a:solidFill>
-                <a:latin typeface="Consolas" panose="020B0609020204030204" pitchFamily="49" charset="0"/>
-              </a:rPr>
-              <a:t>(</a:t>
-            </a:r>
-            <a:r>
-              <a:rPr lang="cs-CZ" dirty="0" err="1">
-                <a:solidFill>
-                  <a:srgbClr val="000000"/>
-                </a:solidFill>
-                <a:latin typeface="Consolas" panose="020B0609020204030204" pitchFamily="49" charset="0"/>
-              </a:rPr>
-              <a:t>OperationId</a:t>
-            </a:r>
-            <a:r>
-              <a:rPr lang="cs-CZ" dirty="0">
-                <a:solidFill>
-                  <a:srgbClr val="000000"/>
-                </a:solidFill>
-                <a:latin typeface="Consolas" panose="020B0609020204030204" pitchFamily="49" charset="0"/>
-              </a:rPr>
-              <a:t> = </a:t>
-            </a:r>
-            <a:r>
-              <a:rPr lang="cs-CZ" dirty="0">
-                <a:solidFill>
-                  <a:srgbClr val="A31515"/>
-                </a:solidFill>
-                <a:latin typeface="Consolas" panose="020B0609020204030204" pitchFamily="49" charset="0"/>
-              </a:rPr>
-              <a:t>"</a:t>
-            </a:r>
-            <a:r>
-              <a:rPr lang="cs-CZ" dirty="0" err="1">
-                <a:solidFill>
-                  <a:srgbClr val="A31515"/>
-                </a:solidFill>
-                <a:latin typeface="Consolas" panose="020B0609020204030204" pitchFamily="49" charset="0"/>
-              </a:rPr>
-              <a:t>RecipesGetAllItems</a:t>
-            </a:r>
-            <a:r>
-              <a:rPr lang="cs-CZ" dirty="0">
-                <a:solidFill>
-                  <a:srgbClr val="A31515"/>
-                </a:solidFill>
-                <a:latin typeface="Consolas" panose="020B0609020204030204" pitchFamily="49" charset="0"/>
-              </a:rPr>
-              <a:t>"</a:t>
-            </a:r>
-            <a:r>
-              <a:rPr lang="cs-CZ" dirty="0">
-                <a:solidFill>
-                  <a:srgbClr val="000000"/>
-                </a:solidFill>
-                <a:latin typeface="Consolas" panose="020B0609020204030204" pitchFamily="49" charset="0"/>
-              </a:rPr>
-              <a:t>)]</a:t>
-            </a:r>
-            <a:endParaRPr lang="cs-CZ" dirty="0"/>
-          </a:p>
-        </p:txBody>
-      </p:sp>
-      <p:sp>
-        <p:nvSpPr>
-          <p:cNvPr id="5" name="Rectangle 4">
-            <a:extLst>
-              <a:ext uri="{FF2B5EF4-FFF2-40B4-BE49-F238E27FC236}">
-                <a16:creationId xmlns:a16="http://schemas.microsoft.com/office/drawing/2014/main" id="{4E69CB59-9E61-489E-BF52-2BCC73CA5F02}"/>
-              </a:ext>
-            </a:extLst>
-          </p:cNvPr>
-          <p:cNvSpPr/>
-          <p:nvPr/>
-        </p:nvSpPr>
-        <p:spPr>
-          <a:xfrm>
-            <a:off x="2286000" y="4973840"/>
-            <a:ext cx="6553200" cy="369332"/>
-          </a:xfrm>
-          <a:prstGeom prst="rect">
-            <a:avLst/>
-          </a:prstGeom>
-        </p:spPr>
-        <p:txBody>
-          <a:bodyPr wrap="square">
-            <a:spAutoFit/>
-          </a:bodyPr>
-          <a:lstStyle/>
-          <a:p>
-            <a:r>
-              <a:rPr lang="en-US" dirty="0">
-                <a:solidFill>
-                  <a:srgbClr val="000000"/>
-                </a:solidFill>
-                <a:latin typeface="Consolas" panose="020B0609020204030204" pitchFamily="49" charset="0"/>
-              </a:rPr>
-              <a:t>[</a:t>
-            </a:r>
-            <a:r>
-              <a:rPr lang="en-US" dirty="0" err="1">
-                <a:solidFill>
-                  <a:srgbClr val="000000"/>
-                </a:solidFill>
-                <a:latin typeface="Consolas" panose="020B0609020204030204" pitchFamily="49" charset="0"/>
-              </a:rPr>
-              <a:t>SwaggerResponse</a:t>
-            </a:r>
-            <a:r>
-              <a:rPr lang="en-US" dirty="0">
-                <a:solidFill>
-                  <a:srgbClr val="000000"/>
-                </a:solidFill>
-                <a:latin typeface="Consolas" panose="020B0609020204030204" pitchFamily="49" charset="0"/>
-              </a:rPr>
-              <a:t>(200, Type = </a:t>
-            </a:r>
-            <a:r>
-              <a:rPr lang="en-US" dirty="0" err="1">
-                <a:solidFill>
-                  <a:srgbClr val="0000FF"/>
-                </a:solidFill>
-                <a:latin typeface="Consolas" panose="020B0609020204030204" pitchFamily="49" charset="0"/>
-              </a:rPr>
-              <a:t>typeof</a:t>
-            </a:r>
-            <a:r>
-              <a:rPr lang="en-US" dirty="0">
-                <a:solidFill>
-                  <a:srgbClr val="000000"/>
-                </a:solidFill>
-                <a:latin typeface="Consolas" panose="020B0609020204030204" pitchFamily="49" charset="0"/>
-              </a:rPr>
-              <a:t>(</a:t>
-            </a:r>
-            <a:r>
-              <a:rPr lang="en-US" dirty="0" err="1">
-                <a:solidFill>
-                  <a:srgbClr val="000000"/>
-                </a:solidFill>
-                <a:latin typeface="Consolas" panose="020B0609020204030204" pitchFamily="49" charset="0"/>
-              </a:rPr>
-              <a:t>RecipeModel</a:t>
-            </a:r>
-            <a:r>
-              <a:rPr lang="en-US" dirty="0">
-                <a:solidFill>
-                  <a:srgbClr val="000000"/>
-                </a:solidFill>
-                <a:latin typeface="Consolas" panose="020B0609020204030204" pitchFamily="49" charset="0"/>
-              </a:rPr>
-              <a:t>))]</a:t>
-            </a:r>
-            <a:endParaRPr lang="cs-CZ" dirty="0"/>
-          </a:p>
-        </p:txBody>
-      </p:sp>
-      <p:sp>
-        <p:nvSpPr>
-          <p:cNvPr id="6" name="Rectangle 5">
-            <a:extLst>
-              <a:ext uri="{FF2B5EF4-FFF2-40B4-BE49-F238E27FC236}">
-                <a16:creationId xmlns:a16="http://schemas.microsoft.com/office/drawing/2014/main" id="{C000C8F8-7E3A-4953-94B2-E04069FA6DD5}"/>
-              </a:ext>
-            </a:extLst>
-          </p:cNvPr>
-          <p:cNvSpPr/>
-          <p:nvPr/>
-        </p:nvSpPr>
-        <p:spPr>
-          <a:xfrm>
-            <a:off x="2286000" y="3244334"/>
-            <a:ext cx="3730508" cy="369332"/>
-          </a:xfrm>
-          <a:prstGeom prst="rect">
-            <a:avLst/>
-          </a:prstGeom>
-        </p:spPr>
-        <p:txBody>
-          <a:bodyPr wrap="none">
-            <a:spAutoFit/>
-          </a:bodyPr>
-          <a:lstStyle/>
-          <a:p>
-            <a:r>
-              <a:rPr lang="cs-CZ" dirty="0" err="1">
-                <a:solidFill>
-                  <a:srgbClr val="000000"/>
-                </a:solidFill>
-                <a:latin typeface="Consolas" panose="020B0609020204030204" pitchFamily="49" charset="0"/>
-              </a:rPr>
-              <a:t>options.EnableAnnotations</a:t>
-            </a:r>
-            <a:r>
-              <a:rPr lang="cs-CZ" dirty="0">
-                <a:solidFill>
-                  <a:srgbClr val="000000"/>
-                </a:solidFill>
-                <a:latin typeface="Consolas" panose="020B0609020204030204" pitchFamily="49" charset="0"/>
-              </a:rPr>
-              <a:t>();</a:t>
-            </a:r>
-            <a:endParaRPr lang="cs-CZ" dirty="0"/>
-          </a:p>
-        </p:txBody>
-      </p:sp>
-    </p:spTree>
-    <p:extLst>
-      <p:ext uri="{BB962C8B-B14F-4D97-AF65-F5344CB8AC3E}">
-        <p14:creationId xmlns:p14="http://schemas.microsoft.com/office/powerpoint/2010/main" val="518038237"/>
-      </p:ext>
-    </p:extLst>
-  </p:cSld>
-  <p:clrMapOvr>
-    <a:masterClrMapping/>
-  </p:clrMapOvr>
-  <p:timing>
-    <p:tnLst>
-      <p:par>
-        <p:cTn id="1" dur="indefinite" restart="never" nodeType="tmRoot">
-          <p:childTnLst>
-            <p:seq concurrent="1" nextAc="seek">
-              <p:cTn id="2" dur="indefinite" nodeType="mainSeq">
-                <p:childTnLst>
-                  <p:par>
-                    <p:cTn id="3" fill="hold">
-                      <p:stCondLst>
-                        <p:cond delay="indefinite"/>
-                      </p:stCondLst>
-                      <p:childTnLst>
-                        <p:par>
-                          <p:cTn id="4" fill="hold">
-                            <p:stCondLst>
-                              <p:cond delay="0"/>
-                            </p:stCondLst>
-                            <p:childTnLst>
-                              <p:par>
-                                <p:cTn id="5" presetID="1" presetClass="entr" presetSubtype="0" fill="hold" grpId="0" nodeType="clickEffect">
-                                  <p:stCondLst>
-                                    <p:cond delay="0"/>
-                                  </p:stCondLst>
-                                  <p:childTnLst>
-                                    <p:set>
-                                      <p:cBhvr>
-                                        <p:cTn id="6" dur="1" fill="hold">
-                                          <p:stCondLst>
-                                            <p:cond delay="0"/>
-                                          </p:stCondLst>
-                                        </p:cTn>
-                                        <p:tgtEl>
-                                          <p:spTgt spid="3">
-                                            <p:txEl>
-                                              <p:pRg st="0" end="0"/>
-                                            </p:txEl>
-                                          </p:spTgt>
-                                        </p:tgtEl>
-                                        <p:attrNameLst>
-                                          <p:attrName>style.visibility</p:attrName>
-                                        </p:attrNameLst>
-                                      </p:cBhvr>
-                                      <p:to>
-                                        <p:strVal val="visible"/>
-                                      </p:to>
-                                    </p:set>
-                                  </p:childTnLst>
-                                </p:cTn>
-                              </p:par>
-                            </p:childTnLst>
-                          </p:cTn>
-                        </p:par>
-                      </p:childTnLst>
-                    </p:cTn>
-                  </p:par>
-                  <p:par>
-                    <p:cTn id="7" fill="hold">
-                      <p:stCondLst>
-                        <p:cond delay="indefinite"/>
-                      </p:stCondLst>
-                      <p:childTnLst>
-                        <p:par>
-                          <p:cTn id="8" fill="hold">
-                            <p:stCondLst>
-                              <p:cond delay="0"/>
-                            </p:stCondLst>
-                            <p:childTnLst>
-                              <p:par>
-                                <p:cTn id="9" presetID="1" presetClass="entr" presetSubtype="0" fill="hold" grpId="0" nodeType="clickEffect">
-                                  <p:stCondLst>
-                                    <p:cond delay="0"/>
-                                  </p:stCondLst>
-                                  <p:childTnLst>
-                                    <p:set>
-                                      <p:cBhvr>
-                                        <p:cTn id="10" dur="1" fill="hold">
-                                          <p:stCondLst>
-                                            <p:cond delay="0"/>
-                                          </p:stCondLst>
-                                        </p:cTn>
-                                        <p:tgtEl>
-                                          <p:spTgt spid="3">
-                                            <p:txEl>
-                                              <p:pRg st="1" end="1"/>
-                                            </p:txEl>
-                                          </p:spTgt>
-                                        </p:tgtEl>
-                                        <p:attrNameLst>
-                                          <p:attrName>style.visibility</p:attrName>
-                                        </p:attrNameLst>
-                                      </p:cBhvr>
-                                      <p:to>
-                                        <p:strVal val="visible"/>
-                                      </p:to>
-                                    </p:set>
-                                  </p:childTnLst>
-                                </p:cTn>
-                              </p:par>
-                            </p:childTnLst>
-                          </p:cTn>
-                        </p:par>
-                      </p:childTnLst>
-                    </p:cTn>
-                  </p:par>
-                  <p:par>
-                    <p:cTn id="11" fill="hold">
-                      <p:stCondLst>
-                        <p:cond delay="indefinite"/>
-                      </p:stCondLst>
-                      <p:childTnLst>
-                        <p:par>
-                          <p:cTn id="12" fill="hold">
-                            <p:stCondLst>
-                              <p:cond delay="0"/>
-                            </p:stCondLst>
-                            <p:childTnLst>
-                              <p:par>
-                                <p:cTn id="13" presetID="1" presetClass="entr" presetSubtype="0" fill="hold" grpId="0" nodeType="clickEffect">
-                                  <p:stCondLst>
-                                    <p:cond delay="0"/>
-                                  </p:stCondLst>
-                                  <p:childTnLst>
-                                    <p:set>
-                                      <p:cBhvr>
-                                        <p:cTn id="14" dur="1" fill="hold">
-                                          <p:stCondLst>
-                                            <p:cond delay="0"/>
-                                          </p:stCondLst>
-                                        </p:cTn>
-                                        <p:tgtEl>
-                                          <p:spTgt spid="6"/>
-                                        </p:tgtEl>
-                                        <p:attrNameLst>
-                                          <p:attrName>style.visibility</p:attrName>
-                                        </p:attrNameLst>
-                                      </p:cBhvr>
-                                      <p:to>
-                                        <p:strVal val="visible"/>
-                                      </p:to>
-                                    </p:set>
-                                  </p:childTnLst>
-                                </p:cTn>
-                              </p:par>
-                            </p:childTnLst>
-                          </p:cTn>
-                        </p:par>
-                      </p:childTnLst>
-                    </p:cTn>
-                  </p:par>
-                  <p:par>
-                    <p:cTn id="15" fill="hold">
-                      <p:stCondLst>
-                        <p:cond delay="indefinite"/>
-                      </p:stCondLst>
-                      <p:childTnLst>
-                        <p:par>
-                          <p:cTn id="16" fill="hold">
-                            <p:stCondLst>
-                              <p:cond delay="0"/>
-                            </p:stCondLst>
-                            <p:childTnLst>
-                              <p:par>
-                                <p:cTn id="17" presetID="1" presetClass="entr" presetSubtype="0" fill="hold" grpId="0" nodeType="clickEffect">
-                                  <p:stCondLst>
-                                    <p:cond delay="0"/>
-                                  </p:stCondLst>
-                                  <p:childTnLst>
-                                    <p:set>
-                                      <p:cBhvr>
-                                        <p:cTn id="18" dur="1" fill="hold">
-                                          <p:stCondLst>
-                                            <p:cond delay="0"/>
-                                          </p:stCondLst>
-                                        </p:cTn>
-                                        <p:tgtEl>
-                                          <p:spTgt spid="3">
-                                            <p:txEl>
-                                              <p:pRg st="3" end="3"/>
-                                            </p:txEl>
-                                          </p:spTgt>
-                                        </p:tgtEl>
-                                        <p:attrNameLst>
-                                          <p:attrName>style.visibility</p:attrName>
-                                        </p:attrNameLst>
-                                      </p:cBhvr>
-                                      <p:to>
-                                        <p:strVal val="visible"/>
-                                      </p:to>
-                                    </p:set>
-                                  </p:childTnLst>
-                                </p:cTn>
-                              </p:par>
-                            </p:childTnLst>
-                          </p:cTn>
-                        </p:par>
-                      </p:childTnLst>
-                    </p:cTn>
-                  </p:par>
-                  <p:par>
-                    <p:cTn id="19" fill="hold">
-                      <p:stCondLst>
-                        <p:cond delay="indefinite"/>
-                      </p:stCondLst>
-                      <p:childTnLst>
-                        <p:par>
-                          <p:cTn id="20" fill="hold">
-                            <p:stCondLst>
-                              <p:cond delay="0"/>
-                            </p:stCondLst>
-                            <p:childTnLst>
-                              <p:par>
-                                <p:cTn id="21" presetID="1" presetClass="entr" presetSubtype="0" fill="hold" grpId="0" nodeType="clickEffect">
-                                  <p:stCondLst>
-                                    <p:cond delay="0"/>
-                                  </p:stCondLst>
-                                  <p:childTnLst>
-                                    <p:set>
-                                      <p:cBhvr>
-                                        <p:cTn id="22" dur="1" fill="hold">
-                                          <p:stCondLst>
-                                            <p:cond delay="0"/>
-                                          </p:stCondLst>
-                                        </p:cTn>
-                                        <p:tgtEl>
-                                          <p:spTgt spid="4"/>
-                                        </p:tgtEl>
-                                        <p:attrNameLst>
-                                          <p:attrName>style.visibility</p:attrName>
-                                        </p:attrNameLst>
-                                      </p:cBhvr>
-                                      <p:to>
-                                        <p:strVal val="visible"/>
-                                      </p:to>
-                                    </p:set>
-                                  </p:childTnLst>
-                                </p:cTn>
-                              </p:par>
-                            </p:childTnLst>
-                          </p:cTn>
-                        </p:par>
-                      </p:childTnLst>
-                    </p:cTn>
-                  </p:par>
-                  <p:par>
-                    <p:cTn id="23" fill="hold">
-                      <p:stCondLst>
-                        <p:cond delay="indefinite"/>
-                      </p:stCondLst>
-                      <p:childTnLst>
-                        <p:par>
-                          <p:cTn id="24" fill="hold">
-                            <p:stCondLst>
-                              <p:cond delay="0"/>
-                            </p:stCondLst>
-                            <p:childTnLst>
-                              <p:par>
-                                <p:cTn id="25" presetID="1" presetClass="entr" presetSubtype="0" fill="hold" grpId="0" nodeType="clickEffect">
-                                  <p:stCondLst>
-                                    <p:cond delay="0"/>
-                                  </p:stCondLst>
-                                  <p:childTnLst>
-                                    <p:set>
-                                      <p:cBhvr>
-                                        <p:cTn id="26" dur="1" fill="hold">
-                                          <p:stCondLst>
-                                            <p:cond delay="0"/>
-                                          </p:stCondLst>
-                                        </p:cTn>
-                                        <p:tgtEl>
-                                          <p:spTgt spid="5"/>
-                                        </p:tgtEl>
-                                        <p:attrNameLst>
-                                          <p:attrName>style.visibility</p:attrName>
-                                        </p:attrNameLst>
-                                      </p:cBhvr>
-                                      <p:to>
-                                        <p:strVal val="visible"/>
-                                      </p:to>
-                                    </p:set>
-                                  </p:childTnLst>
-                                </p:cTn>
-                              </p:par>
-                            </p:childTnLst>
-                          </p:cTn>
-                        </p:par>
-                      </p:childTnLst>
-                    </p:cTn>
-                  </p:par>
-                </p:childTnLst>
-              </p:cTn>
-              <p:prevCondLst>
-                <p:cond evt="onPrev" delay="0">
-                  <p:tgtEl>
-                    <p:sldTgt/>
-                  </p:tgtEl>
-                </p:cond>
-              </p:prevCondLst>
-              <p:nextCondLst>
-                <p:cond evt="onNext" delay="0">
-                  <p:tgtEl>
-                    <p:sldTgt/>
-                  </p:tgtEl>
-                </p:cond>
-              </p:nextCondLst>
-            </p:seq>
-          </p:childTnLst>
-        </p:cTn>
-      </p:par>
-    </p:tnLst>
-    <p:bldLst>
-      <p:bldP spid="3" grpId="0" uiExpand="1" build="p"/>
-      <p:bldP spid="4" grpId="0"/>
-      <p:bldP spid="5" grpId="0"/>
-      <p:bldP spid="6" grpId="0"/>
-    </p:bldLst>
-  </p:timing>
-</p:sld>
-</file>
-
-<file path=ppt/slides/slide15.xml><?xml version="1.0" encoding="utf-8"?>
-<p:sld xmlns:a="http://schemas.openxmlformats.org/drawingml/2006/main" xmlns:r="http://schemas.openxmlformats.org/officeDocument/2006/relationships" xmlns:p="http://schemas.openxmlformats.org/presentationml/2006/main">
-  <p:cSld>
-    <p:spTree>
-      <p:nvGrpSpPr>
-        <p:cNvPr id="1" name=""/>
-        <p:cNvGrpSpPr/>
-        <p:nvPr/>
-      </p:nvGrpSpPr>
-      <p:grpSpPr>
-        <a:xfrm>
-          <a:off x="0" y="0"/>
-          <a:ext cx="0" cy="0"/>
-          <a:chOff x="0" y="0"/>
-          <a:chExt cx="0" cy="0"/>
-        </a:xfrm>
-      </p:grpSpPr>
-      <p:sp>
-        <p:nvSpPr>
-          <p:cNvPr id="2" name="Title 1">
-            <a:extLst>
-              <a:ext uri="{FF2B5EF4-FFF2-40B4-BE49-F238E27FC236}">
                 <a16:creationId xmlns:a16="http://schemas.microsoft.com/office/drawing/2014/main" id="{0AF7965B-77C3-470A-AEFA-37763D2E19B9}"/>
               </a:ext>
             </a:extLst>
@@ -23903,7 +23216,7 @@
           <a:p>
             <a:r>
               <a:rPr lang="cs-CZ" dirty="0"/>
-              <a:t>Filtry</a:t>
+              <a:t>Procesory</a:t>
             </a:r>
           </a:p>
         </p:txBody>
@@ -23944,7 +23257,11 @@
             <a:pPr lvl="1"/>
             <a:r>
               <a:rPr lang="cs-CZ" dirty="0" err="1"/>
-              <a:t>IDocumentFilter</a:t>
+              <a:t>IDocument</a:t>
+            </a:r>
+            <a:r>
+              <a:rPr lang="en-US" dirty="0"/>
+              <a:t>Processor</a:t>
             </a:r>
             <a:r>
               <a:rPr lang="cs-CZ" dirty="0"/>
@@ -23955,7 +23272,11 @@
             <a:pPr lvl="1"/>
             <a:r>
               <a:rPr lang="cs-CZ" dirty="0" err="1"/>
-              <a:t>IOperationFilter</a:t>
+              <a:t>IOperation</a:t>
+            </a:r>
+            <a:r>
+              <a:rPr lang="en-US" dirty="0"/>
+              <a:t>Processor</a:t>
             </a:r>
             <a:r>
               <a:rPr lang="cs-CZ" dirty="0"/>
@@ -23966,7 +23287,11 @@
             <a:pPr lvl="1"/>
             <a:r>
               <a:rPr lang="cs-CZ" dirty="0" err="1"/>
-              <a:t>ISchemaFilter</a:t>
+              <a:t>ISchema</a:t>
+            </a:r>
+            <a:r>
+              <a:rPr lang="en-US" dirty="0"/>
+              <a:t>Processor</a:t>
             </a:r>
             <a:r>
               <a:rPr lang="cs-CZ" dirty="0"/>
@@ -24209,6 +23534,475 @@
       <p:bldP spid="3" grpId="0" build="p"/>
     </p:bldLst>
   </p:timing>
+</p:sld>
+</file>
+
+<file path=ppt/slides/slide15.xml><?xml version="1.0" encoding="utf-8"?>
+<p:sld xmlns:a="http://schemas.openxmlformats.org/drawingml/2006/main" xmlns:r="http://schemas.openxmlformats.org/officeDocument/2006/relationships" xmlns:p="http://schemas.openxmlformats.org/presentationml/2006/main">
+  <p:cSld>
+    <p:spTree>
+      <p:nvGrpSpPr>
+        <p:cNvPr id="1" name=""/>
+        <p:cNvGrpSpPr/>
+        <p:nvPr/>
+      </p:nvGrpSpPr>
+      <p:grpSpPr>
+        <a:xfrm>
+          <a:off x="0" y="0"/>
+          <a:ext cx="0" cy="0"/>
+          <a:chOff x="0" y="0"/>
+          <a:chExt cx="0" cy="0"/>
+        </a:xfrm>
+      </p:grpSpPr>
+      <p:sp>
+        <p:nvSpPr>
+          <p:cNvPr id="2" name="Title 1">
+            <a:extLst>
+              <a:ext uri="{FF2B5EF4-FFF2-40B4-BE49-F238E27FC236}">
+                <a16:creationId xmlns:a16="http://schemas.microsoft.com/office/drawing/2014/main" id="{7A3B73D9-6F8F-4D57-80DD-E8E2E8E9A173}"/>
+              </a:ext>
+            </a:extLst>
+          </p:cNvPr>
+          <p:cNvSpPr>
+            <a:spLocks noGrp="1"/>
+          </p:cNvSpPr>
+          <p:nvPr>
+            <p:ph type="title"/>
+          </p:nvPr>
+        </p:nvSpPr>
+        <p:spPr/>
+        <p:txBody>
+          <a:bodyPr/>
+          <a:lstStyle/>
+          <a:p>
+            <a:r>
+              <a:rPr lang="sk-SK" dirty="0" err="1"/>
+              <a:t>Přidání</a:t>
+            </a:r>
+            <a:r>
+              <a:rPr lang="sk-SK" dirty="0"/>
+              <a:t> do </a:t>
+            </a:r>
+            <a:r>
+              <a:rPr lang="sk-SK" dirty="0" err="1"/>
+              <a:t>Mobilního</a:t>
+            </a:r>
+            <a:r>
+              <a:rPr lang="sk-SK" dirty="0"/>
+              <a:t> projektu</a:t>
+            </a:r>
+          </a:p>
+        </p:txBody>
+      </p:sp>
+      <p:sp>
+        <p:nvSpPr>
+          <p:cNvPr id="3" name="Content Placeholder 2">
+            <a:extLst>
+              <a:ext uri="{FF2B5EF4-FFF2-40B4-BE49-F238E27FC236}">
+                <a16:creationId xmlns:a16="http://schemas.microsoft.com/office/drawing/2014/main" id="{4FC6637C-EAE6-4C6E-85CD-1DD1A24F9ACE}"/>
+              </a:ext>
+            </a:extLst>
+          </p:cNvPr>
+          <p:cNvSpPr>
+            <a:spLocks noGrp="1"/>
+          </p:cNvSpPr>
+          <p:nvPr>
+            <p:ph idx="1"/>
+          </p:nvPr>
+        </p:nvSpPr>
+        <p:spPr/>
+        <p:txBody>
+          <a:bodyPr/>
+          <a:lstStyle/>
+          <a:p>
+            <a:r>
+              <a:rPr lang="sk-SK" dirty="0" err="1"/>
+              <a:t>Přidání</a:t>
+            </a:r>
+            <a:r>
+              <a:rPr lang="sk-SK" dirty="0"/>
+              <a:t> </a:t>
+            </a:r>
+            <a:r>
+              <a:rPr lang="sk-SK" dirty="0" err="1"/>
+              <a:t>registrace</a:t>
+            </a:r>
+            <a:r>
+              <a:rPr lang="sk-SK" dirty="0"/>
+              <a:t> pro klienta do </a:t>
+            </a:r>
+            <a:r>
+              <a:rPr lang="sk-SK" dirty="0" err="1"/>
+              <a:t>installeru</a:t>
+            </a:r>
+            <a:r>
+              <a:rPr lang="sk-SK" dirty="0"/>
+              <a:t>:</a:t>
+            </a:r>
+            <a:br>
+              <a:rPr lang="sk-SK" dirty="0"/>
+            </a:br>
+            <a:r>
+              <a:rPr lang="sk-SK" sz="1800" dirty="0" err="1">
+                <a:solidFill>
+                  <a:srgbClr val="000000"/>
+                </a:solidFill>
+                <a:latin typeface="Consolas" panose="020B0609020204030204" pitchFamily="49" charset="0"/>
+              </a:rPr>
+              <a:t>serviceCollection.AddTransient</a:t>
+            </a:r>
+            <a:r>
+              <a:rPr lang="sk-SK" sz="1800" dirty="0">
+                <a:solidFill>
+                  <a:srgbClr val="000000"/>
+                </a:solidFill>
+                <a:latin typeface="Consolas" panose="020B0609020204030204" pitchFamily="49" charset="0"/>
+              </a:rPr>
+              <a:t>&lt;</a:t>
+            </a:r>
+            <a:r>
+              <a:rPr lang="sk-SK" sz="1800" dirty="0" err="1">
+                <a:solidFill>
+                  <a:srgbClr val="000000"/>
+                </a:solidFill>
+                <a:latin typeface="Consolas" panose="020B0609020204030204" pitchFamily="49" charset="0"/>
+              </a:rPr>
+              <a:t>ITodoClient</a:t>
+            </a:r>
+            <a:r>
+              <a:rPr lang="sk-SK" sz="1800" dirty="0">
+                <a:solidFill>
+                  <a:srgbClr val="000000"/>
+                </a:solidFill>
+                <a:latin typeface="Consolas" panose="020B0609020204030204" pitchFamily="49" charset="0"/>
+              </a:rPr>
+              <a:t>, </a:t>
+            </a:r>
+            <a:r>
+              <a:rPr lang="sk-SK" sz="1800" dirty="0" err="1">
+                <a:solidFill>
+                  <a:srgbClr val="000000"/>
+                </a:solidFill>
+                <a:latin typeface="Consolas" panose="020B0609020204030204" pitchFamily="49" charset="0"/>
+              </a:rPr>
+              <a:t>TodoClient</a:t>
+            </a:r>
+            <a:r>
+              <a:rPr lang="sk-SK" sz="1800" dirty="0">
+                <a:solidFill>
+                  <a:srgbClr val="000000"/>
+                </a:solidFill>
+                <a:latin typeface="Consolas" panose="020B0609020204030204" pitchFamily="49" charset="0"/>
+              </a:rPr>
+              <a:t>&gt;(</a:t>
+            </a:r>
+            <a:r>
+              <a:rPr lang="sk-SK" sz="1800" dirty="0" err="1">
+                <a:solidFill>
+                  <a:srgbClr val="000000"/>
+                </a:solidFill>
+                <a:latin typeface="Consolas" panose="020B0609020204030204" pitchFamily="49" charset="0"/>
+              </a:rPr>
+              <a:t>factory</a:t>
+            </a:r>
+            <a:r>
+              <a:rPr lang="sk-SK" sz="1800" dirty="0">
+                <a:solidFill>
+                  <a:srgbClr val="000000"/>
+                </a:solidFill>
+                <a:latin typeface="Consolas" panose="020B0609020204030204" pitchFamily="49" charset="0"/>
+              </a:rPr>
+              <a:t> =&gt; </a:t>
+            </a:r>
+            <a:r>
+              <a:rPr lang="sk-SK" sz="1800" dirty="0">
+                <a:solidFill>
+                  <a:srgbClr val="0000FF"/>
+                </a:solidFill>
+                <a:latin typeface="Consolas" panose="020B0609020204030204" pitchFamily="49" charset="0"/>
+              </a:rPr>
+              <a:t>new</a:t>
+            </a:r>
+            <a:r>
+              <a:rPr lang="sk-SK" sz="1800" dirty="0">
+                <a:solidFill>
+                  <a:srgbClr val="000000"/>
+                </a:solidFill>
+                <a:latin typeface="Consolas" panose="020B0609020204030204" pitchFamily="49" charset="0"/>
+              </a:rPr>
+              <a:t> </a:t>
+            </a:r>
+            <a:r>
+              <a:rPr lang="sk-SK" sz="1800" dirty="0" err="1">
+                <a:solidFill>
+                  <a:srgbClr val="000000"/>
+                </a:solidFill>
+                <a:latin typeface="Consolas" panose="020B0609020204030204" pitchFamily="49" charset="0"/>
+              </a:rPr>
+              <a:t>TodoClient</a:t>
+            </a:r>
+            <a:r>
+              <a:rPr lang="sk-SK" sz="1800" dirty="0">
+                <a:solidFill>
+                  <a:srgbClr val="000000"/>
+                </a:solidFill>
+                <a:latin typeface="Consolas" panose="020B0609020204030204" pitchFamily="49" charset="0"/>
+              </a:rPr>
+              <a:t>(</a:t>
+            </a:r>
+            <a:r>
+              <a:rPr lang="sk-SK" sz="1800" dirty="0" err="1">
+                <a:solidFill>
+                  <a:srgbClr val="000000"/>
+                </a:solidFill>
+                <a:latin typeface="Consolas" panose="020B0609020204030204" pitchFamily="49" charset="0"/>
+              </a:rPr>
+              <a:t>factory.GetService</a:t>
+            </a:r>
+            <a:r>
+              <a:rPr lang="sk-SK" sz="1800" dirty="0">
+                <a:solidFill>
+                  <a:srgbClr val="000000"/>
+                </a:solidFill>
+                <a:latin typeface="Consolas" panose="020B0609020204030204" pitchFamily="49" charset="0"/>
+              </a:rPr>
+              <a:t>&lt;</a:t>
+            </a:r>
+            <a:r>
+              <a:rPr lang="sk-SK" sz="1800" dirty="0" err="1">
+                <a:solidFill>
+                  <a:srgbClr val="000000"/>
+                </a:solidFill>
+                <a:latin typeface="Consolas" panose="020B0609020204030204" pitchFamily="49" charset="0"/>
+              </a:rPr>
+              <a:t>HttpClient</a:t>
+            </a:r>
+            <a:r>
+              <a:rPr lang="sk-SK" sz="1800" dirty="0">
+                <a:solidFill>
+                  <a:srgbClr val="000000"/>
+                </a:solidFill>
+                <a:latin typeface="Consolas" panose="020B0609020204030204" pitchFamily="49" charset="0"/>
+              </a:rPr>
+              <a:t>&gt;()) { </a:t>
+            </a:r>
+            <a:r>
+              <a:rPr lang="sk-SK" sz="1800" dirty="0" err="1">
+                <a:solidFill>
+                  <a:srgbClr val="000000"/>
+                </a:solidFill>
+                <a:latin typeface="Consolas" panose="020B0609020204030204" pitchFamily="49" charset="0"/>
+              </a:rPr>
+              <a:t>BaseUrl</a:t>
+            </a:r>
+            <a:r>
+              <a:rPr lang="sk-SK" sz="1800" dirty="0">
+                <a:solidFill>
+                  <a:srgbClr val="000000"/>
+                </a:solidFill>
+                <a:latin typeface="Consolas" panose="020B0609020204030204" pitchFamily="49" charset="0"/>
+              </a:rPr>
+              <a:t> = </a:t>
+            </a:r>
+            <a:r>
+              <a:rPr lang="sk-SK" sz="1800" dirty="0">
+                <a:solidFill>
+                  <a:srgbClr val="A31515"/>
+                </a:solidFill>
+                <a:latin typeface="Consolas" panose="020B0609020204030204" pitchFamily="49" charset="0"/>
+              </a:rPr>
+              <a:t>"https://10.0.2.2:5001"</a:t>
+            </a:r>
+            <a:r>
+              <a:rPr lang="sk-SK" sz="1800" dirty="0">
+                <a:solidFill>
+                  <a:srgbClr val="000000"/>
+                </a:solidFill>
+                <a:latin typeface="Consolas" panose="020B0609020204030204" pitchFamily="49" charset="0"/>
+              </a:rPr>
+              <a:t> });</a:t>
+            </a:r>
+          </a:p>
+          <a:p>
+            <a:pPr marL="0" indent="0">
+              <a:buNone/>
+            </a:pPr>
+            <a:endParaRPr lang="sk-SK" sz="1800" dirty="0">
+              <a:solidFill>
+                <a:srgbClr val="000000"/>
+              </a:solidFill>
+              <a:latin typeface="Consolas" panose="020B0609020204030204" pitchFamily="49" charset="0"/>
+            </a:endParaRPr>
+          </a:p>
+          <a:p>
+            <a:pPr marL="0" indent="0">
+              <a:buNone/>
+            </a:pPr>
+            <a:r>
+              <a:rPr lang="sk-SK" sz="1800" dirty="0">
+                <a:solidFill>
+                  <a:srgbClr val="000000"/>
+                </a:solidFill>
+                <a:latin typeface="Consolas" panose="020B0609020204030204" pitchFamily="49" charset="0"/>
+              </a:rPr>
+              <a:t>Pro </a:t>
+            </a:r>
+            <a:r>
+              <a:rPr lang="sk-SK" sz="1800" dirty="0" err="1">
+                <a:solidFill>
+                  <a:srgbClr val="000000"/>
+                </a:solidFill>
+                <a:latin typeface="Consolas" panose="020B0609020204030204" pitchFamily="49" charset="0"/>
+              </a:rPr>
+              <a:t>lokální</a:t>
+            </a:r>
+            <a:r>
+              <a:rPr lang="sk-SK" sz="1800" dirty="0">
+                <a:solidFill>
+                  <a:srgbClr val="000000"/>
+                </a:solidFill>
+                <a:latin typeface="Consolas" panose="020B0609020204030204" pitchFamily="49" charset="0"/>
+              </a:rPr>
+              <a:t> </a:t>
+            </a:r>
+            <a:r>
+              <a:rPr lang="sk-SK" sz="1800" dirty="0" err="1">
+                <a:solidFill>
+                  <a:srgbClr val="000000"/>
+                </a:solidFill>
+                <a:latin typeface="Consolas" panose="020B0609020204030204" pitchFamily="49" charset="0"/>
+              </a:rPr>
+              <a:t>prostředí</a:t>
+            </a:r>
+            <a:endParaRPr lang="sk-SK" sz="1800" dirty="0">
+              <a:solidFill>
+                <a:srgbClr val="000000"/>
+              </a:solidFill>
+              <a:latin typeface="Consolas" panose="020B0609020204030204" pitchFamily="49" charset="0"/>
+            </a:endParaRPr>
+          </a:p>
+          <a:p>
+            <a:pPr marL="0" indent="0">
+              <a:buNone/>
+            </a:pPr>
+            <a:r>
+              <a:rPr lang="sk-SK" sz="1800" dirty="0">
+                <a:solidFill>
+                  <a:srgbClr val="000000"/>
+                </a:solidFill>
+                <a:latin typeface="Consolas" panose="020B0609020204030204" pitchFamily="49" charset="0"/>
+              </a:rPr>
+              <a:t>- URL „</a:t>
+            </a:r>
+            <a:r>
+              <a:rPr lang="sk-SK" sz="1800" dirty="0" err="1">
+                <a:solidFill>
+                  <a:srgbClr val="000000"/>
+                </a:solidFill>
+                <a:latin typeface="Consolas" panose="020B0609020204030204" pitchFamily="49" charset="0"/>
+              </a:rPr>
+              <a:t>Localhost</a:t>
+            </a:r>
+            <a:r>
+              <a:rPr lang="sk-SK" sz="1800" dirty="0">
+                <a:solidFill>
+                  <a:srgbClr val="000000"/>
+                </a:solidFill>
+                <a:latin typeface="Consolas" panose="020B0609020204030204" pitchFamily="49" charset="0"/>
+              </a:rPr>
+              <a:t>“: 10.0.2.2</a:t>
+            </a:r>
+          </a:p>
+          <a:p>
+            <a:pPr marL="0" indent="0">
+              <a:buNone/>
+            </a:pPr>
+            <a:r>
+              <a:rPr lang="sk-SK" sz="1800" dirty="0">
+                <a:solidFill>
+                  <a:srgbClr val="000000"/>
+                </a:solidFill>
+                <a:latin typeface="Consolas" panose="020B0609020204030204" pitchFamily="49" charset="0"/>
+              </a:rPr>
+              <a:t>- </a:t>
+            </a:r>
+            <a:r>
+              <a:rPr lang="sk-SK" sz="1800" dirty="0" err="1">
+                <a:solidFill>
+                  <a:srgbClr val="000000"/>
+                </a:solidFill>
+                <a:latin typeface="Consolas" panose="020B0609020204030204" pitchFamily="49" charset="0"/>
+              </a:rPr>
+              <a:t>Nutnost</a:t>
+            </a:r>
+            <a:r>
+              <a:rPr lang="sk-SK" sz="1800" dirty="0">
+                <a:solidFill>
+                  <a:srgbClr val="000000"/>
+                </a:solidFill>
+                <a:latin typeface="Consolas" panose="020B0609020204030204" pitchFamily="49" charset="0"/>
+              </a:rPr>
+              <a:t> </a:t>
+            </a:r>
+            <a:r>
+              <a:rPr lang="sk-SK" sz="1800" dirty="0" err="1">
+                <a:solidFill>
+                  <a:srgbClr val="000000"/>
+                </a:solidFill>
+                <a:latin typeface="Consolas" panose="020B0609020204030204" pitchFamily="49" charset="0"/>
+              </a:rPr>
+              <a:t>zrušit</a:t>
+            </a:r>
+            <a:r>
+              <a:rPr lang="sk-SK" sz="1800" dirty="0">
+                <a:solidFill>
+                  <a:srgbClr val="000000"/>
+                </a:solidFill>
+                <a:latin typeface="Consolas" panose="020B0609020204030204" pitchFamily="49" charset="0"/>
+              </a:rPr>
+              <a:t> </a:t>
+            </a:r>
+            <a:r>
+              <a:rPr lang="sk-SK" sz="1800" dirty="0" err="1">
+                <a:solidFill>
+                  <a:srgbClr val="000000"/>
+                </a:solidFill>
+                <a:latin typeface="Consolas" panose="020B0609020204030204" pitchFamily="49" charset="0"/>
+              </a:rPr>
+              <a:t>ověřování</a:t>
+            </a:r>
+            <a:r>
+              <a:rPr lang="sk-SK" sz="1800" dirty="0">
+                <a:solidFill>
+                  <a:srgbClr val="000000"/>
+                </a:solidFill>
+                <a:latin typeface="Consolas" panose="020B0609020204030204" pitchFamily="49" charset="0"/>
+              </a:rPr>
+              <a:t> certifikátu – vlastní </a:t>
+            </a:r>
+            <a:r>
+              <a:rPr lang="sk-SK" sz="1800" dirty="0" err="1">
+                <a:solidFill>
+                  <a:srgbClr val="000000"/>
+                </a:solidFill>
+                <a:latin typeface="Consolas" panose="020B0609020204030204" pitchFamily="49" charset="0"/>
+              </a:rPr>
+              <a:t>HttpClientHandler</a:t>
+            </a:r>
+            <a:endParaRPr lang="sk-SK" sz="1800" dirty="0"/>
+          </a:p>
+        </p:txBody>
+      </p:sp>
+    </p:spTree>
+    <p:extLst>
+      <p:ext uri="{BB962C8B-B14F-4D97-AF65-F5344CB8AC3E}">
+        <p14:creationId xmlns:p14="http://schemas.microsoft.com/office/powerpoint/2010/main" val="3806112201"/>
+      </p:ext>
+    </p:extLst>
+  </p:cSld>
+  <p:clrMapOvr>
+    <a:masterClrMapping/>
+  </p:clrMapOvr>
 </p:sld>
 </file>
 
@@ -25634,7 +25428,7 @@
             </a:r>
             <a:r>
               <a:rPr lang="sk-SK" dirty="0" err="1"/>
-              <a:t>přístup</a:t>
+              <a:t>Přístup</a:t>
             </a:r>
             <a:endParaRPr lang="cs-CZ" dirty="0"/>
           </a:p>
@@ -25681,16 +25475,8 @@
               <a:t> </a:t>
             </a:r>
             <a:r>
-              <a:rPr lang="sk-SK" b="1" dirty="0" err="1"/>
-              <a:t>Swashbuckle</a:t>
-            </a:r>
-            <a:r>
-              <a:rPr lang="en-US" b="1" dirty="0"/>
-              <a:t>.</a:t>
-            </a:r>
-            <a:r>
-              <a:rPr lang="en-US" b="1"/>
-              <a:t>AspNetCore</a:t>
+              <a:rPr lang="en-US" b="1" dirty="0" err="1"/>
+              <a:t>NSwag.AspNetCore</a:t>
             </a:r>
             <a:endParaRPr lang="cs-CZ" dirty="0"/>
           </a:p>
@@ -25699,13 +25485,16 @@
     </p:spTree>
     <p:extLst>
       <p:ext uri="{BB962C8B-B14F-4D97-AF65-F5344CB8AC3E}">
-        <p14:creationId xmlns:p14="http://schemas.microsoft.com/office/powerpoint/2010/main" val="174541713"/>
+        <p14:creationId xmlns:p14="http://schemas.microsoft.com/office/powerpoint/2010/main" val="3043073114"/>
       </p:ext>
     </p:extLst>
   </p:cSld>
   <p:clrMapOvr>
     <a:masterClrMapping/>
   </p:clrMapOvr>
+  <p:transition spd="med">
+    <p:pull/>
+  </p:transition>
   <p:timing>
     <p:tnLst>
       <p:par>
@@ -25920,32 +25709,45 @@
               <a:t> </a:t>
             </a:r>
             <a:r>
-              <a:rPr lang="en-US" dirty="0" err="1"/>
-              <a:t>bal</a:t>
+              <a:rPr lang="sk-SK" dirty="0"/>
+              <a:t>balíček</a:t>
             </a:r>
             <a:r>
               <a:rPr lang="cs-CZ" dirty="0"/>
-              <a:t>íček </a:t>
-            </a:r>
-            <a:r>
-              <a:rPr lang="cs-CZ" b="1" dirty="0" err="1"/>
-              <a:t>Swashbuckle.AspNetCore</a:t>
+              <a:t> </a:t>
+            </a:r>
+            <a:r>
+              <a:rPr lang="en-US" b="1" dirty="0" err="1"/>
+              <a:t>NSwag</a:t>
+            </a:r>
+            <a:r>
+              <a:rPr lang="cs-CZ" b="1" dirty="0"/>
+              <a:t>.</a:t>
+            </a:r>
+            <a:r>
+              <a:rPr lang="en-US" b="1" dirty="0" err="1"/>
+              <a:t>AspNetCore</a:t>
             </a:r>
             <a:endParaRPr lang="cs-CZ" b="1" dirty="0"/>
           </a:p>
           <a:p>
             <a:r>
+              <a:rPr lang="sk-SK" dirty="0" err="1"/>
+              <a:t>Přidat</a:t>
+            </a:r>
+            <a:r>
+              <a:rPr lang="sk-SK" dirty="0"/>
+              <a:t> </a:t>
+            </a:r>
+            <a:r>
+              <a:rPr lang="sk-SK" dirty="0" err="1"/>
+              <a:t>konfiguraci</a:t>
+            </a:r>
+            <a:r>
               <a:rPr lang="en-US" dirty="0"/>
-              <a:t>P</a:t>
-            </a:r>
-            <a:r>
-              <a:rPr lang="cs-CZ" dirty="0" err="1"/>
-              <a:t>řidání</a:t>
-            </a:r>
-            <a:r>
-              <a:rPr lang="cs-CZ" dirty="0"/>
-              <a:t> konfigurace:</a:t>
-            </a:r>
+              <a:t>:</a:t>
+            </a:r>
+            <a:endParaRPr lang="cs-CZ" dirty="0"/>
           </a:p>
           <a:p>
             <a:endParaRPr lang="cs-CZ" dirty="0"/>
@@ -25979,8 +25781,8 @@
         </p:nvSpPr>
         <p:spPr>
           <a:xfrm>
-            <a:off x="2628900" y="3328184"/>
-            <a:ext cx="6934200" cy="1938992"/>
+            <a:off x="2628900" y="2971801"/>
+            <a:ext cx="6934200" cy="1015663"/>
           </a:xfrm>
           <a:prstGeom prst="rect">
             <a:avLst/>
@@ -25999,7 +25801,25 @@
                 </a:solidFill>
                 <a:latin typeface="Consolas" panose="020B0609020204030204" pitchFamily="49" charset="0"/>
               </a:rPr>
-              <a:t>services.AddSwaggerGen</a:t>
+              <a:t>services</a:t>
+            </a:r>
+            <a:r>
+              <a:rPr lang="cs-CZ" sz="1500" dirty="0">
+                <a:solidFill>
+                  <a:srgbClr val="000000"/>
+                </a:solidFill>
+                <a:latin typeface="Consolas" panose="020B0609020204030204" pitchFamily="49" charset="0"/>
+              </a:rPr>
+              <a:t>.</a:t>
+            </a:r>
+            <a:r>
+              <a:rPr lang="en-US" sz="1500" dirty="0" err="1">
+                <a:solidFill>
+                  <a:srgbClr val="000000"/>
+                </a:solidFill>
+                <a:latin typeface="Consolas" panose="020B0609020204030204" pitchFamily="49" charset="0"/>
+              </a:rPr>
+              <a:t>AddOpenApiDocument</a:t>
             </a:r>
             <a:r>
               <a:rPr lang="cs-CZ" sz="1500" dirty="0">
@@ -26011,13 +25831,13 @@
               <a:t>(</a:t>
             </a:r>
             <a:r>
-              <a:rPr lang="cs-CZ" sz="1500" dirty="0" err="1">
+              <a:rPr lang="en-US" sz="1500" dirty="0">
                 <a:solidFill>
                   <a:srgbClr val="000000"/>
                 </a:solidFill>
                 <a:latin typeface="Consolas" panose="020B0609020204030204" pitchFamily="49" charset="0"/>
               </a:rPr>
-              <a:t>options</a:t>
+              <a:t>document</a:t>
             </a:r>
             <a:r>
               <a:rPr lang="cs-CZ" sz="1500" dirty="0">
@@ -26037,7 +25857,7 @@
                 </a:solidFill>
                 <a:latin typeface="Consolas" panose="020B0609020204030204" pitchFamily="49" charset="0"/>
               </a:rPr>
-              <a:t>            {</a:t>
+              <a:t>{</a:t>
             </a:r>
           </a:p>
           <a:p>
@@ -26048,7 +25868,7 @@
                 </a:solidFill>
                 <a:latin typeface="Consolas" panose="020B0609020204030204" pitchFamily="49" charset="0"/>
               </a:rPr>
-              <a:t>                </a:t>
+              <a:t>	</a:t>
             </a:r>
             <a:r>
               <a:rPr lang="en-US" sz="1500" dirty="0" err="1">
@@ -26057,7 +25877,7 @@
                 </a:solidFill>
                 <a:latin typeface="Consolas" panose="020B0609020204030204" pitchFamily="49" charset="0"/>
               </a:rPr>
-              <a:t>options.SwaggerDoc</a:t>
+              <a:t>document.DocumentName</a:t>
             </a:r>
             <a:r>
               <a:rPr lang="en-US" sz="1500" dirty="0">
@@ -26066,7 +25886,7 @@
                 </a:solidFill>
                 <a:latin typeface="Consolas" panose="020B0609020204030204" pitchFamily="49" charset="0"/>
               </a:rPr>
-              <a:t>(</a:t>
+              <a:t> = </a:t>
             </a:r>
             <a:r>
               <a:rPr lang="en-US" sz="1500" dirty="0">
@@ -26078,43 +25898,20 @@
               <a:t>"v1"</a:t>
             </a:r>
             <a:r>
-              <a:rPr lang="en-US" sz="1500" dirty="0">
-                <a:solidFill>
-                  <a:srgbClr val="000000"/>
-                </a:solidFill>
-                <a:latin typeface="Consolas" panose="020B0609020204030204" pitchFamily="49" charset="0"/>
-              </a:rPr>
-              <a:t>, </a:t>
-            </a:r>
-            <a:r>
-              <a:rPr lang="en-US" sz="1500" dirty="0">
-                <a:solidFill>
-                  <a:srgbClr val="0000FF"/>
-                </a:solidFill>
-                <a:latin typeface="Consolas" panose="020B0609020204030204" pitchFamily="49" charset="0"/>
-              </a:rPr>
-              <a:t>new</a:t>
-            </a:r>
-            <a:r>
-              <a:rPr lang="en-US" sz="1500" dirty="0">
-                <a:solidFill>
-                  <a:srgbClr val="000000"/>
-                </a:solidFill>
-                <a:latin typeface="Consolas" panose="020B0609020204030204" pitchFamily="49" charset="0"/>
-              </a:rPr>
-              <a:t> Info</a:t>
-            </a:r>
-          </a:p>
-          <a:p>
-            <a:r>
               <a:rPr lang="cs-CZ" sz="1500" dirty="0">
                 <a:solidFill>
                   <a:srgbClr val="000000"/>
                 </a:solidFill>
                 <a:latin typeface="Consolas" panose="020B0609020204030204" pitchFamily="49" charset="0"/>
               </a:rPr>
-              <a:t>                {</a:t>
-            </a:r>
+              <a:t>;</a:t>
+            </a:r>
+            <a:endParaRPr lang="en-US" sz="1500" dirty="0">
+              <a:solidFill>
+                <a:srgbClr val="000000"/>
+              </a:solidFill>
+              <a:latin typeface="Consolas" panose="020B0609020204030204" pitchFamily="49" charset="0"/>
+            </a:endParaRPr>
           </a:p>
           <a:p>
             <a:r>
@@ -26124,112 +25921,7 @@
                 </a:solidFill>
                 <a:latin typeface="Consolas" panose="020B0609020204030204" pitchFamily="49" charset="0"/>
               </a:rPr>
-              <a:t>                    </a:t>
-            </a:r>
-            <a:r>
-              <a:rPr lang="cs-CZ" sz="1500" dirty="0" err="1">
-                <a:solidFill>
-                  <a:srgbClr val="000000"/>
-                </a:solidFill>
-                <a:latin typeface="Consolas" panose="020B0609020204030204" pitchFamily="49" charset="0"/>
-              </a:rPr>
-              <a:t>Title</a:t>
-            </a:r>
-            <a:r>
-              <a:rPr lang="cs-CZ" sz="1500" dirty="0">
-                <a:solidFill>
-                  <a:srgbClr val="000000"/>
-                </a:solidFill>
-                <a:latin typeface="Consolas" panose="020B0609020204030204" pitchFamily="49" charset="0"/>
-              </a:rPr>
-              <a:t> = </a:t>
-            </a:r>
-            <a:r>
-              <a:rPr lang="cs-CZ" sz="1500" dirty="0">
-                <a:solidFill>
-                  <a:srgbClr val="A31515"/>
-                </a:solidFill>
-                <a:latin typeface="Consolas" panose="020B0609020204030204" pitchFamily="49" charset="0"/>
-              </a:rPr>
-              <a:t>"PV239_06 API"</a:t>
-            </a:r>
-            <a:r>
-              <a:rPr lang="cs-CZ" sz="1500" dirty="0">
-                <a:solidFill>
-                  <a:srgbClr val="000000"/>
-                </a:solidFill>
-                <a:latin typeface="Consolas" panose="020B0609020204030204" pitchFamily="49" charset="0"/>
-              </a:rPr>
-              <a:t>,</a:t>
-            </a:r>
-          </a:p>
-          <a:p>
-            <a:r>
-              <a:rPr lang="cs-CZ" sz="1500" dirty="0">
-                <a:solidFill>
-                  <a:srgbClr val="000000"/>
-                </a:solidFill>
-                <a:latin typeface="Consolas" panose="020B0609020204030204" pitchFamily="49" charset="0"/>
-              </a:rPr>
-              <a:t>                    </a:t>
-            </a:r>
-            <a:r>
-              <a:rPr lang="cs-CZ" sz="1500" dirty="0" err="1">
-                <a:solidFill>
-                  <a:srgbClr val="000000"/>
-                </a:solidFill>
-                <a:latin typeface="Consolas" panose="020B0609020204030204" pitchFamily="49" charset="0"/>
-              </a:rPr>
-              <a:t>Version</a:t>
-            </a:r>
-            <a:r>
-              <a:rPr lang="cs-CZ" sz="1500" dirty="0">
-                <a:solidFill>
-                  <a:srgbClr val="000000"/>
-                </a:solidFill>
-                <a:latin typeface="Consolas" panose="020B0609020204030204" pitchFamily="49" charset="0"/>
-              </a:rPr>
-              <a:t> = </a:t>
-            </a:r>
-            <a:r>
-              <a:rPr lang="cs-CZ" sz="1500" dirty="0">
-                <a:solidFill>
-                  <a:srgbClr val="A31515"/>
-                </a:solidFill>
-                <a:latin typeface="Consolas" panose="020B0609020204030204" pitchFamily="49" charset="0"/>
-              </a:rPr>
-              <a:t>"v1"</a:t>
-            </a:r>
-            <a:r>
-              <a:rPr lang="cs-CZ" sz="1500" dirty="0">
-                <a:solidFill>
-                  <a:srgbClr val="000000"/>
-                </a:solidFill>
-                <a:latin typeface="Consolas" panose="020B0609020204030204" pitchFamily="49" charset="0"/>
-              </a:rPr>
-              <a:t>,</a:t>
-            </a:r>
-          </a:p>
-          <a:p>
-            <a:r>
-              <a:rPr lang="cs-CZ" sz="1500" dirty="0">
-                <a:solidFill>
-                  <a:srgbClr val="000000"/>
-                </a:solidFill>
-                <a:latin typeface="Consolas" panose="020B0609020204030204" pitchFamily="49" charset="0"/>
-              </a:rPr>
-              <a:t>                });</a:t>
-            </a:r>
-          </a:p>
-          <a:p>
-            <a:r>
-              <a:rPr lang="cs-CZ" sz="1500" dirty="0">
-                <a:solidFill>
-                  <a:srgbClr val="000000"/>
-                </a:solidFill>
-                <a:latin typeface="Consolas" panose="020B0609020204030204" pitchFamily="49" charset="0"/>
-              </a:rPr>
-              <a:t>            });</a:t>
+              <a:t>});</a:t>
             </a:r>
             <a:endParaRPr lang="cs-CZ" sz="1500" dirty="0"/>
           </a:p>
@@ -26238,13 +25930,16 @@
     </p:spTree>
     <p:extLst>
       <p:ext uri="{BB962C8B-B14F-4D97-AF65-F5344CB8AC3E}">
-        <p14:creationId xmlns:p14="http://schemas.microsoft.com/office/powerpoint/2010/main" val="502074821"/>
+        <p14:creationId xmlns:p14="http://schemas.microsoft.com/office/powerpoint/2010/main" val="655924471"/>
       </p:ext>
     </p:extLst>
   </p:cSld>
   <p:clrMapOvr>
     <a:masterClrMapping/>
   </p:clrMapOvr>
+  <p:transition spd="med">
+    <p:pull/>
+  </p:transition>
   <p:timing>
     <p:tnLst>
       <p:par>
@@ -26497,8 +26192,12 @@
           <a:lstStyle/>
           <a:p>
             <a:r>
+              <a:rPr lang="sk-SK" dirty="0" err="1"/>
+              <a:t>Přidat</a:t>
+            </a:r>
+            <a:r>
               <a:rPr lang="cs-CZ" dirty="0"/>
-              <a:t>Přidání </a:t>
+              <a:t> </a:t>
             </a:r>
             <a:r>
               <a:rPr lang="cs-CZ" dirty="0" err="1"/>
@@ -26523,16 +26222,24 @@
           </a:p>
           <a:p>
             <a:r>
+              <a:rPr lang="sk-SK" dirty="0" err="1"/>
+              <a:t>Přidat</a:t>
+            </a:r>
+            <a:r>
+              <a:rPr lang="sk-SK" dirty="0"/>
+              <a:t> </a:t>
+            </a:r>
+            <a:r>
+              <a:rPr lang="sk-SK" dirty="0" err="1"/>
+              <a:t>middleware</a:t>
+            </a:r>
+            <a:r>
               <a:rPr lang="cs-CZ" dirty="0"/>
-              <a:t>Přidání </a:t>
-            </a:r>
-            <a:r>
-              <a:rPr lang="cs-CZ" dirty="0" err="1"/>
-              <a:t>middleware</a:t>
-            </a:r>
-            <a:r>
-              <a:rPr lang="cs-CZ" dirty="0"/>
-              <a:t> pro </a:t>
+              <a:t> </a:t>
+            </a:r>
+            <a:r>
+              <a:rPr lang="sk-SK" dirty="0"/>
+              <a:t>pro </a:t>
             </a:r>
             <a:r>
               <a:rPr lang="cs-CZ" dirty="0" err="1"/>
@@ -26567,8 +26274,8 @@
         </p:nvSpPr>
         <p:spPr>
           <a:xfrm>
-            <a:off x="2286000" y="3959774"/>
-            <a:ext cx="8001000" cy="1015663"/>
+            <a:off x="2286000" y="4038601"/>
+            <a:ext cx="8382000" cy="1246495"/>
           </a:xfrm>
           <a:prstGeom prst="rect">
             <a:avLst/>
@@ -26587,7 +26294,16 @@
                 </a:solidFill>
                 <a:latin typeface="Consolas" panose="020B0609020204030204" pitchFamily="49" charset="0"/>
               </a:rPr>
-              <a:t>app.UseSwaggerUI</a:t>
+              <a:t>app.UseSwaggerU</a:t>
+            </a:r>
+            <a:r>
+              <a:rPr lang="en-US" sz="1500" dirty="0">
+                <a:solidFill>
+                  <a:srgbClr val="000000"/>
+                </a:solidFill>
+                <a:latin typeface="Consolas" panose="020B0609020204030204" pitchFamily="49" charset="0"/>
+              </a:rPr>
+              <a:t>i3</a:t>
             </a:r>
             <a:r>
               <a:rPr lang="cs-CZ" sz="1500" dirty="0">
@@ -26599,13 +26315,13 @@
               <a:t>(</a:t>
             </a:r>
             <a:r>
-              <a:rPr lang="cs-CZ" sz="1500" dirty="0" err="1">
+              <a:rPr lang="en-US" sz="1500" dirty="0">
                 <a:solidFill>
                   <a:srgbClr val="000000"/>
                 </a:solidFill>
                 <a:latin typeface="Consolas" panose="020B0609020204030204" pitchFamily="49" charset="0"/>
               </a:rPr>
-              <a:t>options</a:t>
+              <a:t>settings</a:t>
             </a:r>
             <a:r>
               <a:rPr lang="cs-CZ" sz="1500" dirty="0">
@@ -26625,10 +26341,19 @@
                 </a:solidFill>
                 <a:latin typeface="Consolas" panose="020B0609020204030204" pitchFamily="49" charset="0"/>
               </a:rPr>
-              <a:t>            {</a:t>
+              <a:t>{</a:t>
             </a:r>
           </a:p>
           <a:p>
+            <a:r>
+              <a:rPr lang="en-US" sz="1500" dirty="0">
+                <a:solidFill>
+                  <a:srgbClr val="000000"/>
+                </a:solidFill>
+                <a:latin typeface="Consolas" panose="020B0609020204030204" pitchFamily="49" charset="0"/>
+              </a:rPr>
+              <a:t>  settings</a:t>
+            </a:r>
             <a:r>
               <a:rPr lang="cs-CZ" sz="1500" dirty="0">
                 <a:solidFill>
@@ -26636,16 +26361,16 @@
                 </a:solidFill>
                 <a:latin typeface="Consolas" panose="020B0609020204030204" pitchFamily="49" charset="0"/>
               </a:rPr>
-              <a:t>                </a:t>
-            </a:r>
-            <a:r>
-              <a:rPr lang="cs-CZ" sz="1500" dirty="0" err="1">
+              <a:t>.</a:t>
+            </a:r>
+            <a:r>
+              <a:rPr lang="en-US" sz="1500" dirty="0" err="1">
                 <a:solidFill>
                   <a:srgbClr val="000000"/>
                 </a:solidFill>
                 <a:latin typeface="Consolas" panose="020B0609020204030204" pitchFamily="49" charset="0"/>
               </a:rPr>
-              <a:t>options.SwaggerEndpoint</a:t>
+              <a:t>SwaggerRoutes.Add</a:t>
             </a:r>
             <a:r>
               <a:rPr lang="cs-CZ" sz="1500" dirty="0">
@@ -26656,41 +26381,31 @@
               </a:rPr>
               <a:t>(</a:t>
             </a:r>
-            <a:r>
-              <a:rPr lang="cs-CZ" sz="1500" dirty="0">
+            <a:endParaRPr lang="en-US" sz="1500" dirty="0">
+              <a:solidFill>
+                <a:srgbClr val="000000"/>
+              </a:solidFill>
+              <a:latin typeface="Consolas" panose="020B0609020204030204" pitchFamily="49" charset="0"/>
+            </a:endParaRPr>
+          </a:p>
+          <a:p>
+            <a:r>
+              <a:rPr lang="en-US" sz="1500" dirty="0">
+                <a:solidFill>
+                  <a:srgbClr val="000000"/>
+                </a:solidFill>
+                <a:latin typeface="Consolas" panose="020B0609020204030204" pitchFamily="49" charset="0"/>
+              </a:rPr>
+              <a:t>	new SwaggerUi3Route(</a:t>
+            </a:r>
+            <a:r>
+              <a:rPr lang="en-US" sz="1500" dirty="0">
                 <a:solidFill>
                   <a:srgbClr val="A31515"/>
                 </a:solidFill>
                 <a:latin typeface="Consolas" panose="020B0609020204030204" pitchFamily="49" charset="0"/>
               </a:rPr>
-              <a:t>"/</a:t>
-            </a:r>
-            <a:r>
-              <a:rPr lang="cs-CZ" sz="1500" dirty="0" err="1">
-                <a:solidFill>
-                  <a:srgbClr val="A31515"/>
-                </a:solidFill>
-                <a:latin typeface="Consolas" panose="020B0609020204030204" pitchFamily="49" charset="0"/>
-              </a:rPr>
-              <a:t>swagger</a:t>
-            </a:r>
-            <a:r>
-              <a:rPr lang="cs-CZ" sz="1500" dirty="0">
-                <a:solidFill>
-                  <a:srgbClr val="A31515"/>
-                </a:solidFill>
-                <a:latin typeface="Consolas" panose="020B0609020204030204" pitchFamily="49" charset="0"/>
-              </a:rPr>
-              <a:t>/v1/</a:t>
-            </a:r>
-            <a:r>
-              <a:rPr lang="cs-CZ" sz="1500" dirty="0" err="1">
-                <a:solidFill>
-                  <a:srgbClr val="A31515"/>
-                </a:solidFill>
-                <a:latin typeface="Consolas" panose="020B0609020204030204" pitchFamily="49" charset="0"/>
-              </a:rPr>
-              <a:t>swagger.json</a:t>
+              <a:t>"v1.0</a:t>
             </a:r>
             <a:r>
               <a:rPr lang="cs-CZ" sz="1500" dirty="0">
@@ -26708,7 +26423,34 @@
                 </a:solidFill>
                 <a:latin typeface="Consolas" panose="020B0609020204030204" pitchFamily="49" charset="0"/>
               </a:rPr>
-              <a:t>, </a:t>
+              <a:t>,</a:t>
+            </a:r>
+            <a:r>
+              <a:rPr lang="en-US" sz="1500" dirty="0">
+                <a:solidFill>
+                  <a:srgbClr val="000000"/>
+                </a:solidFill>
+                <a:latin typeface="Consolas" panose="020B0609020204030204" pitchFamily="49" charset="0"/>
+              </a:rPr>
+              <a:t> </a:t>
+            </a:r>
+            <a:r>
+              <a:rPr lang="en-US" sz="1500" dirty="0">
+                <a:solidFill>
+                  <a:srgbClr val="A31515"/>
+                </a:solidFill>
+                <a:latin typeface="Consolas" panose="020B0609020204030204" pitchFamily="49" charset="0"/>
+              </a:rPr>
+              <a:t>"/swagger/v1/</a:t>
+            </a:r>
+            <a:r>
+              <a:rPr lang="en-US" sz="1500" dirty="0" err="1">
+                <a:solidFill>
+                  <a:srgbClr val="A31515"/>
+                </a:solidFill>
+                <a:latin typeface="Consolas" panose="020B0609020204030204" pitchFamily="49" charset="0"/>
+              </a:rPr>
+              <a:t>swagger.json</a:t>
             </a:r>
             <a:r>
               <a:rPr lang="cs-CZ" sz="1500" dirty="0">
@@ -26717,7 +26459,7 @@
                 </a:solidFill>
                 <a:latin typeface="Consolas" panose="020B0609020204030204" pitchFamily="49" charset="0"/>
               </a:rPr>
-              <a:t>"v1"</a:t>
+              <a:t>"</a:t>
             </a:r>
             <a:r>
               <a:rPr lang="cs-CZ" sz="1500" dirty="0">
@@ -26726,10 +26468,17 @@
                 </a:solidFill>
                 <a:latin typeface="Consolas" panose="020B0609020204030204" pitchFamily="49" charset="0"/>
               </a:rPr>
-              <a:t>);</a:t>
-            </a:r>
-          </a:p>
-          <a:p>
+              <a:t>)</a:t>
+            </a:r>
+            <a:r>
+              <a:rPr lang="en-US" sz="1500" dirty="0">
+                <a:solidFill>
+                  <a:srgbClr val="000000"/>
+                </a:solidFill>
+                <a:latin typeface="Consolas" panose="020B0609020204030204" pitchFamily="49" charset="0"/>
+              </a:rPr>
+              <a:t>)</a:t>
+            </a:r>
             <a:r>
               <a:rPr lang="cs-CZ" sz="1500" dirty="0">
                 <a:solidFill>
@@ -26737,7 +26486,18 @@
                 </a:solidFill>
                 <a:latin typeface="Consolas" panose="020B0609020204030204" pitchFamily="49" charset="0"/>
               </a:rPr>
-              <a:t>            });</a:t>
+              <a:t>;</a:t>
+            </a:r>
+          </a:p>
+          <a:p>
+            <a:r>
+              <a:rPr lang="cs-CZ" sz="1500" dirty="0">
+                <a:solidFill>
+                  <a:srgbClr val="000000"/>
+                </a:solidFill>
+                <a:latin typeface="Consolas" panose="020B0609020204030204" pitchFamily="49" charset="0"/>
+              </a:rPr>
+              <a:t>});</a:t>
             </a:r>
             <a:endParaRPr lang="cs-CZ" sz="1500" dirty="0"/>
           </a:p>
@@ -26757,7 +26517,7 @@
         </p:nvSpPr>
         <p:spPr>
           <a:xfrm>
-            <a:off x="2286000" y="2783505"/>
+            <a:off x="2514601" y="2764535"/>
             <a:ext cx="1983235" cy="323165"/>
           </a:xfrm>
           <a:prstGeom prst="rect">
@@ -26777,7 +26537,16 @@
                 </a:solidFill>
                 <a:latin typeface="Consolas" panose="020B0609020204030204" pitchFamily="49" charset="0"/>
               </a:rPr>
-              <a:t>app.UseSwagger</a:t>
+              <a:t>app.Use</a:t>
+            </a:r>
+            <a:r>
+              <a:rPr lang="en-US" sz="1500" dirty="0" err="1">
+                <a:solidFill>
+                  <a:srgbClr val="000000"/>
+                </a:solidFill>
+                <a:latin typeface="Consolas" panose="020B0609020204030204" pitchFamily="49" charset="0"/>
+              </a:rPr>
+              <a:t>OpenApi</a:t>
             </a:r>
             <a:r>
               <a:rPr lang="cs-CZ" sz="1500" dirty="0">
@@ -26795,13 +26564,16 @@
     </p:spTree>
     <p:extLst>
       <p:ext uri="{BB962C8B-B14F-4D97-AF65-F5344CB8AC3E}">
-        <p14:creationId xmlns:p14="http://schemas.microsoft.com/office/powerpoint/2010/main" val="3744925495"/>
+        <p14:creationId xmlns:p14="http://schemas.microsoft.com/office/powerpoint/2010/main" val="707186793"/>
       </p:ext>
     </p:extLst>
   </p:cSld>
   <p:clrMapOvr>
     <a:masterClrMapping/>
   </p:clrMapOvr>
+  <p:transition spd="med">
+    <p:pull/>
+  </p:transition>
   <p:timing>
     <p:tnLst>
       <p:par>

</xml_diff>

<commit_message>
Removed old materials for lab 06 and lecture. Added new presentation for MAUI lecture.
</commit_message>
<xml_diff>
--- a/06_API/PV239-Xamarin-06_API.pptx
+++ b/06_API/PV239-Xamarin-06_API.pptx
@@ -5,24 +5,26 @@
     <p:sldMasterId id="2147483700" r:id="rId1"/>
   </p:sldMasterIdLst>
   <p:notesMasterIdLst>
-    <p:notesMasterId r:id="rId17"/>
+    <p:notesMasterId r:id="rId19"/>
   </p:notesMasterIdLst>
   <p:sldIdLst>
     <p:sldId id="256" r:id="rId2"/>
-    <p:sldId id="258" r:id="rId3"/>
-    <p:sldId id="259" r:id="rId4"/>
-    <p:sldId id="260" r:id="rId5"/>
-    <p:sldId id="261" r:id="rId6"/>
-    <p:sldId id="296" r:id="rId7"/>
-    <p:sldId id="297" r:id="rId8"/>
-    <p:sldId id="298" r:id="rId9"/>
-    <p:sldId id="270" r:id="rId10"/>
-    <p:sldId id="265" r:id="rId11"/>
-    <p:sldId id="269" r:id="rId12"/>
-    <p:sldId id="268" r:id="rId13"/>
-    <p:sldId id="267" r:id="rId14"/>
-    <p:sldId id="266" r:id="rId15"/>
-    <p:sldId id="299" r:id="rId16"/>
+    <p:sldId id="300" r:id="rId3"/>
+    <p:sldId id="301" r:id="rId4"/>
+    <p:sldId id="258" r:id="rId5"/>
+    <p:sldId id="259" r:id="rId6"/>
+    <p:sldId id="260" r:id="rId7"/>
+    <p:sldId id="261" r:id="rId8"/>
+    <p:sldId id="296" r:id="rId9"/>
+    <p:sldId id="297" r:id="rId10"/>
+    <p:sldId id="298" r:id="rId11"/>
+    <p:sldId id="270" r:id="rId12"/>
+    <p:sldId id="265" r:id="rId13"/>
+    <p:sldId id="269" r:id="rId14"/>
+    <p:sldId id="268" r:id="rId15"/>
+    <p:sldId id="267" r:id="rId16"/>
+    <p:sldId id="266" r:id="rId17"/>
+    <p:sldId id="299" r:id="rId18"/>
   </p:sldIdLst>
   <p:sldSz cx="12192000" cy="6858000"/>
   <p:notesSz cx="6858000" cy="9144000"/>
@@ -211,7 +213,7 @@
           <a:p>
             <a:fld id="{48A795E8-66B5-4696-B483-F1F9FA0B53D4}" type="datetimeFigureOut">
               <a:rPr lang="cs-CZ" smtClean="0"/>
-              <a:t>26.03.2020</a:t>
+              <a:t>21.03.2022</a:t>
             </a:fld>
             <a:endParaRPr lang="cs-CZ"/>
           </a:p>
@@ -9272,7 +9274,7 @@
           <a:p>
             <a:fld id="{4AAD347D-5ACD-4C99-B74B-A9C85AD731AF}" type="datetimeFigureOut">
               <a:rPr lang="en-US" smtClean="0"/>
-              <a:t>3/26/2020</a:t>
+              <a:t>2022-03-21</a:t>
             </a:fld>
             <a:endParaRPr lang="en-US" dirty="0"/>
           </a:p>
@@ -9479,7 +9481,7 @@
           <a:p>
             <a:fld id="{4509A250-FF31-4206-8172-F9D3106AACB1}" type="datetimeFigureOut">
               <a:rPr lang="en-US" smtClean="0"/>
-              <a:t>3/26/2020</a:t>
+              <a:t>2022-03-21</a:t>
             </a:fld>
             <a:endParaRPr lang="en-US" dirty="0"/>
           </a:p>
@@ -9659,7 +9661,7 @@
           <a:p>
             <a:fld id="{4509A250-FF31-4206-8172-F9D3106AACB1}" type="datetimeFigureOut">
               <a:rPr lang="en-US" smtClean="0"/>
-              <a:t>3/26/2020</a:t>
+              <a:t>2022-03-21</a:t>
             </a:fld>
             <a:endParaRPr lang="en-US" dirty="0"/>
           </a:p>
@@ -9864,7 +9866,7 @@
           <a:p>
             <a:fld id="{4509A250-FF31-4206-8172-F9D3106AACB1}" type="datetimeFigureOut">
               <a:rPr lang="en-US" smtClean="0"/>
-              <a:t>3/26/2020</a:t>
+              <a:t>2022-03-21</a:t>
             </a:fld>
             <a:endParaRPr lang="en-US" dirty="0"/>
           </a:p>
@@ -18762,7 +18764,7 @@
           <a:p>
             <a:fld id="{9796027F-7875-4030-9381-8BD8C4F21935}" type="datetimeFigureOut">
               <a:rPr lang="en-US" smtClean="0"/>
-              <a:t>3/26/2020</a:t>
+              <a:t>2022-03-21</a:t>
             </a:fld>
             <a:endParaRPr lang="en-US" dirty="0"/>
           </a:p>
@@ -19036,7 +19038,7 @@
           <a:p>
             <a:fld id="{9796027F-7875-4030-9381-8BD8C4F21935}" type="datetimeFigureOut">
               <a:rPr lang="en-US" smtClean="0"/>
-              <a:t>3/26/2020</a:t>
+              <a:t>2022-03-21</a:t>
             </a:fld>
             <a:endParaRPr lang="en-US" dirty="0"/>
           </a:p>
@@ -19434,7 +19436,7 @@
           <a:p>
             <a:fld id="{9796027F-7875-4030-9381-8BD8C4F21935}" type="datetimeFigureOut">
               <a:rPr lang="en-US" smtClean="0"/>
-              <a:t>3/26/2020</a:t>
+              <a:t>2022-03-21</a:t>
             </a:fld>
             <a:endParaRPr lang="en-US" dirty="0"/>
           </a:p>
@@ -19552,7 +19554,7 @@
           <a:p>
             <a:fld id="{4509A250-FF31-4206-8172-F9D3106AACB1}" type="datetimeFigureOut">
               <a:rPr lang="en-US" smtClean="0"/>
-              <a:t>3/26/2020</a:t>
+              <a:t>2022-03-21</a:t>
             </a:fld>
             <a:endParaRPr lang="en-US" dirty="0"/>
           </a:p>
@@ -19647,7 +19649,7 @@
           <a:p>
             <a:fld id="{4509A250-FF31-4206-8172-F9D3106AACB1}" type="datetimeFigureOut">
               <a:rPr lang="en-US" smtClean="0"/>
-              <a:t>3/26/2020</a:t>
+              <a:t>2022-03-21</a:t>
             </a:fld>
             <a:endParaRPr lang="en-US" dirty="0"/>
           </a:p>
@@ -19937,7 +19939,7 @@
           <a:p>
             <a:fld id="{4509A250-FF31-4206-8172-F9D3106AACB1}" type="datetimeFigureOut">
               <a:rPr lang="en-US" smtClean="0"/>
-              <a:t>3/26/2020</a:t>
+              <a:t>2022-03-21</a:t>
             </a:fld>
             <a:endParaRPr lang="en-US" dirty="0"/>
           </a:p>
@@ -20217,7 +20219,7 @@
           <a:p>
             <a:fld id="{4509A250-FF31-4206-8172-F9D3106AACB1}" type="datetimeFigureOut">
               <a:rPr lang="en-US" smtClean="0"/>
-              <a:t>3/26/2020</a:t>
+              <a:t>2022-03-21</a:t>
             </a:fld>
             <a:endParaRPr lang="en-US" dirty="0"/>
           </a:p>
@@ -20467,7 +20469,7 @@
           <a:p>
             <a:fld id="{4AAD347D-5ACD-4C99-B74B-A9C85AD731AF}" type="datetimeFigureOut">
               <a:rPr lang="en-US" smtClean="0"/>
-              <a:t>3/26/2020</a:t>
+              <a:t>2022-03-21</a:t>
             </a:fld>
             <a:endParaRPr lang="en-US" dirty="0"/>
           </a:p>
@@ -21289,6 +21291,1005 @@
           <p:cNvPr id="2" name="Title 1">
             <a:extLst>
               <a:ext uri="{FF2B5EF4-FFF2-40B4-BE49-F238E27FC236}">
+                <a16:creationId xmlns:a16="http://schemas.microsoft.com/office/drawing/2014/main" id="{A7DE7713-8786-4DE8-ADAE-7F0CE86A31F4}"/>
+              </a:ext>
+            </a:extLst>
+          </p:cNvPr>
+          <p:cNvSpPr>
+            <a:spLocks noGrp="1"/>
+          </p:cNvSpPr>
+          <p:nvPr>
+            <p:ph type="title"/>
+          </p:nvPr>
+        </p:nvSpPr>
+        <p:spPr/>
+        <p:txBody>
+          <a:bodyPr/>
+          <a:lstStyle/>
+          <a:p>
+            <a:r>
+              <a:rPr lang="cs-CZ" dirty="0"/>
+              <a:t>S</a:t>
+            </a:r>
+            <a:r>
+              <a:rPr lang="sk-SK" dirty="0" err="1"/>
+              <a:t>etup</a:t>
+            </a:r>
+            <a:endParaRPr lang="cs-CZ" dirty="0"/>
+          </a:p>
+        </p:txBody>
+      </p:sp>
+      <p:sp>
+        <p:nvSpPr>
+          <p:cNvPr id="3" name="Content Placeholder 2">
+            <a:extLst>
+              <a:ext uri="{FF2B5EF4-FFF2-40B4-BE49-F238E27FC236}">
+                <a16:creationId xmlns:a16="http://schemas.microsoft.com/office/drawing/2014/main" id="{FA8E97BB-588F-4B3D-9D79-2A1C8F7C045B}"/>
+              </a:ext>
+            </a:extLst>
+          </p:cNvPr>
+          <p:cNvSpPr>
+            <a:spLocks noGrp="1"/>
+          </p:cNvSpPr>
+          <p:nvPr>
+            <p:ph idx="1"/>
+          </p:nvPr>
+        </p:nvSpPr>
+        <p:spPr/>
+        <p:txBody>
+          <a:bodyPr/>
+          <a:lstStyle/>
+          <a:p>
+            <a:r>
+              <a:rPr lang="sk-SK" dirty="0" err="1"/>
+              <a:t>Přidat</a:t>
+            </a:r>
+            <a:r>
+              <a:rPr lang="cs-CZ" dirty="0"/>
+              <a:t> </a:t>
+            </a:r>
+            <a:r>
+              <a:rPr lang="cs-CZ" dirty="0" err="1"/>
+              <a:t>middleware</a:t>
+            </a:r>
+            <a:r>
+              <a:rPr lang="en-US" dirty="0"/>
+              <a:t>:</a:t>
+            </a:r>
+          </a:p>
+          <a:p>
+            <a:pPr marL="457200" lvl="1" indent="0">
+              <a:buNone/>
+            </a:pPr>
+            <a:endParaRPr lang="cs-CZ" dirty="0"/>
+          </a:p>
+          <a:p>
+            <a:pPr marL="457200" lvl="1" indent="0">
+              <a:buNone/>
+            </a:pPr>
+            <a:endParaRPr lang="cs-CZ" dirty="0"/>
+          </a:p>
+          <a:p>
+            <a:r>
+              <a:rPr lang="sk-SK" dirty="0" err="1"/>
+              <a:t>Přidat</a:t>
+            </a:r>
+            <a:r>
+              <a:rPr lang="sk-SK" dirty="0"/>
+              <a:t> </a:t>
+            </a:r>
+            <a:r>
+              <a:rPr lang="sk-SK" dirty="0" err="1"/>
+              <a:t>middleware</a:t>
+            </a:r>
+            <a:r>
+              <a:rPr lang="cs-CZ" dirty="0"/>
+              <a:t> </a:t>
+            </a:r>
+            <a:r>
+              <a:rPr lang="sk-SK" dirty="0"/>
+              <a:t>pro </a:t>
+            </a:r>
+            <a:r>
+              <a:rPr lang="cs-CZ" dirty="0" err="1"/>
+              <a:t>Swagger</a:t>
+            </a:r>
+            <a:r>
+              <a:rPr lang="cs-CZ" dirty="0"/>
+              <a:t> UI:</a:t>
+            </a:r>
+          </a:p>
+          <a:p>
+            <a:pPr lvl="1"/>
+            <a:endParaRPr lang="cs-CZ" dirty="0"/>
+          </a:p>
+          <a:p>
+            <a:pPr lvl="1"/>
+            <a:endParaRPr lang="cs-CZ" dirty="0"/>
+          </a:p>
+        </p:txBody>
+      </p:sp>
+      <p:sp>
+        <p:nvSpPr>
+          <p:cNvPr id="4" name="Rectangle 3">
+            <a:extLst>
+              <a:ext uri="{FF2B5EF4-FFF2-40B4-BE49-F238E27FC236}">
+                <a16:creationId xmlns:a16="http://schemas.microsoft.com/office/drawing/2014/main" id="{67B21E2E-C5BA-407A-9A50-4048FEFFBDBD}"/>
+              </a:ext>
+            </a:extLst>
+          </p:cNvPr>
+          <p:cNvSpPr/>
+          <p:nvPr/>
+        </p:nvSpPr>
+        <p:spPr>
+          <a:xfrm>
+            <a:off x="2286000" y="4038601"/>
+            <a:ext cx="8382000" cy="1246495"/>
+          </a:xfrm>
+          <a:prstGeom prst="rect">
+            <a:avLst/>
+          </a:prstGeom>
+        </p:spPr>
+        <p:txBody>
+          <a:bodyPr wrap="square">
+            <a:spAutoFit/>
+          </a:bodyPr>
+          <a:lstStyle/>
+          <a:p>
+            <a:r>
+              <a:rPr lang="cs-CZ" sz="1500" dirty="0" err="1">
+                <a:solidFill>
+                  <a:srgbClr val="000000"/>
+                </a:solidFill>
+                <a:latin typeface="Consolas" panose="020B0609020204030204" pitchFamily="49" charset="0"/>
+              </a:rPr>
+              <a:t>app.UseSwaggerU</a:t>
+            </a:r>
+            <a:r>
+              <a:rPr lang="en-US" sz="1500" dirty="0">
+                <a:solidFill>
+                  <a:srgbClr val="000000"/>
+                </a:solidFill>
+                <a:latin typeface="Consolas" panose="020B0609020204030204" pitchFamily="49" charset="0"/>
+              </a:rPr>
+              <a:t>i3</a:t>
+            </a:r>
+            <a:r>
+              <a:rPr lang="cs-CZ" sz="1500" dirty="0">
+                <a:solidFill>
+                  <a:srgbClr val="000000"/>
+                </a:solidFill>
+                <a:latin typeface="Consolas" panose="020B0609020204030204" pitchFamily="49" charset="0"/>
+              </a:rPr>
+              <a:t>(</a:t>
+            </a:r>
+            <a:r>
+              <a:rPr lang="en-US" sz="1500" dirty="0">
+                <a:solidFill>
+                  <a:srgbClr val="000000"/>
+                </a:solidFill>
+                <a:latin typeface="Consolas" panose="020B0609020204030204" pitchFamily="49" charset="0"/>
+              </a:rPr>
+              <a:t>settings</a:t>
+            </a:r>
+            <a:r>
+              <a:rPr lang="cs-CZ" sz="1500" dirty="0">
+                <a:solidFill>
+                  <a:srgbClr val="000000"/>
+                </a:solidFill>
+                <a:latin typeface="Consolas" panose="020B0609020204030204" pitchFamily="49" charset="0"/>
+              </a:rPr>
+              <a:t> =&gt;</a:t>
+            </a:r>
+          </a:p>
+          <a:p>
+            <a:r>
+              <a:rPr lang="cs-CZ" sz="1500" dirty="0">
+                <a:solidFill>
+                  <a:srgbClr val="000000"/>
+                </a:solidFill>
+                <a:latin typeface="Consolas" panose="020B0609020204030204" pitchFamily="49" charset="0"/>
+              </a:rPr>
+              <a:t>{</a:t>
+            </a:r>
+          </a:p>
+          <a:p>
+            <a:r>
+              <a:rPr lang="en-US" sz="1500" dirty="0">
+                <a:solidFill>
+                  <a:srgbClr val="000000"/>
+                </a:solidFill>
+                <a:latin typeface="Consolas" panose="020B0609020204030204" pitchFamily="49" charset="0"/>
+              </a:rPr>
+              <a:t>  settings</a:t>
+            </a:r>
+            <a:r>
+              <a:rPr lang="cs-CZ" sz="1500" dirty="0">
+                <a:solidFill>
+                  <a:srgbClr val="000000"/>
+                </a:solidFill>
+                <a:latin typeface="Consolas" panose="020B0609020204030204" pitchFamily="49" charset="0"/>
+              </a:rPr>
+              <a:t>.</a:t>
+            </a:r>
+            <a:r>
+              <a:rPr lang="en-US" sz="1500" dirty="0" err="1">
+                <a:solidFill>
+                  <a:srgbClr val="000000"/>
+                </a:solidFill>
+                <a:latin typeface="Consolas" panose="020B0609020204030204" pitchFamily="49" charset="0"/>
+              </a:rPr>
+              <a:t>SwaggerRoutes.Add</a:t>
+            </a:r>
+            <a:r>
+              <a:rPr lang="cs-CZ" sz="1500" dirty="0">
+                <a:solidFill>
+                  <a:srgbClr val="000000"/>
+                </a:solidFill>
+                <a:latin typeface="Consolas" panose="020B0609020204030204" pitchFamily="49" charset="0"/>
+              </a:rPr>
+              <a:t>(</a:t>
+            </a:r>
+            <a:endParaRPr lang="en-US" sz="1500" dirty="0">
+              <a:solidFill>
+                <a:srgbClr val="000000"/>
+              </a:solidFill>
+              <a:latin typeface="Consolas" panose="020B0609020204030204" pitchFamily="49" charset="0"/>
+            </a:endParaRPr>
+          </a:p>
+          <a:p>
+            <a:r>
+              <a:rPr lang="en-US" sz="1500" dirty="0">
+                <a:solidFill>
+                  <a:srgbClr val="000000"/>
+                </a:solidFill>
+                <a:latin typeface="Consolas" panose="020B0609020204030204" pitchFamily="49" charset="0"/>
+              </a:rPr>
+              <a:t>	new SwaggerUi3Route(</a:t>
+            </a:r>
+            <a:r>
+              <a:rPr lang="en-US" sz="1500" dirty="0">
+                <a:solidFill>
+                  <a:srgbClr val="A31515"/>
+                </a:solidFill>
+                <a:latin typeface="Consolas" panose="020B0609020204030204" pitchFamily="49" charset="0"/>
+              </a:rPr>
+              <a:t>"v1.0</a:t>
+            </a:r>
+            <a:r>
+              <a:rPr lang="cs-CZ" sz="1500" dirty="0">
+                <a:solidFill>
+                  <a:srgbClr val="A31515"/>
+                </a:solidFill>
+                <a:latin typeface="Consolas" panose="020B0609020204030204" pitchFamily="49" charset="0"/>
+              </a:rPr>
+              <a:t>"</a:t>
+            </a:r>
+            <a:r>
+              <a:rPr lang="cs-CZ" sz="1500" dirty="0">
+                <a:solidFill>
+                  <a:srgbClr val="000000"/>
+                </a:solidFill>
+                <a:latin typeface="Consolas" panose="020B0609020204030204" pitchFamily="49" charset="0"/>
+              </a:rPr>
+              <a:t>,</a:t>
+            </a:r>
+            <a:r>
+              <a:rPr lang="en-US" sz="1500" dirty="0">
+                <a:solidFill>
+                  <a:srgbClr val="000000"/>
+                </a:solidFill>
+                <a:latin typeface="Consolas" panose="020B0609020204030204" pitchFamily="49" charset="0"/>
+              </a:rPr>
+              <a:t> </a:t>
+            </a:r>
+            <a:r>
+              <a:rPr lang="en-US" sz="1500" dirty="0">
+                <a:solidFill>
+                  <a:srgbClr val="A31515"/>
+                </a:solidFill>
+                <a:latin typeface="Consolas" panose="020B0609020204030204" pitchFamily="49" charset="0"/>
+              </a:rPr>
+              <a:t>"/swagger/v1/</a:t>
+            </a:r>
+            <a:r>
+              <a:rPr lang="en-US" sz="1500" dirty="0" err="1">
+                <a:solidFill>
+                  <a:srgbClr val="A31515"/>
+                </a:solidFill>
+                <a:latin typeface="Consolas" panose="020B0609020204030204" pitchFamily="49" charset="0"/>
+              </a:rPr>
+              <a:t>swagger.json</a:t>
+            </a:r>
+            <a:r>
+              <a:rPr lang="cs-CZ" sz="1500" dirty="0">
+                <a:solidFill>
+                  <a:srgbClr val="A31515"/>
+                </a:solidFill>
+                <a:latin typeface="Consolas" panose="020B0609020204030204" pitchFamily="49" charset="0"/>
+              </a:rPr>
+              <a:t>"</a:t>
+            </a:r>
+            <a:r>
+              <a:rPr lang="cs-CZ" sz="1500" dirty="0">
+                <a:solidFill>
+                  <a:srgbClr val="000000"/>
+                </a:solidFill>
+                <a:latin typeface="Consolas" panose="020B0609020204030204" pitchFamily="49" charset="0"/>
+              </a:rPr>
+              <a:t>)</a:t>
+            </a:r>
+            <a:r>
+              <a:rPr lang="en-US" sz="1500" dirty="0">
+                <a:solidFill>
+                  <a:srgbClr val="000000"/>
+                </a:solidFill>
+                <a:latin typeface="Consolas" panose="020B0609020204030204" pitchFamily="49" charset="0"/>
+              </a:rPr>
+              <a:t>)</a:t>
+            </a:r>
+            <a:r>
+              <a:rPr lang="cs-CZ" sz="1500" dirty="0">
+                <a:solidFill>
+                  <a:srgbClr val="000000"/>
+                </a:solidFill>
+                <a:latin typeface="Consolas" panose="020B0609020204030204" pitchFamily="49" charset="0"/>
+              </a:rPr>
+              <a:t>;</a:t>
+            </a:r>
+          </a:p>
+          <a:p>
+            <a:r>
+              <a:rPr lang="cs-CZ" sz="1500" dirty="0">
+                <a:solidFill>
+                  <a:srgbClr val="000000"/>
+                </a:solidFill>
+                <a:latin typeface="Consolas" panose="020B0609020204030204" pitchFamily="49" charset="0"/>
+              </a:rPr>
+              <a:t>});</a:t>
+            </a:r>
+            <a:endParaRPr lang="cs-CZ" sz="1500" dirty="0"/>
+          </a:p>
+        </p:txBody>
+      </p:sp>
+      <p:sp>
+        <p:nvSpPr>
+          <p:cNvPr id="5" name="Rectangle 4">
+            <a:extLst>
+              <a:ext uri="{FF2B5EF4-FFF2-40B4-BE49-F238E27FC236}">
+                <a16:creationId xmlns:a16="http://schemas.microsoft.com/office/drawing/2014/main" id="{4FEAFBD2-3150-46F1-B215-5E018AD833B1}"/>
+              </a:ext>
+            </a:extLst>
+          </p:cNvPr>
+          <p:cNvSpPr/>
+          <p:nvPr/>
+        </p:nvSpPr>
+        <p:spPr>
+          <a:xfrm>
+            <a:off x="2514601" y="2764535"/>
+            <a:ext cx="1983235" cy="323165"/>
+          </a:xfrm>
+          <a:prstGeom prst="rect">
+            <a:avLst/>
+          </a:prstGeom>
+        </p:spPr>
+        <p:txBody>
+          <a:bodyPr wrap="none">
+            <a:spAutoFit/>
+          </a:bodyPr>
+          <a:lstStyle/>
+          <a:p>
+            <a:r>
+              <a:rPr lang="cs-CZ" sz="1500" dirty="0" err="1">
+                <a:solidFill>
+                  <a:srgbClr val="000000"/>
+                </a:solidFill>
+                <a:latin typeface="Consolas" panose="020B0609020204030204" pitchFamily="49" charset="0"/>
+              </a:rPr>
+              <a:t>app.Use</a:t>
+            </a:r>
+            <a:r>
+              <a:rPr lang="en-US" sz="1500" dirty="0" err="1">
+                <a:solidFill>
+                  <a:srgbClr val="000000"/>
+                </a:solidFill>
+                <a:latin typeface="Consolas" panose="020B0609020204030204" pitchFamily="49" charset="0"/>
+              </a:rPr>
+              <a:t>OpenApi</a:t>
+            </a:r>
+            <a:r>
+              <a:rPr lang="cs-CZ" sz="1500" dirty="0">
+                <a:solidFill>
+                  <a:srgbClr val="000000"/>
+                </a:solidFill>
+                <a:latin typeface="Consolas" panose="020B0609020204030204" pitchFamily="49" charset="0"/>
+              </a:rPr>
+              <a:t>();</a:t>
+            </a:r>
+            <a:endParaRPr lang="cs-CZ" sz="1500" dirty="0"/>
+          </a:p>
+        </p:txBody>
+      </p:sp>
+    </p:spTree>
+    <p:extLst>
+      <p:ext uri="{BB962C8B-B14F-4D97-AF65-F5344CB8AC3E}">
+        <p14:creationId xmlns:p14="http://schemas.microsoft.com/office/powerpoint/2010/main" val="707186793"/>
+      </p:ext>
+    </p:extLst>
+  </p:cSld>
+  <p:clrMapOvr>
+    <a:masterClrMapping/>
+  </p:clrMapOvr>
+  <p:transition spd="med">
+    <p:pull/>
+  </p:transition>
+  <p:timing>
+    <p:tnLst>
+      <p:par>
+        <p:cTn id="1" dur="indefinite" restart="never" nodeType="tmRoot">
+          <p:childTnLst>
+            <p:seq concurrent="1" nextAc="seek">
+              <p:cTn id="2" dur="indefinite" nodeType="mainSeq">
+                <p:childTnLst>
+                  <p:par>
+                    <p:cTn id="3" fill="hold">
+                      <p:stCondLst>
+                        <p:cond delay="indefinite"/>
+                      </p:stCondLst>
+                      <p:childTnLst>
+                        <p:par>
+                          <p:cTn id="4" fill="hold">
+                            <p:stCondLst>
+                              <p:cond delay="0"/>
+                            </p:stCondLst>
+                            <p:childTnLst>
+                              <p:par>
+                                <p:cTn id="5" presetID="1" presetClass="entr" presetSubtype="0" fill="hold" grpId="0" nodeType="clickEffect">
+                                  <p:stCondLst>
+                                    <p:cond delay="0"/>
+                                  </p:stCondLst>
+                                  <p:childTnLst>
+                                    <p:set>
+                                      <p:cBhvr>
+                                        <p:cTn id="6" dur="1" fill="hold">
+                                          <p:stCondLst>
+                                            <p:cond delay="0"/>
+                                          </p:stCondLst>
+                                        </p:cTn>
+                                        <p:tgtEl>
+                                          <p:spTgt spid="3">
+                                            <p:txEl>
+                                              <p:pRg st="0" end="0"/>
+                                            </p:txEl>
+                                          </p:spTgt>
+                                        </p:tgtEl>
+                                        <p:attrNameLst>
+                                          <p:attrName>style.visibility</p:attrName>
+                                        </p:attrNameLst>
+                                      </p:cBhvr>
+                                      <p:to>
+                                        <p:strVal val="visible"/>
+                                      </p:to>
+                                    </p:set>
+                                  </p:childTnLst>
+                                </p:cTn>
+                              </p:par>
+                            </p:childTnLst>
+                          </p:cTn>
+                        </p:par>
+                      </p:childTnLst>
+                    </p:cTn>
+                  </p:par>
+                  <p:par>
+                    <p:cTn id="7" fill="hold">
+                      <p:stCondLst>
+                        <p:cond delay="indefinite"/>
+                      </p:stCondLst>
+                      <p:childTnLst>
+                        <p:par>
+                          <p:cTn id="8" fill="hold">
+                            <p:stCondLst>
+                              <p:cond delay="0"/>
+                            </p:stCondLst>
+                            <p:childTnLst>
+                              <p:par>
+                                <p:cTn id="9" presetID="1" presetClass="entr" presetSubtype="0" fill="hold" grpId="0" nodeType="clickEffect">
+                                  <p:stCondLst>
+                                    <p:cond delay="0"/>
+                                  </p:stCondLst>
+                                  <p:childTnLst>
+                                    <p:set>
+                                      <p:cBhvr>
+                                        <p:cTn id="10" dur="1" fill="hold">
+                                          <p:stCondLst>
+                                            <p:cond delay="0"/>
+                                          </p:stCondLst>
+                                        </p:cTn>
+                                        <p:tgtEl>
+                                          <p:spTgt spid="5"/>
+                                        </p:tgtEl>
+                                        <p:attrNameLst>
+                                          <p:attrName>style.visibility</p:attrName>
+                                        </p:attrNameLst>
+                                      </p:cBhvr>
+                                      <p:to>
+                                        <p:strVal val="visible"/>
+                                      </p:to>
+                                    </p:set>
+                                  </p:childTnLst>
+                                </p:cTn>
+                              </p:par>
+                            </p:childTnLst>
+                          </p:cTn>
+                        </p:par>
+                      </p:childTnLst>
+                    </p:cTn>
+                  </p:par>
+                  <p:par>
+                    <p:cTn id="11" fill="hold">
+                      <p:stCondLst>
+                        <p:cond delay="indefinite"/>
+                      </p:stCondLst>
+                      <p:childTnLst>
+                        <p:par>
+                          <p:cTn id="12" fill="hold">
+                            <p:stCondLst>
+                              <p:cond delay="0"/>
+                            </p:stCondLst>
+                            <p:childTnLst>
+                              <p:par>
+                                <p:cTn id="13" presetID="1" presetClass="entr" presetSubtype="0" fill="hold" grpId="0" nodeType="clickEffect">
+                                  <p:stCondLst>
+                                    <p:cond delay="0"/>
+                                  </p:stCondLst>
+                                  <p:childTnLst>
+                                    <p:set>
+                                      <p:cBhvr>
+                                        <p:cTn id="14" dur="1" fill="hold">
+                                          <p:stCondLst>
+                                            <p:cond delay="0"/>
+                                          </p:stCondLst>
+                                        </p:cTn>
+                                        <p:tgtEl>
+                                          <p:spTgt spid="3">
+                                            <p:txEl>
+                                              <p:pRg st="3" end="3"/>
+                                            </p:txEl>
+                                          </p:spTgt>
+                                        </p:tgtEl>
+                                        <p:attrNameLst>
+                                          <p:attrName>style.visibility</p:attrName>
+                                        </p:attrNameLst>
+                                      </p:cBhvr>
+                                      <p:to>
+                                        <p:strVal val="visible"/>
+                                      </p:to>
+                                    </p:set>
+                                  </p:childTnLst>
+                                </p:cTn>
+                              </p:par>
+                            </p:childTnLst>
+                          </p:cTn>
+                        </p:par>
+                      </p:childTnLst>
+                    </p:cTn>
+                  </p:par>
+                  <p:par>
+                    <p:cTn id="15" fill="hold">
+                      <p:stCondLst>
+                        <p:cond delay="indefinite"/>
+                      </p:stCondLst>
+                      <p:childTnLst>
+                        <p:par>
+                          <p:cTn id="16" fill="hold">
+                            <p:stCondLst>
+                              <p:cond delay="0"/>
+                            </p:stCondLst>
+                            <p:childTnLst>
+                              <p:par>
+                                <p:cTn id="17" presetID="1" presetClass="entr" presetSubtype="0" fill="hold" grpId="0" nodeType="clickEffect">
+                                  <p:stCondLst>
+                                    <p:cond delay="0"/>
+                                  </p:stCondLst>
+                                  <p:childTnLst>
+                                    <p:set>
+                                      <p:cBhvr>
+                                        <p:cTn id="18" dur="1" fill="hold">
+                                          <p:stCondLst>
+                                            <p:cond delay="0"/>
+                                          </p:stCondLst>
+                                        </p:cTn>
+                                        <p:tgtEl>
+                                          <p:spTgt spid="4"/>
+                                        </p:tgtEl>
+                                        <p:attrNameLst>
+                                          <p:attrName>style.visibility</p:attrName>
+                                        </p:attrNameLst>
+                                      </p:cBhvr>
+                                      <p:to>
+                                        <p:strVal val="visible"/>
+                                      </p:to>
+                                    </p:set>
+                                  </p:childTnLst>
+                                </p:cTn>
+                              </p:par>
+                            </p:childTnLst>
+                          </p:cTn>
+                        </p:par>
+                      </p:childTnLst>
+                    </p:cTn>
+                  </p:par>
+                </p:childTnLst>
+              </p:cTn>
+              <p:prevCondLst>
+                <p:cond evt="onPrev" delay="0">
+                  <p:tgtEl>
+                    <p:sldTgt/>
+                  </p:tgtEl>
+                </p:cond>
+              </p:prevCondLst>
+              <p:nextCondLst>
+                <p:cond evt="onNext" delay="0">
+                  <p:tgtEl>
+                    <p:sldTgt/>
+                  </p:tgtEl>
+                </p:cond>
+              </p:nextCondLst>
+            </p:seq>
+          </p:childTnLst>
+        </p:cTn>
+      </p:par>
+    </p:tnLst>
+    <p:bldLst>
+      <p:bldP spid="3" grpId="0" uiExpand="1" build="p"/>
+      <p:bldP spid="4" grpId="0"/>
+      <p:bldP spid="5" grpId="0"/>
+    </p:bldLst>
+  </p:timing>
+</p:sld>
+</file>
+
+<file path=ppt/slides/slide11.xml><?xml version="1.0" encoding="utf-8"?>
+<p:sld xmlns:a="http://schemas.openxmlformats.org/drawingml/2006/main" xmlns:r="http://schemas.openxmlformats.org/officeDocument/2006/relationships" xmlns:p="http://schemas.openxmlformats.org/presentationml/2006/main">
+  <p:cSld>
+    <p:spTree>
+      <p:nvGrpSpPr>
+        <p:cNvPr id="1" name=""/>
+        <p:cNvGrpSpPr/>
+        <p:nvPr/>
+      </p:nvGrpSpPr>
+      <p:grpSpPr>
+        <a:xfrm>
+          <a:off x="0" y="0"/>
+          <a:ext cx="0" cy="0"/>
+          <a:chOff x="0" y="0"/>
+          <a:chExt cx="0" cy="0"/>
+        </a:xfrm>
+      </p:grpSpPr>
+      <p:sp>
+        <p:nvSpPr>
+          <p:cNvPr id="2" name="Title 1">
+            <a:extLst>
+              <a:ext uri="{FF2B5EF4-FFF2-40B4-BE49-F238E27FC236}">
+                <a16:creationId xmlns:a16="http://schemas.microsoft.com/office/drawing/2014/main" id="{817A16ED-6FCB-42C7-8436-F4C22FB9CD4D}"/>
+              </a:ext>
+            </a:extLst>
+          </p:cNvPr>
+          <p:cNvSpPr>
+            <a:spLocks noGrp="1"/>
+          </p:cNvSpPr>
+          <p:nvPr>
+            <p:ph type="title"/>
+          </p:nvPr>
+        </p:nvSpPr>
+        <p:spPr/>
+        <p:txBody>
+          <a:bodyPr/>
+          <a:lstStyle/>
+          <a:p>
+            <a:r>
+              <a:rPr lang="sk-SK" dirty="0" err="1"/>
+              <a:t>Swagger</a:t>
+            </a:r>
+            <a:r>
+              <a:rPr lang="sk-SK" dirty="0"/>
+              <a:t> editor</a:t>
+            </a:r>
+            <a:endParaRPr lang="cs-CZ" dirty="0"/>
+          </a:p>
+        </p:txBody>
+      </p:sp>
+      <p:sp>
+        <p:nvSpPr>
+          <p:cNvPr id="3" name="Content Placeholder 2">
+            <a:extLst>
+              <a:ext uri="{FF2B5EF4-FFF2-40B4-BE49-F238E27FC236}">
+                <a16:creationId xmlns:a16="http://schemas.microsoft.com/office/drawing/2014/main" id="{13B65318-F205-41A6-AE7E-5F1754DFC560}"/>
+              </a:ext>
+            </a:extLst>
+          </p:cNvPr>
+          <p:cNvSpPr>
+            <a:spLocks noGrp="1"/>
+          </p:cNvSpPr>
+          <p:nvPr>
+            <p:ph idx="1"/>
+          </p:nvPr>
+        </p:nvSpPr>
+        <p:spPr/>
+        <p:txBody>
+          <a:bodyPr/>
+          <a:lstStyle/>
+          <a:p>
+            <a:r>
+              <a:rPr lang="sk-SK" dirty="0"/>
+              <a:t>Online </a:t>
+            </a:r>
+            <a:r>
+              <a:rPr lang="sk-SK" dirty="0" err="1"/>
+              <a:t>verze</a:t>
+            </a:r>
+            <a:r>
+              <a:rPr lang="cs-CZ" dirty="0"/>
+              <a:t> </a:t>
+            </a:r>
+            <a:r>
+              <a:rPr lang="en-US" dirty="0">
+                <a:hlinkClick r:id="rId2"/>
+              </a:rPr>
+              <a:t>https://editor.swagger.io</a:t>
+            </a:r>
+            <a:endParaRPr lang="en-US" dirty="0"/>
+          </a:p>
+          <a:p>
+            <a:r>
+              <a:rPr lang="sk-SK" dirty="0" err="1"/>
+              <a:t>Možnost</a:t>
+            </a:r>
+            <a:r>
+              <a:rPr lang="sk-SK" dirty="0"/>
+              <a:t> </a:t>
+            </a:r>
+            <a:r>
+              <a:rPr lang="sk-SK" dirty="0" err="1"/>
+              <a:t>rozchodit</a:t>
+            </a:r>
+            <a:r>
+              <a:rPr lang="sk-SK" dirty="0"/>
+              <a:t> </a:t>
+            </a:r>
+            <a:r>
+              <a:rPr lang="sk-SK" dirty="0" err="1"/>
+              <a:t>lokálně</a:t>
+            </a:r>
+            <a:endParaRPr lang="sk-SK" dirty="0"/>
+          </a:p>
+          <a:p>
+            <a:r>
+              <a:rPr lang="sk-SK" dirty="0" err="1"/>
+              <a:t>Docker</a:t>
+            </a:r>
+            <a:r>
+              <a:rPr lang="sk-SK" dirty="0"/>
+              <a:t> image</a:t>
+            </a:r>
+          </a:p>
+        </p:txBody>
+      </p:sp>
+    </p:spTree>
+    <p:extLst>
+      <p:ext uri="{BB962C8B-B14F-4D97-AF65-F5344CB8AC3E}">
+        <p14:creationId xmlns:p14="http://schemas.microsoft.com/office/powerpoint/2010/main" val="2581044276"/>
+      </p:ext>
+    </p:extLst>
+  </p:cSld>
+  <p:clrMapOvr>
+    <a:masterClrMapping/>
+  </p:clrMapOvr>
+  <p:timing>
+    <p:tnLst>
+      <p:par>
+        <p:cTn id="1" dur="indefinite" restart="never" nodeType="tmRoot">
+          <p:childTnLst>
+            <p:seq concurrent="1" nextAc="seek">
+              <p:cTn id="2" dur="indefinite" nodeType="mainSeq">
+                <p:childTnLst>
+                  <p:par>
+                    <p:cTn id="3" fill="hold">
+                      <p:stCondLst>
+                        <p:cond delay="indefinite"/>
+                      </p:stCondLst>
+                      <p:childTnLst>
+                        <p:par>
+                          <p:cTn id="4" fill="hold">
+                            <p:stCondLst>
+                              <p:cond delay="0"/>
+                            </p:stCondLst>
+                            <p:childTnLst>
+                              <p:par>
+                                <p:cTn id="5" presetID="1" presetClass="entr" presetSubtype="0" fill="hold" grpId="0" nodeType="clickEffect">
+                                  <p:stCondLst>
+                                    <p:cond delay="0"/>
+                                  </p:stCondLst>
+                                  <p:childTnLst>
+                                    <p:set>
+                                      <p:cBhvr>
+                                        <p:cTn id="6" dur="1" fill="hold">
+                                          <p:stCondLst>
+                                            <p:cond delay="0"/>
+                                          </p:stCondLst>
+                                        </p:cTn>
+                                        <p:tgtEl>
+                                          <p:spTgt spid="3">
+                                            <p:txEl>
+                                              <p:pRg st="0" end="0"/>
+                                            </p:txEl>
+                                          </p:spTgt>
+                                        </p:tgtEl>
+                                        <p:attrNameLst>
+                                          <p:attrName>style.visibility</p:attrName>
+                                        </p:attrNameLst>
+                                      </p:cBhvr>
+                                      <p:to>
+                                        <p:strVal val="visible"/>
+                                      </p:to>
+                                    </p:set>
+                                  </p:childTnLst>
+                                </p:cTn>
+                              </p:par>
+                            </p:childTnLst>
+                          </p:cTn>
+                        </p:par>
+                      </p:childTnLst>
+                    </p:cTn>
+                  </p:par>
+                  <p:par>
+                    <p:cTn id="7" fill="hold">
+                      <p:stCondLst>
+                        <p:cond delay="indefinite"/>
+                      </p:stCondLst>
+                      <p:childTnLst>
+                        <p:par>
+                          <p:cTn id="8" fill="hold">
+                            <p:stCondLst>
+                              <p:cond delay="0"/>
+                            </p:stCondLst>
+                            <p:childTnLst>
+                              <p:par>
+                                <p:cTn id="9" presetID="1" presetClass="entr" presetSubtype="0" fill="hold" grpId="0" nodeType="clickEffect">
+                                  <p:stCondLst>
+                                    <p:cond delay="0"/>
+                                  </p:stCondLst>
+                                  <p:childTnLst>
+                                    <p:set>
+                                      <p:cBhvr>
+                                        <p:cTn id="10" dur="1" fill="hold">
+                                          <p:stCondLst>
+                                            <p:cond delay="0"/>
+                                          </p:stCondLst>
+                                        </p:cTn>
+                                        <p:tgtEl>
+                                          <p:spTgt spid="3">
+                                            <p:txEl>
+                                              <p:pRg st="1" end="1"/>
+                                            </p:txEl>
+                                          </p:spTgt>
+                                        </p:tgtEl>
+                                        <p:attrNameLst>
+                                          <p:attrName>style.visibility</p:attrName>
+                                        </p:attrNameLst>
+                                      </p:cBhvr>
+                                      <p:to>
+                                        <p:strVal val="visible"/>
+                                      </p:to>
+                                    </p:set>
+                                  </p:childTnLst>
+                                </p:cTn>
+                              </p:par>
+                            </p:childTnLst>
+                          </p:cTn>
+                        </p:par>
+                      </p:childTnLst>
+                    </p:cTn>
+                  </p:par>
+                  <p:par>
+                    <p:cTn id="11" fill="hold">
+                      <p:stCondLst>
+                        <p:cond delay="indefinite"/>
+                      </p:stCondLst>
+                      <p:childTnLst>
+                        <p:par>
+                          <p:cTn id="12" fill="hold">
+                            <p:stCondLst>
+                              <p:cond delay="0"/>
+                            </p:stCondLst>
+                            <p:childTnLst>
+                              <p:par>
+                                <p:cTn id="13" presetID="1" presetClass="entr" presetSubtype="0" fill="hold" grpId="0" nodeType="clickEffect">
+                                  <p:stCondLst>
+                                    <p:cond delay="0"/>
+                                  </p:stCondLst>
+                                  <p:childTnLst>
+                                    <p:set>
+                                      <p:cBhvr>
+                                        <p:cTn id="14" dur="1" fill="hold">
+                                          <p:stCondLst>
+                                            <p:cond delay="0"/>
+                                          </p:stCondLst>
+                                        </p:cTn>
+                                        <p:tgtEl>
+                                          <p:spTgt spid="3">
+                                            <p:txEl>
+                                              <p:pRg st="2" end="2"/>
+                                            </p:txEl>
+                                          </p:spTgt>
+                                        </p:tgtEl>
+                                        <p:attrNameLst>
+                                          <p:attrName>style.visibility</p:attrName>
+                                        </p:attrNameLst>
+                                      </p:cBhvr>
+                                      <p:to>
+                                        <p:strVal val="visible"/>
+                                      </p:to>
+                                    </p:set>
+                                  </p:childTnLst>
+                                </p:cTn>
+                              </p:par>
+                            </p:childTnLst>
+                          </p:cTn>
+                        </p:par>
+                      </p:childTnLst>
+                    </p:cTn>
+                  </p:par>
+                </p:childTnLst>
+              </p:cTn>
+              <p:prevCondLst>
+                <p:cond evt="onPrev" delay="0">
+                  <p:tgtEl>
+                    <p:sldTgt/>
+                  </p:tgtEl>
+                </p:cond>
+              </p:prevCondLst>
+              <p:nextCondLst>
+                <p:cond evt="onNext" delay="0">
+                  <p:tgtEl>
+                    <p:sldTgt/>
+                  </p:tgtEl>
+                </p:cond>
+              </p:nextCondLst>
+            </p:seq>
+          </p:childTnLst>
+        </p:cTn>
+      </p:par>
+    </p:tnLst>
+    <p:bldLst>
+      <p:bldP spid="3" grpId="0" build="p"/>
+    </p:bldLst>
+  </p:timing>
+</p:sld>
+</file>
+
+<file path=ppt/slides/slide12.xml><?xml version="1.0" encoding="utf-8"?>
+<p:sld xmlns:a="http://schemas.openxmlformats.org/drawingml/2006/main" xmlns:r="http://schemas.openxmlformats.org/officeDocument/2006/relationships" xmlns:p="http://schemas.openxmlformats.org/presentationml/2006/main">
+  <p:cSld>
+    <p:spTree>
+      <p:nvGrpSpPr>
+        <p:cNvPr id="1" name=""/>
+        <p:cNvGrpSpPr/>
+        <p:nvPr/>
+      </p:nvGrpSpPr>
+      <p:grpSpPr>
+        <a:xfrm>
+          <a:off x="0" y="0"/>
+          <a:ext cx="0" cy="0"/>
+          <a:chOff x="0" y="0"/>
+          <a:chExt cx="0" cy="0"/>
+        </a:xfrm>
+      </p:grpSpPr>
+      <p:sp>
+        <p:nvSpPr>
+          <p:cNvPr id="2" name="Title 1">
+            <a:extLst>
+              <a:ext uri="{FF2B5EF4-FFF2-40B4-BE49-F238E27FC236}">
                 <a16:creationId xmlns:a16="http://schemas.microsoft.com/office/drawing/2014/main" id="{AA1B6C51-A7A7-4AD3-8C99-8DDE6E8C4A8F}"/>
               </a:ext>
             </a:extLst>
@@ -21846,7 +22847,7 @@
 </p:sld>
 </file>
 
-<file path=ppt/slides/slide11.xml><?xml version="1.0" encoding="utf-8"?>
+<file path=ppt/slides/slide13.xml><?xml version="1.0" encoding="utf-8"?>
 <p:sld xmlns:a="http://schemas.openxmlformats.org/drawingml/2006/main" xmlns:r="http://schemas.openxmlformats.org/officeDocument/2006/relationships" xmlns:p="http://schemas.openxmlformats.org/presentationml/2006/main">
   <p:cSld>
     <p:spTree>
@@ -22342,7 +23343,7 @@
 </p:sld>
 </file>
 
-<file path=ppt/slides/slide12.xml><?xml version="1.0" encoding="utf-8"?>
+<file path=ppt/slides/slide14.xml><?xml version="1.0" encoding="utf-8"?>
 <p:sld xmlns:a="http://schemas.openxmlformats.org/drawingml/2006/main" xmlns:r="http://schemas.openxmlformats.org/officeDocument/2006/relationships" xmlns:p="http://schemas.openxmlformats.org/presentationml/2006/main">
   <p:cSld>
     <p:spTree>
@@ -22656,7 +23657,7 @@
 </p:sld>
 </file>
 
-<file path=ppt/slides/slide13.xml><?xml version="1.0" encoding="utf-8"?>
+<file path=ppt/slides/slide15.xml><?xml version="1.0" encoding="utf-8"?>
 <p:sld xmlns:a="http://schemas.openxmlformats.org/drawingml/2006/main" xmlns:r="http://schemas.openxmlformats.org/officeDocument/2006/relationships" xmlns:p="http://schemas.openxmlformats.org/presentationml/2006/main">
   <p:cSld>
     <p:spTree>
@@ -23176,7 +24177,7 @@
 </p:sld>
 </file>
 
-<file path=ppt/slides/slide14.xml><?xml version="1.0" encoding="utf-8"?>
+<file path=ppt/slides/slide16.xml><?xml version="1.0" encoding="utf-8"?>
 <p:sld xmlns:a="http://schemas.openxmlformats.org/drawingml/2006/main" xmlns:r="http://schemas.openxmlformats.org/officeDocument/2006/relationships" xmlns:p="http://schemas.openxmlformats.org/presentationml/2006/main">
   <p:cSld>
     <p:spTree>
@@ -23537,7 +24538,7 @@
 </p:sld>
 </file>
 
-<file path=ppt/slides/slide15.xml><?xml version="1.0" encoding="utf-8"?>
+<file path=ppt/slides/slide17.xml><?xml version="1.0" encoding="utf-8"?>
 <p:sld xmlns:a="http://schemas.openxmlformats.org/drawingml/2006/main" xmlns:r="http://schemas.openxmlformats.org/officeDocument/2006/relationships" xmlns:p="http://schemas.openxmlformats.org/presentationml/2006/main">
   <p:cSld>
     <p:spTree>
@@ -24007,6 +25008,796 @@
 </file>
 
 <file path=ppt/slides/slide2.xml><?xml version="1.0" encoding="utf-8"?>
+<p:sld xmlns:a="http://schemas.openxmlformats.org/drawingml/2006/main" xmlns:r="http://schemas.openxmlformats.org/officeDocument/2006/relationships" xmlns:p="http://schemas.openxmlformats.org/presentationml/2006/main">
+  <p:cSld>
+    <p:spTree>
+      <p:nvGrpSpPr>
+        <p:cNvPr id="1" name=""/>
+        <p:cNvGrpSpPr/>
+        <p:nvPr/>
+      </p:nvGrpSpPr>
+      <p:grpSpPr>
+        <a:xfrm>
+          <a:off x="0" y="0"/>
+          <a:ext cx="0" cy="0"/>
+          <a:chOff x="0" y="0"/>
+          <a:chExt cx="0" cy="0"/>
+        </a:xfrm>
+      </p:grpSpPr>
+      <p:sp>
+        <p:nvSpPr>
+          <p:cNvPr id="2" name="Title 1">
+            <a:extLst>
+              <a:ext uri="{FF2B5EF4-FFF2-40B4-BE49-F238E27FC236}">
+                <a16:creationId xmlns:a16="http://schemas.microsoft.com/office/drawing/2014/main" id="{D9326510-A266-4488-9B23-4363F6221417}"/>
+              </a:ext>
+            </a:extLst>
+          </p:cNvPr>
+          <p:cNvSpPr>
+            <a:spLocks noGrp="1"/>
+          </p:cNvSpPr>
+          <p:nvPr>
+            <p:ph type="title"/>
+          </p:nvPr>
+        </p:nvSpPr>
+        <p:spPr/>
+        <p:txBody>
+          <a:bodyPr/>
+          <a:lstStyle/>
+          <a:p>
+            <a:r>
+              <a:rPr lang="en-US" dirty="0" err="1"/>
+              <a:t>Opakov</a:t>
+            </a:r>
+            <a:r>
+              <a:rPr lang="sk-SK" dirty="0" err="1"/>
+              <a:t>ání</a:t>
+            </a:r>
+            <a:endParaRPr lang="en-US" dirty="0"/>
+          </a:p>
+        </p:txBody>
+      </p:sp>
+      <p:sp>
+        <p:nvSpPr>
+          <p:cNvPr id="3" name="Content Placeholder 2">
+            <a:extLst>
+              <a:ext uri="{FF2B5EF4-FFF2-40B4-BE49-F238E27FC236}">
+                <a16:creationId xmlns:a16="http://schemas.microsoft.com/office/drawing/2014/main" id="{C8A72717-8679-48D1-AB94-5F7F0D76DD43}"/>
+              </a:ext>
+            </a:extLst>
+          </p:cNvPr>
+          <p:cNvSpPr>
+            <a:spLocks noGrp="1"/>
+          </p:cNvSpPr>
+          <p:nvPr>
+            <p:ph idx="1"/>
+          </p:nvPr>
+        </p:nvSpPr>
+        <p:spPr/>
+        <p:txBody>
+          <a:bodyPr/>
+          <a:lstStyle/>
+          <a:p>
+            <a:pPr>
+              <a:buFont typeface="Arial" panose="020B0604020202020204" pitchFamily="34" charset="0"/>
+              <a:buChar char="•"/>
+            </a:pPr>
+            <a:r>
+              <a:rPr lang="sk-SK" dirty="0"/>
+              <a:t> O </a:t>
+            </a:r>
+            <a:r>
+              <a:rPr lang="sk-SK" dirty="0" err="1"/>
+              <a:t>jakých</a:t>
+            </a:r>
+            <a:r>
+              <a:rPr lang="sk-SK" dirty="0"/>
+              <a:t> 3 </a:t>
+            </a:r>
+            <a:r>
+              <a:rPr lang="sk-SK" dirty="0" err="1"/>
+              <a:t>typech</a:t>
+            </a:r>
+            <a:r>
+              <a:rPr lang="sk-SK" dirty="0"/>
+              <a:t> </a:t>
+            </a:r>
+            <a:r>
+              <a:rPr lang="sk-SK" dirty="0" err="1"/>
+              <a:t>úložišť</a:t>
+            </a:r>
+            <a:r>
+              <a:rPr lang="sk-SK" dirty="0"/>
+              <a:t> </a:t>
+            </a:r>
+            <a:r>
+              <a:rPr lang="sk-SK" dirty="0" err="1"/>
+              <a:t>jsme</a:t>
+            </a:r>
+            <a:r>
+              <a:rPr lang="sk-SK" dirty="0"/>
+              <a:t> </a:t>
+            </a:r>
+            <a:r>
+              <a:rPr lang="sk-SK" dirty="0" err="1"/>
+              <a:t>se</a:t>
+            </a:r>
+            <a:r>
+              <a:rPr lang="sk-SK" dirty="0"/>
+              <a:t> </a:t>
+            </a:r>
+            <a:r>
+              <a:rPr lang="sk-SK" dirty="0" err="1"/>
+              <a:t>posledně</a:t>
+            </a:r>
+            <a:r>
+              <a:rPr lang="sk-SK" dirty="0"/>
+              <a:t> bavili?</a:t>
+            </a:r>
+          </a:p>
+          <a:p>
+            <a:pPr>
+              <a:buFont typeface="Arial" panose="020B0604020202020204" pitchFamily="34" charset="0"/>
+              <a:buChar char="•"/>
+            </a:pPr>
+            <a:r>
+              <a:rPr lang="sk-SK" dirty="0"/>
+              <a:t> K </a:t>
+            </a:r>
+            <a:r>
+              <a:rPr lang="sk-SK" dirty="0" err="1"/>
+              <a:t>čemu</a:t>
+            </a:r>
+            <a:r>
+              <a:rPr lang="sk-SK" dirty="0"/>
+              <a:t> </a:t>
+            </a:r>
+            <a:r>
+              <a:rPr lang="sk-SK" dirty="0" err="1"/>
+              <a:t>můžeme</a:t>
+            </a:r>
+            <a:r>
+              <a:rPr lang="sk-SK" dirty="0"/>
+              <a:t> </a:t>
+            </a:r>
+            <a:r>
+              <a:rPr lang="sk-SK" dirty="0" err="1"/>
+              <a:t>využít</a:t>
+            </a:r>
+            <a:r>
+              <a:rPr lang="sk-SK" dirty="0"/>
+              <a:t> </a:t>
+            </a:r>
+            <a:r>
+              <a:rPr lang="sk-SK" dirty="0" err="1"/>
+              <a:t>Preferences</a:t>
+            </a:r>
+            <a:r>
+              <a:rPr lang="sk-SK" dirty="0"/>
+              <a:t>?</a:t>
+            </a:r>
+          </a:p>
+          <a:p>
+            <a:pPr>
+              <a:buFont typeface="Arial" panose="020B0604020202020204" pitchFamily="34" charset="0"/>
+              <a:buChar char="•"/>
+            </a:pPr>
+            <a:r>
+              <a:rPr lang="sk-SK" dirty="0"/>
+              <a:t> K </a:t>
+            </a:r>
+            <a:r>
+              <a:rPr lang="sk-SK" dirty="0" err="1"/>
+              <a:t>čemu</a:t>
+            </a:r>
+            <a:r>
+              <a:rPr lang="sk-SK" dirty="0"/>
+              <a:t> </a:t>
+            </a:r>
+            <a:r>
+              <a:rPr lang="sk-SK" dirty="0" err="1"/>
+              <a:t>můžeme</a:t>
+            </a:r>
+            <a:r>
+              <a:rPr lang="sk-SK" dirty="0"/>
+              <a:t> </a:t>
+            </a:r>
+            <a:r>
+              <a:rPr lang="sk-SK" dirty="0" err="1"/>
+              <a:t>využít</a:t>
+            </a:r>
+            <a:r>
+              <a:rPr lang="sk-SK" dirty="0"/>
+              <a:t> </a:t>
+            </a:r>
+            <a:r>
+              <a:rPr lang="sk-SK" dirty="0" err="1"/>
+              <a:t>Secure</a:t>
+            </a:r>
+            <a:r>
+              <a:rPr lang="sk-SK" dirty="0"/>
+              <a:t> </a:t>
+            </a:r>
+            <a:r>
+              <a:rPr lang="sk-SK" dirty="0" err="1"/>
+              <a:t>Storage</a:t>
+            </a:r>
+            <a:r>
+              <a:rPr lang="sk-SK" dirty="0"/>
+              <a:t>?</a:t>
+            </a:r>
+          </a:p>
+          <a:p>
+            <a:pPr>
+              <a:buFont typeface="Arial" panose="020B0604020202020204" pitchFamily="34" charset="0"/>
+              <a:buChar char="•"/>
+            </a:pPr>
+            <a:r>
+              <a:rPr lang="sk-SK" dirty="0"/>
+              <a:t> K </a:t>
+            </a:r>
+            <a:r>
+              <a:rPr lang="sk-SK" dirty="0" err="1"/>
+              <a:t>čemu</a:t>
+            </a:r>
+            <a:r>
+              <a:rPr lang="sk-SK" dirty="0"/>
+              <a:t> </a:t>
+            </a:r>
+            <a:r>
+              <a:rPr lang="sk-SK" dirty="0" err="1"/>
+              <a:t>můžeme</a:t>
+            </a:r>
+            <a:r>
+              <a:rPr lang="sk-SK" dirty="0"/>
+              <a:t> </a:t>
+            </a:r>
+            <a:r>
+              <a:rPr lang="sk-SK" dirty="0" err="1"/>
+              <a:t>využít</a:t>
+            </a:r>
+            <a:r>
+              <a:rPr lang="sk-SK" dirty="0"/>
+              <a:t> </a:t>
+            </a:r>
+            <a:r>
+              <a:rPr lang="sk-SK" dirty="0" err="1"/>
+              <a:t>SQLite</a:t>
+            </a:r>
+            <a:r>
+              <a:rPr lang="sk-SK" dirty="0"/>
+              <a:t> </a:t>
+            </a:r>
+            <a:r>
+              <a:rPr lang="sk-SK" dirty="0" err="1"/>
+              <a:t>databázi</a:t>
+            </a:r>
+            <a:r>
+              <a:rPr lang="sk-SK" dirty="0"/>
+              <a:t>?</a:t>
+            </a:r>
+          </a:p>
+          <a:p>
+            <a:pPr>
+              <a:buFont typeface="Arial" panose="020B0604020202020204" pitchFamily="34" charset="0"/>
+              <a:buChar char="•"/>
+            </a:pPr>
+            <a:r>
+              <a:rPr lang="sk-SK" dirty="0"/>
+              <a:t> Jak funguje </a:t>
+            </a:r>
+            <a:r>
+              <a:rPr lang="sk-SK" dirty="0" err="1"/>
+              <a:t>SQLite</a:t>
+            </a:r>
+            <a:r>
+              <a:rPr lang="sk-SK" dirty="0"/>
+              <a:t> databáze?</a:t>
+            </a:r>
+            <a:endParaRPr lang="en-US" dirty="0"/>
+          </a:p>
+        </p:txBody>
+      </p:sp>
+    </p:spTree>
+    <p:extLst>
+      <p:ext uri="{BB962C8B-B14F-4D97-AF65-F5344CB8AC3E}">
+        <p14:creationId xmlns:p14="http://schemas.microsoft.com/office/powerpoint/2010/main" val="3756202195"/>
+      </p:ext>
+    </p:extLst>
+  </p:cSld>
+  <p:clrMapOvr>
+    <a:masterClrMapping/>
+  </p:clrMapOvr>
+  <p:timing>
+    <p:tnLst>
+      <p:par>
+        <p:cTn id="1" dur="indefinite" restart="never" nodeType="tmRoot">
+          <p:childTnLst>
+            <p:seq concurrent="1" nextAc="seek">
+              <p:cTn id="2" dur="indefinite" nodeType="mainSeq">
+                <p:childTnLst>
+                  <p:par>
+                    <p:cTn id="3" fill="hold">
+                      <p:stCondLst>
+                        <p:cond delay="indefinite"/>
+                      </p:stCondLst>
+                      <p:childTnLst>
+                        <p:par>
+                          <p:cTn id="4" fill="hold">
+                            <p:stCondLst>
+                              <p:cond delay="0"/>
+                            </p:stCondLst>
+                            <p:childTnLst>
+                              <p:par>
+                                <p:cTn id="5" presetID="1" presetClass="entr" presetSubtype="0" fill="hold" grpId="0" nodeType="clickEffect">
+                                  <p:stCondLst>
+                                    <p:cond delay="0"/>
+                                  </p:stCondLst>
+                                  <p:childTnLst>
+                                    <p:set>
+                                      <p:cBhvr>
+                                        <p:cTn id="6" dur="1" fill="hold">
+                                          <p:stCondLst>
+                                            <p:cond delay="0"/>
+                                          </p:stCondLst>
+                                        </p:cTn>
+                                        <p:tgtEl>
+                                          <p:spTgt spid="3">
+                                            <p:txEl>
+                                              <p:pRg st="0" end="0"/>
+                                            </p:txEl>
+                                          </p:spTgt>
+                                        </p:tgtEl>
+                                        <p:attrNameLst>
+                                          <p:attrName>style.visibility</p:attrName>
+                                        </p:attrNameLst>
+                                      </p:cBhvr>
+                                      <p:to>
+                                        <p:strVal val="visible"/>
+                                      </p:to>
+                                    </p:set>
+                                  </p:childTnLst>
+                                </p:cTn>
+                              </p:par>
+                            </p:childTnLst>
+                          </p:cTn>
+                        </p:par>
+                      </p:childTnLst>
+                    </p:cTn>
+                  </p:par>
+                  <p:par>
+                    <p:cTn id="7" fill="hold">
+                      <p:stCondLst>
+                        <p:cond delay="indefinite"/>
+                      </p:stCondLst>
+                      <p:childTnLst>
+                        <p:par>
+                          <p:cTn id="8" fill="hold">
+                            <p:stCondLst>
+                              <p:cond delay="0"/>
+                            </p:stCondLst>
+                            <p:childTnLst>
+                              <p:par>
+                                <p:cTn id="9" presetID="1" presetClass="entr" presetSubtype="0" fill="hold" grpId="0" nodeType="clickEffect">
+                                  <p:stCondLst>
+                                    <p:cond delay="0"/>
+                                  </p:stCondLst>
+                                  <p:childTnLst>
+                                    <p:set>
+                                      <p:cBhvr>
+                                        <p:cTn id="10" dur="1" fill="hold">
+                                          <p:stCondLst>
+                                            <p:cond delay="0"/>
+                                          </p:stCondLst>
+                                        </p:cTn>
+                                        <p:tgtEl>
+                                          <p:spTgt spid="3">
+                                            <p:txEl>
+                                              <p:pRg st="1" end="1"/>
+                                            </p:txEl>
+                                          </p:spTgt>
+                                        </p:tgtEl>
+                                        <p:attrNameLst>
+                                          <p:attrName>style.visibility</p:attrName>
+                                        </p:attrNameLst>
+                                      </p:cBhvr>
+                                      <p:to>
+                                        <p:strVal val="visible"/>
+                                      </p:to>
+                                    </p:set>
+                                  </p:childTnLst>
+                                </p:cTn>
+                              </p:par>
+                            </p:childTnLst>
+                          </p:cTn>
+                        </p:par>
+                      </p:childTnLst>
+                    </p:cTn>
+                  </p:par>
+                  <p:par>
+                    <p:cTn id="11" fill="hold">
+                      <p:stCondLst>
+                        <p:cond delay="indefinite"/>
+                      </p:stCondLst>
+                      <p:childTnLst>
+                        <p:par>
+                          <p:cTn id="12" fill="hold">
+                            <p:stCondLst>
+                              <p:cond delay="0"/>
+                            </p:stCondLst>
+                            <p:childTnLst>
+                              <p:par>
+                                <p:cTn id="13" presetID="1" presetClass="entr" presetSubtype="0" fill="hold" grpId="0" nodeType="clickEffect">
+                                  <p:stCondLst>
+                                    <p:cond delay="0"/>
+                                  </p:stCondLst>
+                                  <p:childTnLst>
+                                    <p:set>
+                                      <p:cBhvr>
+                                        <p:cTn id="14" dur="1" fill="hold">
+                                          <p:stCondLst>
+                                            <p:cond delay="0"/>
+                                          </p:stCondLst>
+                                        </p:cTn>
+                                        <p:tgtEl>
+                                          <p:spTgt spid="3">
+                                            <p:txEl>
+                                              <p:pRg st="2" end="2"/>
+                                            </p:txEl>
+                                          </p:spTgt>
+                                        </p:tgtEl>
+                                        <p:attrNameLst>
+                                          <p:attrName>style.visibility</p:attrName>
+                                        </p:attrNameLst>
+                                      </p:cBhvr>
+                                      <p:to>
+                                        <p:strVal val="visible"/>
+                                      </p:to>
+                                    </p:set>
+                                  </p:childTnLst>
+                                </p:cTn>
+                              </p:par>
+                            </p:childTnLst>
+                          </p:cTn>
+                        </p:par>
+                      </p:childTnLst>
+                    </p:cTn>
+                  </p:par>
+                  <p:par>
+                    <p:cTn id="15" fill="hold">
+                      <p:stCondLst>
+                        <p:cond delay="indefinite"/>
+                      </p:stCondLst>
+                      <p:childTnLst>
+                        <p:par>
+                          <p:cTn id="16" fill="hold">
+                            <p:stCondLst>
+                              <p:cond delay="0"/>
+                            </p:stCondLst>
+                            <p:childTnLst>
+                              <p:par>
+                                <p:cTn id="17" presetID="1" presetClass="entr" presetSubtype="0" fill="hold" grpId="0" nodeType="clickEffect">
+                                  <p:stCondLst>
+                                    <p:cond delay="0"/>
+                                  </p:stCondLst>
+                                  <p:childTnLst>
+                                    <p:set>
+                                      <p:cBhvr>
+                                        <p:cTn id="18" dur="1" fill="hold">
+                                          <p:stCondLst>
+                                            <p:cond delay="0"/>
+                                          </p:stCondLst>
+                                        </p:cTn>
+                                        <p:tgtEl>
+                                          <p:spTgt spid="3">
+                                            <p:txEl>
+                                              <p:pRg st="3" end="3"/>
+                                            </p:txEl>
+                                          </p:spTgt>
+                                        </p:tgtEl>
+                                        <p:attrNameLst>
+                                          <p:attrName>style.visibility</p:attrName>
+                                        </p:attrNameLst>
+                                      </p:cBhvr>
+                                      <p:to>
+                                        <p:strVal val="visible"/>
+                                      </p:to>
+                                    </p:set>
+                                  </p:childTnLst>
+                                </p:cTn>
+                              </p:par>
+                            </p:childTnLst>
+                          </p:cTn>
+                        </p:par>
+                      </p:childTnLst>
+                    </p:cTn>
+                  </p:par>
+                  <p:par>
+                    <p:cTn id="19" fill="hold">
+                      <p:stCondLst>
+                        <p:cond delay="indefinite"/>
+                      </p:stCondLst>
+                      <p:childTnLst>
+                        <p:par>
+                          <p:cTn id="20" fill="hold">
+                            <p:stCondLst>
+                              <p:cond delay="0"/>
+                            </p:stCondLst>
+                            <p:childTnLst>
+                              <p:par>
+                                <p:cTn id="21" presetID="1" presetClass="entr" presetSubtype="0" fill="hold" grpId="0" nodeType="clickEffect">
+                                  <p:stCondLst>
+                                    <p:cond delay="0"/>
+                                  </p:stCondLst>
+                                  <p:childTnLst>
+                                    <p:set>
+                                      <p:cBhvr>
+                                        <p:cTn id="22" dur="1" fill="hold">
+                                          <p:stCondLst>
+                                            <p:cond delay="0"/>
+                                          </p:stCondLst>
+                                        </p:cTn>
+                                        <p:tgtEl>
+                                          <p:spTgt spid="3">
+                                            <p:txEl>
+                                              <p:pRg st="4" end="4"/>
+                                            </p:txEl>
+                                          </p:spTgt>
+                                        </p:tgtEl>
+                                        <p:attrNameLst>
+                                          <p:attrName>style.visibility</p:attrName>
+                                        </p:attrNameLst>
+                                      </p:cBhvr>
+                                      <p:to>
+                                        <p:strVal val="visible"/>
+                                      </p:to>
+                                    </p:set>
+                                  </p:childTnLst>
+                                </p:cTn>
+                              </p:par>
+                            </p:childTnLst>
+                          </p:cTn>
+                        </p:par>
+                      </p:childTnLst>
+                    </p:cTn>
+                  </p:par>
+                </p:childTnLst>
+              </p:cTn>
+              <p:prevCondLst>
+                <p:cond evt="onPrev" delay="0">
+                  <p:tgtEl>
+                    <p:sldTgt/>
+                  </p:tgtEl>
+                </p:cond>
+              </p:prevCondLst>
+              <p:nextCondLst>
+                <p:cond evt="onNext" delay="0">
+                  <p:tgtEl>
+                    <p:sldTgt/>
+                  </p:tgtEl>
+                </p:cond>
+              </p:nextCondLst>
+            </p:seq>
+          </p:childTnLst>
+        </p:cTn>
+      </p:par>
+    </p:tnLst>
+    <p:bldLst>
+      <p:bldP spid="3" grpId="0" build="p"/>
+    </p:bldLst>
+  </p:timing>
+</p:sld>
+</file>
+
+<file path=ppt/slides/slide3.xml><?xml version="1.0" encoding="utf-8"?>
+<p:sld xmlns:a="http://schemas.openxmlformats.org/drawingml/2006/main" xmlns:r="http://schemas.openxmlformats.org/officeDocument/2006/relationships" xmlns:p="http://schemas.openxmlformats.org/presentationml/2006/main">
+  <p:cSld>
+    <p:spTree>
+      <p:nvGrpSpPr>
+        <p:cNvPr id="1" name=""/>
+        <p:cNvGrpSpPr/>
+        <p:nvPr/>
+      </p:nvGrpSpPr>
+      <p:grpSpPr>
+        <a:xfrm>
+          <a:off x="0" y="0"/>
+          <a:ext cx="0" cy="0"/>
+          <a:chOff x="0" y="0"/>
+          <a:chExt cx="0" cy="0"/>
+        </a:xfrm>
+      </p:grpSpPr>
+      <p:sp>
+        <p:nvSpPr>
+          <p:cNvPr id="2" name="Title 1">
+            <a:extLst>
+              <a:ext uri="{FF2B5EF4-FFF2-40B4-BE49-F238E27FC236}">
+                <a16:creationId xmlns:a16="http://schemas.microsoft.com/office/drawing/2014/main" id="{183275FF-7FB3-4611-929B-5E811367A7DC}"/>
+              </a:ext>
+            </a:extLst>
+          </p:cNvPr>
+          <p:cNvSpPr>
+            <a:spLocks noGrp="1"/>
+          </p:cNvSpPr>
+          <p:nvPr>
+            <p:ph type="title"/>
+          </p:nvPr>
+        </p:nvSpPr>
+        <p:spPr/>
+        <p:txBody>
+          <a:bodyPr/>
+          <a:lstStyle/>
+          <a:p>
+            <a:r>
+              <a:rPr lang="sk-SK" dirty="0"/>
+              <a:t>Dnešní </a:t>
+            </a:r>
+            <a:r>
+              <a:rPr lang="sk-SK" dirty="0" err="1"/>
+              <a:t>cíle</a:t>
+            </a:r>
+            <a:endParaRPr lang="en-US" dirty="0"/>
+          </a:p>
+        </p:txBody>
+      </p:sp>
+      <p:sp>
+        <p:nvSpPr>
+          <p:cNvPr id="3" name="Content Placeholder 2">
+            <a:extLst>
+              <a:ext uri="{FF2B5EF4-FFF2-40B4-BE49-F238E27FC236}">
+                <a16:creationId xmlns:a16="http://schemas.microsoft.com/office/drawing/2014/main" id="{A2D7A969-796D-4B0B-B332-3E730CAE3E08}"/>
+              </a:ext>
+            </a:extLst>
+          </p:cNvPr>
+          <p:cNvSpPr>
+            <a:spLocks noGrp="1"/>
+          </p:cNvSpPr>
+          <p:nvPr>
+            <p:ph idx="1"/>
+          </p:nvPr>
+        </p:nvSpPr>
+        <p:spPr/>
+        <p:txBody>
+          <a:bodyPr/>
+          <a:lstStyle/>
+          <a:p>
+            <a:pPr>
+              <a:buFont typeface="Arial" panose="020B0604020202020204" pitchFamily="34" charset="0"/>
+              <a:buChar char="•"/>
+            </a:pPr>
+            <a:r>
+              <a:rPr lang="sk-SK" dirty="0"/>
+              <a:t> </a:t>
+            </a:r>
+            <a:r>
+              <a:rPr lang="sk-SK" dirty="0" err="1"/>
+              <a:t>Seznámit</a:t>
+            </a:r>
+            <a:r>
+              <a:rPr lang="sk-SK" dirty="0"/>
+              <a:t> </a:t>
+            </a:r>
+            <a:r>
+              <a:rPr lang="sk-SK" dirty="0" err="1"/>
+              <a:t>se</a:t>
+            </a:r>
+            <a:r>
+              <a:rPr lang="sk-SK" dirty="0"/>
+              <a:t> s koncepty </a:t>
+            </a:r>
+            <a:r>
+              <a:rPr lang="sk-SK" dirty="0" err="1"/>
+              <a:t>specifikace</a:t>
+            </a:r>
+            <a:r>
+              <a:rPr lang="sk-SK" dirty="0"/>
+              <a:t> API</a:t>
+            </a:r>
+          </a:p>
+          <a:p>
+            <a:pPr>
+              <a:buFont typeface="Arial" panose="020B0604020202020204" pitchFamily="34" charset="0"/>
+              <a:buChar char="•"/>
+            </a:pPr>
+            <a:r>
+              <a:rPr lang="sk-SK" dirty="0"/>
+              <a:t> </a:t>
+            </a:r>
+            <a:r>
+              <a:rPr lang="sk-SK" dirty="0" err="1"/>
+              <a:t>Seznámit</a:t>
+            </a:r>
+            <a:r>
+              <a:rPr lang="sk-SK" dirty="0"/>
+              <a:t> </a:t>
+            </a:r>
+            <a:r>
+              <a:rPr lang="sk-SK" dirty="0" err="1"/>
+              <a:t>se</a:t>
+            </a:r>
+            <a:r>
+              <a:rPr lang="sk-SK" dirty="0"/>
+              <a:t> s </a:t>
+            </a:r>
+            <a:r>
+              <a:rPr lang="sk-SK" dirty="0" err="1"/>
+              <a:t>principy</a:t>
+            </a:r>
+            <a:r>
+              <a:rPr lang="sk-SK" dirty="0"/>
+              <a:t> </a:t>
+            </a:r>
+            <a:r>
+              <a:rPr lang="sk-SK" dirty="0" err="1"/>
+              <a:t>komunikace</a:t>
+            </a:r>
+            <a:r>
+              <a:rPr lang="sk-SK" dirty="0"/>
+              <a:t> </a:t>
+            </a:r>
+            <a:r>
+              <a:rPr lang="sk-SK" dirty="0" err="1"/>
+              <a:t>se</a:t>
+            </a:r>
+            <a:r>
+              <a:rPr lang="sk-SK" dirty="0"/>
+              <a:t> </a:t>
+            </a:r>
+            <a:r>
+              <a:rPr lang="sk-SK" dirty="0" err="1"/>
+              <a:t>serverem</a:t>
+            </a:r>
+            <a:endParaRPr lang="sk-SK" dirty="0"/>
+          </a:p>
+          <a:p>
+            <a:pPr>
+              <a:buFont typeface="Arial" panose="020B0604020202020204" pitchFamily="34" charset="0"/>
+              <a:buChar char="•"/>
+            </a:pPr>
+            <a:r>
+              <a:rPr lang="sk-SK" dirty="0"/>
+              <a:t> </a:t>
+            </a:r>
+            <a:r>
+              <a:rPr lang="sk-SK" dirty="0" err="1"/>
+              <a:t>Vygenerovat</a:t>
+            </a:r>
+            <a:r>
+              <a:rPr lang="sk-SK" dirty="0"/>
+              <a:t> klienta a </a:t>
+            </a:r>
+            <a:r>
+              <a:rPr lang="sk-SK" dirty="0" err="1"/>
+              <a:t>použít</a:t>
+            </a:r>
+            <a:r>
+              <a:rPr lang="sk-SK" dirty="0"/>
+              <a:t> jej na </a:t>
+            </a:r>
+            <a:r>
+              <a:rPr lang="sk-SK"/>
+              <a:t>komunikaci </a:t>
+            </a:r>
+            <a:r>
+              <a:rPr lang="sk-SK" dirty="0"/>
+              <a:t>s API</a:t>
+            </a:r>
+          </a:p>
+        </p:txBody>
+      </p:sp>
+    </p:spTree>
+    <p:extLst>
+      <p:ext uri="{BB962C8B-B14F-4D97-AF65-F5344CB8AC3E}">
+        <p14:creationId xmlns:p14="http://schemas.microsoft.com/office/powerpoint/2010/main" val="1008705504"/>
+      </p:ext>
+    </p:extLst>
+  </p:cSld>
+  <p:clrMapOvr>
+    <a:masterClrMapping/>
+  </p:clrMapOvr>
+</p:sld>
+</file>
+
+<file path=ppt/slides/slide4.xml><?xml version="1.0" encoding="utf-8"?>
 <p:sld xmlns:a="http://schemas.openxmlformats.org/drawingml/2006/main" xmlns:r="http://schemas.openxmlformats.org/officeDocument/2006/relationships" xmlns:p="http://schemas.openxmlformats.org/presentationml/2006/main">
   <p:cSld>
     <p:spTree>
@@ -24427,7 +26218,7 @@
 </p:sld>
 </file>
 
-<file path=ppt/slides/slide3.xml><?xml version="1.0" encoding="utf-8"?>
+<file path=ppt/slides/slide5.xml><?xml version="1.0" encoding="utf-8"?>
 <p:sld xmlns:a="http://schemas.openxmlformats.org/drawingml/2006/main" xmlns:r="http://schemas.openxmlformats.org/officeDocument/2006/relationships" xmlns:p="http://schemas.openxmlformats.org/presentationml/2006/main">
   <p:cSld>
     <p:spTree>
@@ -24932,7 +26723,7 @@
 </p:sld>
 </file>
 
-<file path=ppt/slides/slide4.xml><?xml version="1.0" encoding="utf-8"?>
+<file path=ppt/slides/slide6.xml><?xml version="1.0" encoding="utf-8"?>
 <p:sld xmlns:a="http://schemas.openxmlformats.org/drawingml/2006/main" xmlns:r="http://schemas.openxmlformats.org/officeDocument/2006/relationships" xmlns:p="http://schemas.openxmlformats.org/presentationml/2006/main">
   <p:cSld>
     <p:spTree>
@@ -25039,7 +26830,7 @@
 </p:sld>
 </file>
 
-<file path=ppt/slides/slide5.xml><?xml version="1.0" encoding="utf-8"?>
+<file path=ppt/slides/slide7.xml><?xml version="1.0" encoding="utf-8"?>
 <p:sld xmlns:a="http://schemas.openxmlformats.org/drawingml/2006/main" xmlns:r="http://schemas.openxmlformats.org/officeDocument/2006/relationships" xmlns:p="http://schemas.openxmlformats.org/presentationml/2006/main">
   <p:cSld>
     <p:spTree>
@@ -25372,7 +27163,7 @@
 </p:sld>
 </file>
 
-<file path=ppt/slides/slide6.xml><?xml version="1.0" encoding="utf-8"?>
+<file path=ppt/slides/slide8.xml><?xml version="1.0" encoding="utf-8"?>
 <p:sld xmlns:a="http://schemas.openxmlformats.org/drawingml/2006/main" xmlns:r="http://schemas.openxmlformats.org/officeDocument/2006/relationships" xmlns:p="http://schemas.openxmlformats.org/presentationml/2006/main">
   <p:cSld>
     <p:spTree>
@@ -25629,7 +27420,7 @@
 </p:sld>
 </file>
 
-<file path=ppt/slides/slide7.xml><?xml version="1.0" encoding="utf-8"?>
+<file path=ppt/slides/slide9.xml><?xml version="1.0" encoding="utf-8"?>
 <p:sld xmlns:a="http://schemas.openxmlformats.org/drawingml/2006/main" xmlns:r="http://schemas.openxmlformats.org/officeDocument/2006/relationships" xmlns:p="http://schemas.openxmlformats.org/presentationml/2006/main">
   <p:cSld>
     <p:spTree>
@@ -26115,1005 +27906,6 @@
     <p:bldLst>
       <p:bldP spid="3" grpId="0" build="p"/>
       <p:bldP spid="4" grpId="0"/>
-    </p:bldLst>
-  </p:timing>
-</p:sld>
-</file>
-
-<file path=ppt/slides/slide8.xml><?xml version="1.0" encoding="utf-8"?>
-<p:sld xmlns:a="http://schemas.openxmlformats.org/drawingml/2006/main" xmlns:r="http://schemas.openxmlformats.org/officeDocument/2006/relationships" xmlns:p="http://schemas.openxmlformats.org/presentationml/2006/main">
-  <p:cSld>
-    <p:spTree>
-      <p:nvGrpSpPr>
-        <p:cNvPr id="1" name=""/>
-        <p:cNvGrpSpPr/>
-        <p:nvPr/>
-      </p:nvGrpSpPr>
-      <p:grpSpPr>
-        <a:xfrm>
-          <a:off x="0" y="0"/>
-          <a:ext cx="0" cy="0"/>
-          <a:chOff x="0" y="0"/>
-          <a:chExt cx="0" cy="0"/>
-        </a:xfrm>
-      </p:grpSpPr>
-      <p:sp>
-        <p:nvSpPr>
-          <p:cNvPr id="2" name="Title 1">
-            <a:extLst>
-              <a:ext uri="{FF2B5EF4-FFF2-40B4-BE49-F238E27FC236}">
-                <a16:creationId xmlns:a16="http://schemas.microsoft.com/office/drawing/2014/main" id="{A7DE7713-8786-4DE8-ADAE-7F0CE86A31F4}"/>
-              </a:ext>
-            </a:extLst>
-          </p:cNvPr>
-          <p:cNvSpPr>
-            <a:spLocks noGrp="1"/>
-          </p:cNvSpPr>
-          <p:nvPr>
-            <p:ph type="title"/>
-          </p:nvPr>
-        </p:nvSpPr>
-        <p:spPr/>
-        <p:txBody>
-          <a:bodyPr/>
-          <a:lstStyle/>
-          <a:p>
-            <a:r>
-              <a:rPr lang="cs-CZ" dirty="0"/>
-              <a:t>S</a:t>
-            </a:r>
-            <a:r>
-              <a:rPr lang="sk-SK" dirty="0" err="1"/>
-              <a:t>etup</a:t>
-            </a:r>
-            <a:endParaRPr lang="cs-CZ" dirty="0"/>
-          </a:p>
-        </p:txBody>
-      </p:sp>
-      <p:sp>
-        <p:nvSpPr>
-          <p:cNvPr id="3" name="Content Placeholder 2">
-            <a:extLst>
-              <a:ext uri="{FF2B5EF4-FFF2-40B4-BE49-F238E27FC236}">
-                <a16:creationId xmlns:a16="http://schemas.microsoft.com/office/drawing/2014/main" id="{FA8E97BB-588F-4B3D-9D79-2A1C8F7C045B}"/>
-              </a:ext>
-            </a:extLst>
-          </p:cNvPr>
-          <p:cNvSpPr>
-            <a:spLocks noGrp="1"/>
-          </p:cNvSpPr>
-          <p:nvPr>
-            <p:ph idx="1"/>
-          </p:nvPr>
-        </p:nvSpPr>
-        <p:spPr/>
-        <p:txBody>
-          <a:bodyPr/>
-          <a:lstStyle/>
-          <a:p>
-            <a:r>
-              <a:rPr lang="sk-SK" dirty="0" err="1"/>
-              <a:t>Přidat</a:t>
-            </a:r>
-            <a:r>
-              <a:rPr lang="cs-CZ" dirty="0"/>
-              <a:t> </a:t>
-            </a:r>
-            <a:r>
-              <a:rPr lang="cs-CZ" dirty="0" err="1"/>
-              <a:t>middleware</a:t>
-            </a:r>
-            <a:r>
-              <a:rPr lang="en-US" dirty="0"/>
-              <a:t>:</a:t>
-            </a:r>
-          </a:p>
-          <a:p>
-            <a:pPr marL="457200" lvl="1" indent="0">
-              <a:buNone/>
-            </a:pPr>
-            <a:endParaRPr lang="cs-CZ" dirty="0"/>
-          </a:p>
-          <a:p>
-            <a:pPr marL="457200" lvl="1" indent="0">
-              <a:buNone/>
-            </a:pPr>
-            <a:endParaRPr lang="cs-CZ" dirty="0"/>
-          </a:p>
-          <a:p>
-            <a:r>
-              <a:rPr lang="sk-SK" dirty="0" err="1"/>
-              <a:t>Přidat</a:t>
-            </a:r>
-            <a:r>
-              <a:rPr lang="sk-SK" dirty="0"/>
-              <a:t> </a:t>
-            </a:r>
-            <a:r>
-              <a:rPr lang="sk-SK" dirty="0" err="1"/>
-              <a:t>middleware</a:t>
-            </a:r>
-            <a:r>
-              <a:rPr lang="cs-CZ" dirty="0"/>
-              <a:t> </a:t>
-            </a:r>
-            <a:r>
-              <a:rPr lang="sk-SK" dirty="0"/>
-              <a:t>pro </a:t>
-            </a:r>
-            <a:r>
-              <a:rPr lang="cs-CZ" dirty="0" err="1"/>
-              <a:t>Swagger</a:t>
-            </a:r>
-            <a:r>
-              <a:rPr lang="cs-CZ" dirty="0"/>
-              <a:t> UI:</a:t>
-            </a:r>
-          </a:p>
-          <a:p>
-            <a:pPr lvl="1"/>
-            <a:endParaRPr lang="cs-CZ" dirty="0"/>
-          </a:p>
-          <a:p>
-            <a:pPr lvl="1"/>
-            <a:endParaRPr lang="cs-CZ" dirty="0"/>
-          </a:p>
-        </p:txBody>
-      </p:sp>
-      <p:sp>
-        <p:nvSpPr>
-          <p:cNvPr id="4" name="Rectangle 3">
-            <a:extLst>
-              <a:ext uri="{FF2B5EF4-FFF2-40B4-BE49-F238E27FC236}">
-                <a16:creationId xmlns:a16="http://schemas.microsoft.com/office/drawing/2014/main" id="{67B21E2E-C5BA-407A-9A50-4048FEFFBDBD}"/>
-              </a:ext>
-            </a:extLst>
-          </p:cNvPr>
-          <p:cNvSpPr/>
-          <p:nvPr/>
-        </p:nvSpPr>
-        <p:spPr>
-          <a:xfrm>
-            <a:off x="2286000" y="4038601"/>
-            <a:ext cx="8382000" cy="1246495"/>
-          </a:xfrm>
-          <a:prstGeom prst="rect">
-            <a:avLst/>
-          </a:prstGeom>
-        </p:spPr>
-        <p:txBody>
-          <a:bodyPr wrap="square">
-            <a:spAutoFit/>
-          </a:bodyPr>
-          <a:lstStyle/>
-          <a:p>
-            <a:r>
-              <a:rPr lang="cs-CZ" sz="1500" dirty="0" err="1">
-                <a:solidFill>
-                  <a:srgbClr val="000000"/>
-                </a:solidFill>
-                <a:latin typeface="Consolas" panose="020B0609020204030204" pitchFamily="49" charset="0"/>
-              </a:rPr>
-              <a:t>app.UseSwaggerU</a:t>
-            </a:r>
-            <a:r>
-              <a:rPr lang="en-US" sz="1500" dirty="0">
-                <a:solidFill>
-                  <a:srgbClr val="000000"/>
-                </a:solidFill>
-                <a:latin typeface="Consolas" panose="020B0609020204030204" pitchFamily="49" charset="0"/>
-              </a:rPr>
-              <a:t>i3</a:t>
-            </a:r>
-            <a:r>
-              <a:rPr lang="cs-CZ" sz="1500" dirty="0">
-                <a:solidFill>
-                  <a:srgbClr val="000000"/>
-                </a:solidFill>
-                <a:latin typeface="Consolas" panose="020B0609020204030204" pitchFamily="49" charset="0"/>
-              </a:rPr>
-              <a:t>(</a:t>
-            </a:r>
-            <a:r>
-              <a:rPr lang="en-US" sz="1500" dirty="0">
-                <a:solidFill>
-                  <a:srgbClr val="000000"/>
-                </a:solidFill>
-                <a:latin typeface="Consolas" panose="020B0609020204030204" pitchFamily="49" charset="0"/>
-              </a:rPr>
-              <a:t>settings</a:t>
-            </a:r>
-            <a:r>
-              <a:rPr lang="cs-CZ" sz="1500" dirty="0">
-                <a:solidFill>
-                  <a:srgbClr val="000000"/>
-                </a:solidFill>
-                <a:latin typeface="Consolas" panose="020B0609020204030204" pitchFamily="49" charset="0"/>
-              </a:rPr>
-              <a:t> =&gt;</a:t>
-            </a:r>
-          </a:p>
-          <a:p>
-            <a:r>
-              <a:rPr lang="cs-CZ" sz="1500" dirty="0">
-                <a:solidFill>
-                  <a:srgbClr val="000000"/>
-                </a:solidFill>
-                <a:latin typeface="Consolas" panose="020B0609020204030204" pitchFamily="49" charset="0"/>
-              </a:rPr>
-              <a:t>{</a:t>
-            </a:r>
-          </a:p>
-          <a:p>
-            <a:r>
-              <a:rPr lang="en-US" sz="1500" dirty="0">
-                <a:solidFill>
-                  <a:srgbClr val="000000"/>
-                </a:solidFill>
-                <a:latin typeface="Consolas" panose="020B0609020204030204" pitchFamily="49" charset="0"/>
-              </a:rPr>
-              <a:t>  settings</a:t>
-            </a:r>
-            <a:r>
-              <a:rPr lang="cs-CZ" sz="1500" dirty="0">
-                <a:solidFill>
-                  <a:srgbClr val="000000"/>
-                </a:solidFill>
-                <a:latin typeface="Consolas" panose="020B0609020204030204" pitchFamily="49" charset="0"/>
-              </a:rPr>
-              <a:t>.</a:t>
-            </a:r>
-            <a:r>
-              <a:rPr lang="en-US" sz="1500" dirty="0" err="1">
-                <a:solidFill>
-                  <a:srgbClr val="000000"/>
-                </a:solidFill>
-                <a:latin typeface="Consolas" panose="020B0609020204030204" pitchFamily="49" charset="0"/>
-              </a:rPr>
-              <a:t>SwaggerRoutes.Add</a:t>
-            </a:r>
-            <a:r>
-              <a:rPr lang="cs-CZ" sz="1500" dirty="0">
-                <a:solidFill>
-                  <a:srgbClr val="000000"/>
-                </a:solidFill>
-                <a:latin typeface="Consolas" panose="020B0609020204030204" pitchFamily="49" charset="0"/>
-              </a:rPr>
-              <a:t>(</a:t>
-            </a:r>
-            <a:endParaRPr lang="en-US" sz="1500" dirty="0">
-              <a:solidFill>
-                <a:srgbClr val="000000"/>
-              </a:solidFill>
-              <a:latin typeface="Consolas" panose="020B0609020204030204" pitchFamily="49" charset="0"/>
-            </a:endParaRPr>
-          </a:p>
-          <a:p>
-            <a:r>
-              <a:rPr lang="en-US" sz="1500" dirty="0">
-                <a:solidFill>
-                  <a:srgbClr val="000000"/>
-                </a:solidFill>
-                <a:latin typeface="Consolas" panose="020B0609020204030204" pitchFamily="49" charset="0"/>
-              </a:rPr>
-              <a:t>	new SwaggerUi3Route(</a:t>
-            </a:r>
-            <a:r>
-              <a:rPr lang="en-US" sz="1500" dirty="0">
-                <a:solidFill>
-                  <a:srgbClr val="A31515"/>
-                </a:solidFill>
-                <a:latin typeface="Consolas" panose="020B0609020204030204" pitchFamily="49" charset="0"/>
-              </a:rPr>
-              <a:t>"v1.0</a:t>
-            </a:r>
-            <a:r>
-              <a:rPr lang="cs-CZ" sz="1500" dirty="0">
-                <a:solidFill>
-                  <a:srgbClr val="A31515"/>
-                </a:solidFill>
-                <a:latin typeface="Consolas" panose="020B0609020204030204" pitchFamily="49" charset="0"/>
-              </a:rPr>
-              <a:t>"</a:t>
-            </a:r>
-            <a:r>
-              <a:rPr lang="cs-CZ" sz="1500" dirty="0">
-                <a:solidFill>
-                  <a:srgbClr val="000000"/>
-                </a:solidFill>
-                <a:latin typeface="Consolas" panose="020B0609020204030204" pitchFamily="49" charset="0"/>
-              </a:rPr>
-              <a:t>,</a:t>
-            </a:r>
-            <a:r>
-              <a:rPr lang="en-US" sz="1500" dirty="0">
-                <a:solidFill>
-                  <a:srgbClr val="000000"/>
-                </a:solidFill>
-                <a:latin typeface="Consolas" panose="020B0609020204030204" pitchFamily="49" charset="0"/>
-              </a:rPr>
-              <a:t> </a:t>
-            </a:r>
-            <a:r>
-              <a:rPr lang="en-US" sz="1500" dirty="0">
-                <a:solidFill>
-                  <a:srgbClr val="A31515"/>
-                </a:solidFill>
-                <a:latin typeface="Consolas" panose="020B0609020204030204" pitchFamily="49" charset="0"/>
-              </a:rPr>
-              <a:t>"/swagger/v1/</a:t>
-            </a:r>
-            <a:r>
-              <a:rPr lang="en-US" sz="1500" dirty="0" err="1">
-                <a:solidFill>
-                  <a:srgbClr val="A31515"/>
-                </a:solidFill>
-                <a:latin typeface="Consolas" panose="020B0609020204030204" pitchFamily="49" charset="0"/>
-              </a:rPr>
-              <a:t>swagger.json</a:t>
-            </a:r>
-            <a:r>
-              <a:rPr lang="cs-CZ" sz="1500" dirty="0">
-                <a:solidFill>
-                  <a:srgbClr val="A31515"/>
-                </a:solidFill>
-                <a:latin typeface="Consolas" panose="020B0609020204030204" pitchFamily="49" charset="0"/>
-              </a:rPr>
-              <a:t>"</a:t>
-            </a:r>
-            <a:r>
-              <a:rPr lang="cs-CZ" sz="1500" dirty="0">
-                <a:solidFill>
-                  <a:srgbClr val="000000"/>
-                </a:solidFill>
-                <a:latin typeface="Consolas" panose="020B0609020204030204" pitchFamily="49" charset="0"/>
-              </a:rPr>
-              <a:t>)</a:t>
-            </a:r>
-            <a:r>
-              <a:rPr lang="en-US" sz="1500" dirty="0">
-                <a:solidFill>
-                  <a:srgbClr val="000000"/>
-                </a:solidFill>
-                <a:latin typeface="Consolas" panose="020B0609020204030204" pitchFamily="49" charset="0"/>
-              </a:rPr>
-              <a:t>)</a:t>
-            </a:r>
-            <a:r>
-              <a:rPr lang="cs-CZ" sz="1500" dirty="0">
-                <a:solidFill>
-                  <a:srgbClr val="000000"/>
-                </a:solidFill>
-                <a:latin typeface="Consolas" panose="020B0609020204030204" pitchFamily="49" charset="0"/>
-              </a:rPr>
-              <a:t>;</a:t>
-            </a:r>
-          </a:p>
-          <a:p>
-            <a:r>
-              <a:rPr lang="cs-CZ" sz="1500" dirty="0">
-                <a:solidFill>
-                  <a:srgbClr val="000000"/>
-                </a:solidFill>
-                <a:latin typeface="Consolas" panose="020B0609020204030204" pitchFamily="49" charset="0"/>
-              </a:rPr>
-              <a:t>});</a:t>
-            </a:r>
-            <a:endParaRPr lang="cs-CZ" sz="1500" dirty="0"/>
-          </a:p>
-        </p:txBody>
-      </p:sp>
-      <p:sp>
-        <p:nvSpPr>
-          <p:cNvPr id="5" name="Rectangle 4">
-            <a:extLst>
-              <a:ext uri="{FF2B5EF4-FFF2-40B4-BE49-F238E27FC236}">
-                <a16:creationId xmlns:a16="http://schemas.microsoft.com/office/drawing/2014/main" id="{4FEAFBD2-3150-46F1-B215-5E018AD833B1}"/>
-              </a:ext>
-            </a:extLst>
-          </p:cNvPr>
-          <p:cNvSpPr/>
-          <p:nvPr/>
-        </p:nvSpPr>
-        <p:spPr>
-          <a:xfrm>
-            <a:off x="2514601" y="2764535"/>
-            <a:ext cx="1983235" cy="323165"/>
-          </a:xfrm>
-          <a:prstGeom prst="rect">
-            <a:avLst/>
-          </a:prstGeom>
-        </p:spPr>
-        <p:txBody>
-          <a:bodyPr wrap="none">
-            <a:spAutoFit/>
-          </a:bodyPr>
-          <a:lstStyle/>
-          <a:p>
-            <a:r>
-              <a:rPr lang="cs-CZ" sz="1500" dirty="0" err="1">
-                <a:solidFill>
-                  <a:srgbClr val="000000"/>
-                </a:solidFill>
-                <a:latin typeface="Consolas" panose="020B0609020204030204" pitchFamily="49" charset="0"/>
-              </a:rPr>
-              <a:t>app.Use</a:t>
-            </a:r>
-            <a:r>
-              <a:rPr lang="en-US" sz="1500" dirty="0" err="1">
-                <a:solidFill>
-                  <a:srgbClr val="000000"/>
-                </a:solidFill>
-                <a:latin typeface="Consolas" panose="020B0609020204030204" pitchFamily="49" charset="0"/>
-              </a:rPr>
-              <a:t>OpenApi</a:t>
-            </a:r>
-            <a:r>
-              <a:rPr lang="cs-CZ" sz="1500" dirty="0">
-                <a:solidFill>
-                  <a:srgbClr val="000000"/>
-                </a:solidFill>
-                <a:latin typeface="Consolas" panose="020B0609020204030204" pitchFamily="49" charset="0"/>
-              </a:rPr>
-              <a:t>();</a:t>
-            </a:r>
-            <a:endParaRPr lang="cs-CZ" sz="1500" dirty="0"/>
-          </a:p>
-        </p:txBody>
-      </p:sp>
-    </p:spTree>
-    <p:extLst>
-      <p:ext uri="{BB962C8B-B14F-4D97-AF65-F5344CB8AC3E}">
-        <p14:creationId xmlns:p14="http://schemas.microsoft.com/office/powerpoint/2010/main" val="707186793"/>
-      </p:ext>
-    </p:extLst>
-  </p:cSld>
-  <p:clrMapOvr>
-    <a:masterClrMapping/>
-  </p:clrMapOvr>
-  <p:transition spd="med">
-    <p:pull/>
-  </p:transition>
-  <p:timing>
-    <p:tnLst>
-      <p:par>
-        <p:cTn id="1" dur="indefinite" restart="never" nodeType="tmRoot">
-          <p:childTnLst>
-            <p:seq concurrent="1" nextAc="seek">
-              <p:cTn id="2" dur="indefinite" nodeType="mainSeq">
-                <p:childTnLst>
-                  <p:par>
-                    <p:cTn id="3" fill="hold">
-                      <p:stCondLst>
-                        <p:cond delay="indefinite"/>
-                      </p:stCondLst>
-                      <p:childTnLst>
-                        <p:par>
-                          <p:cTn id="4" fill="hold">
-                            <p:stCondLst>
-                              <p:cond delay="0"/>
-                            </p:stCondLst>
-                            <p:childTnLst>
-                              <p:par>
-                                <p:cTn id="5" presetID="1" presetClass="entr" presetSubtype="0" fill="hold" grpId="0" nodeType="clickEffect">
-                                  <p:stCondLst>
-                                    <p:cond delay="0"/>
-                                  </p:stCondLst>
-                                  <p:childTnLst>
-                                    <p:set>
-                                      <p:cBhvr>
-                                        <p:cTn id="6" dur="1" fill="hold">
-                                          <p:stCondLst>
-                                            <p:cond delay="0"/>
-                                          </p:stCondLst>
-                                        </p:cTn>
-                                        <p:tgtEl>
-                                          <p:spTgt spid="3">
-                                            <p:txEl>
-                                              <p:pRg st="0" end="0"/>
-                                            </p:txEl>
-                                          </p:spTgt>
-                                        </p:tgtEl>
-                                        <p:attrNameLst>
-                                          <p:attrName>style.visibility</p:attrName>
-                                        </p:attrNameLst>
-                                      </p:cBhvr>
-                                      <p:to>
-                                        <p:strVal val="visible"/>
-                                      </p:to>
-                                    </p:set>
-                                  </p:childTnLst>
-                                </p:cTn>
-                              </p:par>
-                            </p:childTnLst>
-                          </p:cTn>
-                        </p:par>
-                      </p:childTnLst>
-                    </p:cTn>
-                  </p:par>
-                  <p:par>
-                    <p:cTn id="7" fill="hold">
-                      <p:stCondLst>
-                        <p:cond delay="indefinite"/>
-                      </p:stCondLst>
-                      <p:childTnLst>
-                        <p:par>
-                          <p:cTn id="8" fill="hold">
-                            <p:stCondLst>
-                              <p:cond delay="0"/>
-                            </p:stCondLst>
-                            <p:childTnLst>
-                              <p:par>
-                                <p:cTn id="9" presetID="1" presetClass="entr" presetSubtype="0" fill="hold" grpId="0" nodeType="clickEffect">
-                                  <p:stCondLst>
-                                    <p:cond delay="0"/>
-                                  </p:stCondLst>
-                                  <p:childTnLst>
-                                    <p:set>
-                                      <p:cBhvr>
-                                        <p:cTn id="10" dur="1" fill="hold">
-                                          <p:stCondLst>
-                                            <p:cond delay="0"/>
-                                          </p:stCondLst>
-                                        </p:cTn>
-                                        <p:tgtEl>
-                                          <p:spTgt spid="5"/>
-                                        </p:tgtEl>
-                                        <p:attrNameLst>
-                                          <p:attrName>style.visibility</p:attrName>
-                                        </p:attrNameLst>
-                                      </p:cBhvr>
-                                      <p:to>
-                                        <p:strVal val="visible"/>
-                                      </p:to>
-                                    </p:set>
-                                  </p:childTnLst>
-                                </p:cTn>
-                              </p:par>
-                            </p:childTnLst>
-                          </p:cTn>
-                        </p:par>
-                      </p:childTnLst>
-                    </p:cTn>
-                  </p:par>
-                  <p:par>
-                    <p:cTn id="11" fill="hold">
-                      <p:stCondLst>
-                        <p:cond delay="indefinite"/>
-                      </p:stCondLst>
-                      <p:childTnLst>
-                        <p:par>
-                          <p:cTn id="12" fill="hold">
-                            <p:stCondLst>
-                              <p:cond delay="0"/>
-                            </p:stCondLst>
-                            <p:childTnLst>
-                              <p:par>
-                                <p:cTn id="13" presetID="1" presetClass="entr" presetSubtype="0" fill="hold" grpId="0" nodeType="clickEffect">
-                                  <p:stCondLst>
-                                    <p:cond delay="0"/>
-                                  </p:stCondLst>
-                                  <p:childTnLst>
-                                    <p:set>
-                                      <p:cBhvr>
-                                        <p:cTn id="14" dur="1" fill="hold">
-                                          <p:stCondLst>
-                                            <p:cond delay="0"/>
-                                          </p:stCondLst>
-                                        </p:cTn>
-                                        <p:tgtEl>
-                                          <p:spTgt spid="3">
-                                            <p:txEl>
-                                              <p:pRg st="3" end="3"/>
-                                            </p:txEl>
-                                          </p:spTgt>
-                                        </p:tgtEl>
-                                        <p:attrNameLst>
-                                          <p:attrName>style.visibility</p:attrName>
-                                        </p:attrNameLst>
-                                      </p:cBhvr>
-                                      <p:to>
-                                        <p:strVal val="visible"/>
-                                      </p:to>
-                                    </p:set>
-                                  </p:childTnLst>
-                                </p:cTn>
-                              </p:par>
-                            </p:childTnLst>
-                          </p:cTn>
-                        </p:par>
-                      </p:childTnLst>
-                    </p:cTn>
-                  </p:par>
-                  <p:par>
-                    <p:cTn id="15" fill="hold">
-                      <p:stCondLst>
-                        <p:cond delay="indefinite"/>
-                      </p:stCondLst>
-                      <p:childTnLst>
-                        <p:par>
-                          <p:cTn id="16" fill="hold">
-                            <p:stCondLst>
-                              <p:cond delay="0"/>
-                            </p:stCondLst>
-                            <p:childTnLst>
-                              <p:par>
-                                <p:cTn id="17" presetID="1" presetClass="entr" presetSubtype="0" fill="hold" grpId="0" nodeType="clickEffect">
-                                  <p:stCondLst>
-                                    <p:cond delay="0"/>
-                                  </p:stCondLst>
-                                  <p:childTnLst>
-                                    <p:set>
-                                      <p:cBhvr>
-                                        <p:cTn id="18" dur="1" fill="hold">
-                                          <p:stCondLst>
-                                            <p:cond delay="0"/>
-                                          </p:stCondLst>
-                                        </p:cTn>
-                                        <p:tgtEl>
-                                          <p:spTgt spid="4"/>
-                                        </p:tgtEl>
-                                        <p:attrNameLst>
-                                          <p:attrName>style.visibility</p:attrName>
-                                        </p:attrNameLst>
-                                      </p:cBhvr>
-                                      <p:to>
-                                        <p:strVal val="visible"/>
-                                      </p:to>
-                                    </p:set>
-                                  </p:childTnLst>
-                                </p:cTn>
-                              </p:par>
-                            </p:childTnLst>
-                          </p:cTn>
-                        </p:par>
-                      </p:childTnLst>
-                    </p:cTn>
-                  </p:par>
-                </p:childTnLst>
-              </p:cTn>
-              <p:prevCondLst>
-                <p:cond evt="onPrev" delay="0">
-                  <p:tgtEl>
-                    <p:sldTgt/>
-                  </p:tgtEl>
-                </p:cond>
-              </p:prevCondLst>
-              <p:nextCondLst>
-                <p:cond evt="onNext" delay="0">
-                  <p:tgtEl>
-                    <p:sldTgt/>
-                  </p:tgtEl>
-                </p:cond>
-              </p:nextCondLst>
-            </p:seq>
-          </p:childTnLst>
-        </p:cTn>
-      </p:par>
-    </p:tnLst>
-    <p:bldLst>
-      <p:bldP spid="3" grpId="0" uiExpand="1" build="p"/>
-      <p:bldP spid="4" grpId="0"/>
-      <p:bldP spid="5" grpId="0"/>
-    </p:bldLst>
-  </p:timing>
-</p:sld>
-</file>
-
-<file path=ppt/slides/slide9.xml><?xml version="1.0" encoding="utf-8"?>
-<p:sld xmlns:a="http://schemas.openxmlformats.org/drawingml/2006/main" xmlns:r="http://schemas.openxmlformats.org/officeDocument/2006/relationships" xmlns:p="http://schemas.openxmlformats.org/presentationml/2006/main">
-  <p:cSld>
-    <p:spTree>
-      <p:nvGrpSpPr>
-        <p:cNvPr id="1" name=""/>
-        <p:cNvGrpSpPr/>
-        <p:nvPr/>
-      </p:nvGrpSpPr>
-      <p:grpSpPr>
-        <a:xfrm>
-          <a:off x="0" y="0"/>
-          <a:ext cx="0" cy="0"/>
-          <a:chOff x="0" y="0"/>
-          <a:chExt cx="0" cy="0"/>
-        </a:xfrm>
-      </p:grpSpPr>
-      <p:sp>
-        <p:nvSpPr>
-          <p:cNvPr id="2" name="Title 1">
-            <a:extLst>
-              <a:ext uri="{FF2B5EF4-FFF2-40B4-BE49-F238E27FC236}">
-                <a16:creationId xmlns:a16="http://schemas.microsoft.com/office/drawing/2014/main" id="{817A16ED-6FCB-42C7-8436-F4C22FB9CD4D}"/>
-              </a:ext>
-            </a:extLst>
-          </p:cNvPr>
-          <p:cNvSpPr>
-            <a:spLocks noGrp="1"/>
-          </p:cNvSpPr>
-          <p:nvPr>
-            <p:ph type="title"/>
-          </p:nvPr>
-        </p:nvSpPr>
-        <p:spPr/>
-        <p:txBody>
-          <a:bodyPr/>
-          <a:lstStyle/>
-          <a:p>
-            <a:r>
-              <a:rPr lang="sk-SK" dirty="0" err="1"/>
-              <a:t>Swagger</a:t>
-            </a:r>
-            <a:r>
-              <a:rPr lang="sk-SK" dirty="0"/>
-              <a:t> editor</a:t>
-            </a:r>
-            <a:endParaRPr lang="cs-CZ" dirty="0"/>
-          </a:p>
-        </p:txBody>
-      </p:sp>
-      <p:sp>
-        <p:nvSpPr>
-          <p:cNvPr id="3" name="Content Placeholder 2">
-            <a:extLst>
-              <a:ext uri="{FF2B5EF4-FFF2-40B4-BE49-F238E27FC236}">
-                <a16:creationId xmlns:a16="http://schemas.microsoft.com/office/drawing/2014/main" id="{13B65318-F205-41A6-AE7E-5F1754DFC560}"/>
-              </a:ext>
-            </a:extLst>
-          </p:cNvPr>
-          <p:cNvSpPr>
-            <a:spLocks noGrp="1"/>
-          </p:cNvSpPr>
-          <p:nvPr>
-            <p:ph idx="1"/>
-          </p:nvPr>
-        </p:nvSpPr>
-        <p:spPr/>
-        <p:txBody>
-          <a:bodyPr/>
-          <a:lstStyle/>
-          <a:p>
-            <a:r>
-              <a:rPr lang="sk-SK" dirty="0"/>
-              <a:t>Online </a:t>
-            </a:r>
-            <a:r>
-              <a:rPr lang="sk-SK" dirty="0" err="1"/>
-              <a:t>verze</a:t>
-            </a:r>
-            <a:r>
-              <a:rPr lang="cs-CZ" dirty="0"/>
-              <a:t> </a:t>
-            </a:r>
-            <a:r>
-              <a:rPr lang="en-US" dirty="0">
-                <a:hlinkClick r:id="rId2"/>
-              </a:rPr>
-              <a:t>https://editor.swagger.io</a:t>
-            </a:r>
-            <a:endParaRPr lang="en-US" dirty="0"/>
-          </a:p>
-          <a:p>
-            <a:r>
-              <a:rPr lang="sk-SK" dirty="0" err="1"/>
-              <a:t>Možnost</a:t>
-            </a:r>
-            <a:r>
-              <a:rPr lang="sk-SK" dirty="0"/>
-              <a:t> </a:t>
-            </a:r>
-            <a:r>
-              <a:rPr lang="sk-SK" dirty="0" err="1"/>
-              <a:t>rozchodit</a:t>
-            </a:r>
-            <a:r>
-              <a:rPr lang="sk-SK" dirty="0"/>
-              <a:t> </a:t>
-            </a:r>
-            <a:r>
-              <a:rPr lang="sk-SK" dirty="0" err="1"/>
-              <a:t>lokálně</a:t>
-            </a:r>
-            <a:endParaRPr lang="sk-SK" dirty="0"/>
-          </a:p>
-          <a:p>
-            <a:r>
-              <a:rPr lang="sk-SK" dirty="0" err="1"/>
-              <a:t>Docker</a:t>
-            </a:r>
-            <a:r>
-              <a:rPr lang="sk-SK" dirty="0"/>
-              <a:t> image</a:t>
-            </a:r>
-          </a:p>
-        </p:txBody>
-      </p:sp>
-    </p:spTree>
-    <p:extLst>
-      <p:ext uri="{BB962C8B-B14F-4D97-AF65-F5344CB8AC3E}">
-        <p14:creationId xmlns:p14="http://schemas.microsoft.com/office/powerpoint/2010/main" val="2581044276"/>
-      </p:ext>
-    </p:extLst>
-  </p:cSld>
-  <p:clrMapOvr>
-    <a:masterClrMapping/>
-  </p:clrMapOvr>
-  <p:timing>
-    <p:tnLst>
-      <p:par>
-        <p:cTn id="1" dur="indefinite" restart="never" nodeType="tmRoot">
-          <p:childTnLst>
-            <p:seq concurrent="1" nextAc="seek">
-              <p:cTn id="2" dur="indefinite" nodeType="mainSeq">
-                <p:childTnLst>
-                  <p:par>
-                    <p:cTn id="3" fill="hold">
-                      <p:stCondLst>
-                        <p:cond delay="indefinite"/>
-                      </p:stCondLst>
-                      <p:childTnLst>
-                        <p:par>
-                          <p:cTn id="4" fill="hold">
-                            <p:stCondLst>
-                              <p:cond delay="0"/>
-                            </p:stCondLst>
-                            <p:childTnLst>
-                              <p:par>
-                                <p:cTn id="5" presetID="1" presetClass="entr" presetSubtype="0" fill="hold" grpId="0" nodeType="clickEffect">
-                                  <p:stCondLst>
-                                    <p:cond delay="0"/>
-                                  </p:stCondLst>
-                                  <p:childTnLst>
-                                    <p:set>
-                                      <p:cBhvr>
-                                        <p:cTn id="6" dur="1" fill="hold">
-                                          <p:stCondLst>
-                                            <p:cond delay="0"/>
-                                          </p:stCondLst>
-                                        </p:cTn>
-                                        <p:tgtEl>
-                                          <p:spTgt spid="3">
-                                            <p:txEl>
-                                              <p:pRg st="0" end="0"/>
-                                            </p:txEl>
-                                          </p:spTgt>
-                                        </p:tgtEl>
-                                        <p:attrNameLst>
-                                          <p:attrName>style.visibility</p:attrName>
-                                        </p:attrNameLst>
-                                      </p:cBhvr>
-                                      <p:to>
-                                        <p:strVal val="visible"/>
-                                      </p:to>
-                                    </p:set>
-                                  </p:childTnLst>
-                                </p:cTn>
-                              </p:par>
-                            </p:childTnLst>
-                          </p:cTn>
-                        </p:par>
-                      </p:childTnLst>
-                    </p:cTn>
-                  </p:par>
-                  <p:par>
-                    <p:cTn id="7" fill="hold">
-                      <p:stCondLst>
-                        <p:cond delay="indefinite"/>
-                      </p:stCondLst>
-                      <p:childTnLst>
-                        <p:par>
-                          <p:cTn id="8" fill="hold">
-                            <p:stCondLst>
-                              <p:cond delay="0"/>
-                            </p:stCondLst>
-                            <p:childTnLst>
-                              <p:par>
-                                <p:cTn id="9" presetID="1" presetClass="entr" presetSubtype="0" fill="hold" grpId="0" nodeType="clickEffect">
-                                  <p:stCondLst>
-                                    <p:cond delay="0"/>
-                                  </p:stCondLst>
-                                  <p:childTnLst>
-                                    <p:set>
-                                      <p:cBhvr>
-                                        <p:cTn id="10" dur="1" fill="hold">
-                                          <p:stCondLst>
-                                            <p:cond delay="0"/>
-                                          </p:stCondLst>
-                                        </p:cTn>
-                                        <p:tgtEl>
-                                          <p:spTgt spid="3">
-                                            <p:txEl>
-                                              <p:pRg st="1" end="1"/>
-                                            </p:txEl>
-                                          </p:spTgt>
-                                        </p:tgtEl>
-                                        <p:attrNameLst>
-                                          <p:attrName>style.visibility</p:attrName>
-                                        </p:attrNameLst>
-                                      </p:cBhvr>
-                                      <p:to>
-                                        <p:strVal val="visible"/>
-                                      </p:to>
-                                    </p:set>
-                                  </p:childTnLst>
-                                </p:cTn>
-                              </p:par>
-                            </p:childTnLst>
-                          </p:cTn>
-                        </p:par>
-                      </p:childTnLst>
-                    </p:cTn>
-                  </p:par>
-                  <p:par>
-                    <p:cTn id="11" fill="hold">
-                      <p:stCondLst>
-                        <p:cond delay="indefinite"/>
-                      </p:stCondLst>
-                      <p:childTnLst>
-                        <p:par>
-                          <p:cTn id="12" fill="hold">
-                            <p:stCondLst>
-                              <p:cond delay="0"/>
-                            </p:stCondLst>
-                            <p:childTnLst>
-                              <p:par>
-                                <p:cTn id="13" presetID="1" presetClass="entr" presetSubtype="0" fill="hold" grpId="0" nodeType="clickEffect">
-                                  <p:stCondLst>
-                                    <p:cond delay="0"/>
-                                  </p:stCondLst>
-                                  <p:childTnLst>
-                                    <p:set>
-                                      <p:cBhvr>
-                                        <p:cTn id="14" dur="1" fill="hold">
-                                          <p:stCondLst>
-                                            <p:cond delay="0"/>
-                                          </p:stCondLst>
-                                        </p:cTn>
-                                        <p:tgtEl>
-                                          <p:spTgt spid="3">
-                                            <p:txEl>
-                                              <p:pRg st="2" end="2"/>
-                                            </p:txEl>
-                                          </p:spTgt>
-                                        </p:tgtEl>
-                                        <p:attrNameLst>
-                                          <p:attrName>style.visibility</p:attrName>
-                                        </p:attrNameLst>
-                                      </p:cBhvr>
-                                      <p:to>
-                                        <p:strVal val="visible"/>
-                                      </p:to>
-                                    </p:set>
-                                  </p:childTnLst>
-                                </p:cTn>
-                              </p:par>
-                            </p:childTnLst>
-                          </p:cTn>
-                        </p:par>
-                      </p:childTnLst>
-                    </p:cTn>
-                  </p:par>
-                </p:childTnLst>
-              </p:cTn>
-              <p:prevCondLst>
-                <p:cond evt="onPrev" delay="0">
-                  <p:tgtEl>
-                    <p:sldTgt/>
-                  </p:tgtEl>
-                </p:cond>
-              </p:prevCondLst>
-              <p:nextCondLst>
-                <p:cond evt="onNext" delay="0">
-                  <p:tgtEl>
-                    <p:sldTgt/>
-                  </p:tgtEl>
-                </p:cond>
-              </p:nextCondLst>
-            </p:seq>
-          </p:childTnLst>
-        </p:cTn>
-      </p:par>
-    </p:tnLst>
-    <p:bldLst>
-      <p:bldP spid="3" grpId="0" build="p"/>
     </p:bldLst>
   </p:timing>
 </p:sld>

</xml_diff>